<commit_message>
Chanegs made to presentation
Removed duplicate slide
Unmuted the conclusion
</commit_message>
<xml_diff>
--- a/INFM600_0201_Release_Folder/INFM600_0201_Grand_ProjectSubmission/INFM600_0201_Grand_ProjectPresentation.pptx
+++ b/INFM600_0201_Release_Folder/INFM600_0201_Grand_ProjectSubmission/INFM600_0201_Grand_ProjectPresentation.pptx
@@ -10,22 +10,21 @@
     <p:sldId id="275" r:id="rId4"/>
     <p:sldId id="281" r:id="rId5"/>
     <p:sldId id="282" r:id="rId6"/>
-    <p:sldId id="257" r:id="rId7"/>
-    <p:sldId id="279" r:id="rId8"/>
-    <p:sldId id="258" r:id="rId9"/>
-    <p:sldId id="259" r:id="rId10"/>
-    <p:sldId id="260" r:id="rId11"/>
-    <p:sldId id="261" r:id="rId12"/>
-    <p:sldId id="263" r:id="rId13"/>
-    <p:sldId id="262" r:id="rId14"/>
-    <p:sldId id="276" r:id="rId15"/>
-    <p:sldId id="277" r:id="rId16"/>
-    <p:sldId id="283" r:id="rId17"/>
-    <p:sldId id="264" r:id="rId18"/>
-    <p:sldId id="265" r:id="rId19"/>
-    <p:sldId id="266" r:id="rId20"/>
-    <p:sldId id="268" r:id="rId21"/>
-    <p:sldId id="278" r:id="rId22"/>
+    <p:sldId id="279" r:id="rId7"/>
+    <p:sldId id="258" r:id="rId8"/>
+    <p:sldId id="259" r:id="rId9"/>
+    <p:sldId id="260" r:id="rId10"/>
+    <p:sldId id="261" r:id="rId11"/>
+    <p:sldId id="263" r:id="rId12"/>
+    <p:sldId id="262" r:id="rId13"/>
+    <p:sldId id="276" r:id="rId14"/>
+    <p:sldId id="277" r:id="rId15"/>
+    <p:sldId id="283" r:id="rId16"/>
+    <p:sldId id="264" r:id="rId17"/>
+    <p:sldId id="265" r:id="rId18"/>
+    <p:sldId id="266" r:id="rId19"/>
+    <p:sldId id="268" r:id="rId20"/>
+    <p:sldId id="278" r:id="rId21"/>
   </p:sldIdLst>
   <p:sldSz cx="9144000" cy="6858000" type="screen4x3"/>
   <p:notesSz cx="6858000" cy="9144000"/>
@@ -371,753 +370,6 @@
 </file>
 
 <file path=ppt/diagrams/colors1.xml><?xml version="1.0" encoding="utf-8"?>
-<dgm:colorsDef xmlns:dgm="http://schemas.openxmlformats.org/drawingml/2006/diagram" xmlns:a="http://schemas.openxmlformats.org/drawingml/2006/main" uniqueId="urn:microsoft.com/office/officeart/2005/8/colors/accent1_2">
-  <dgm:title val=""/>
-  <dgm:desc val=""/>
-  <dgm:catLst>
-    <dgm:cat type="accent1" pri="11200"/>
-  </dgm:catLst>
-  <dgm:styleLbl name="node0">
-    <dgm:fillClrLst meth="repeat">
-      <a:schemeClr val="accent1"/>
-    </dgm:fillClrLst>
-    <dgm:linClrLst meth="repeat">
-      <a:schemeClr val="lt1"/>
-    </dgm:linClrLst>
-    <dgm:effectClrLst/>
-    <dgm:txLinClrLst/>
-    <dgm:txFillClrLst/>
-    <dgm:txEffectClrLst/>
-  </dgm:styleLbl>
-  <dgm:styleLbl name="alignNode1">
-    <dgm:fillClrLst meth="repeat">
-      <a:schemeClr val="accent1"/>
-    </dgm:fillClrLst>
-    <dgm:linClrLst meth="repeat">
-      <a:schemeClr val="accent1"/>
-    </dgm:linClrLst>
-    <dgm:effectClrLst/>
-    <dgm:txLinClrLst/>
-    <dgm:txFillClrLst/>
-    <dgm:txEffectClrLst/>
-  </dgm:styleLbl>
-  <dgm:styleLbl name="node1">
-    <dgm:fillClrLst meth="repeat">
-      <a:schemeClr val="accent1"/>
-    </dgm:fillClrLst>
-    <dgm:linClrLst meth="repeat">
-      <a:schemeClr val="lt1"/>
-    </dgm:linClrLst>
-    <dgm:effectClrLst/>
-    <dgm:txLinClrLst/>
-    <dgm:txFillClrLst/>
-    <dgm:txEffectClrLst/>
-  </dgm:styleLbl>
-  <dgm:styleLbl name="lnNode1">
-    <dgm:fillClrLst meth="repeat">
-      <a:schemeClr val="accent1"/>
-    </dgm:fillClrLst>
-    <dgm:linClrLst meth="repeat">
-      <a:schemeClr val="lt1"/>
-    </dgm:linClrLst>
-    <dgm:effectClrLst/>
-    <dgm:txLinClrLst/>
-    <dgm:txFillClrLst/>
-    <dgm:txEffectClrLst/>
-  </dgm:styleLbl>
-  <dgm:styleLbl name="vennNode1">
-    <dgm:fillClrLst meth="repeat">
-      <a:schemeClr val="accent1">
-        <a:alpha val="50000"/>
-      </a:schemeClr>
-    </dgm:fillClrLst>
-    <dgm:linClrLst meth="repeat">
-      <a:schemeClr val="lt1"/>
-    </dgm:linClrLst>
-    <dgm:effectClrLst/>
-    <dgm:txLinClrLst/>
-    <dgm:txFillClrLst/>
-    <dgm:txEffectClrLst/>
-  </dgm:styleLbl>
-  <dgm:styleLbl name="node2">
-    <dgm:fillClrLst meth="repeat">
-      <a:schemeClr val="accent1"/>
-    </dgm:fillClrLst>
-    <dgm:linClrLst meth="repeat">
-      <a:schemeClr val="lt1"/>
-    </dgm:linClrLst>
-    <dgm:effectClrLst/>
-    <dgm:txLinClrLst/>
-    <dgm:txFillClrLst/>
-    <dgm:txEffectClrLst/>
-  </dgm:styleLbl>
-  <dgm:styleLbl name="node3">
-    <dgm:fillClrLst meth="repeat">
-      <a:schemeClr val="accent1"/>
-    </dgm:fillClrLst>
-    <dgm:linClrLst meth="repeat">
-      <a:schemeClr val="lt1"/>
-    </dgm:linClrLst>
-    <dgm:effectClrLst/>
-    <dgm:txLinClrLst/>
-    <dgm:txFillClrLst/>
-    <dgm:txEffectClrLst/>
-  </dgm:styleLbl>
-  <dgm:styleLbl name="node4">
-    <dgm:fillClrLst meth="repeat">
-      <a:schemeClr val="accent1"/>
-    </dgm:fillClrLst>
-    <dgm:linClrLst meth="repeat">
-      <a:schemeClr val="lt1"/>
-    </dgm:linClrLst>
-    <dgm:effectClrLst/>
-    <dgm:txLinClrLst/>
-    <dgm:txFillClrLst/>
-    <dgm:txEffectClrLst/>
-  </dgm:styleLbl>
-  <dgm:styleLbl name="fgImgPlace1">
-    <dgm:fillClrLst meth="repeat">
-      <a:schemeClr val="accent1">
-        <a:tint val="50000"/>
-      </a:schemeClr>
-    </dgm:fillClrLst>
-    <dgm:linClrLst meth="repeat">
-      <a:schemeClr val="lt1"/>
-    </dgm:linClrLst>
-    <dgm:effectClrLst/>
-    <dgm:txLinClrLst/>
-    <dgm:txFillClrLst meth="repeat">
-      <a:schemeClr val="lt1"/>
-    </dgm:txFillClrLst>
-    <dgm:txEffectClrLst/>
-  </dgm:styleLbl>
-  <dgm:styleLbl name="alignImgPlace1">
-    <dgm:fillClrLst meth="repeat">
-      <a:schemeClr val="accent1">
-        <a:tint val="50000"/>
-      </a:schemeClr>
-    </dgm:fillClrLst>
-    <dgm:linClrLst meth="repeat">
-      <a:schemeClr val="lt1"/>
-    </dgm:linClrLst>
-    <dgm:effectClrLst/>
-    <dgm:txLinClrLst/>
-    <dgm:txFillClrLst meth="repeat">
-      <a:schemeClr val="lt1"/>
-    </dgm:txFillClrLst>
-    <dgm:txEffectClrLst/>
-  </dgm:styleLbl>
-  <dgm:styleLbl name="bgImgPlace1">
-    <dgm:fillClrLst meth="repeat">
-      <a:schemeClr val="accent1">
-        <a:tint val="50000"/>
-      </a:schemeClr>
-    </dgm:fillClrLst>
-    <dgm:linClrLst meth="repeat">
-      <a:schemeClr val="lt1"/>
-    </dgm:linClrLst>
-    <dgm:effectClrLst/>
-    <dgm:txLinClrLst/>
-    <dgm:txFillClrLst meth="repeat">
-      <a:schemeClr val="lt1"/>
-    </dgm:txFillClrLst>
-    <dgm:txEffectClrLst/>
-  </dgm:styleLbl>
-  <dgm:styleLbl name="sibTrans2D1">
-    <dgm:fillClrLst meth="repeat">
-      <a:schemeClr val="accent1">
-        <a:tint val="60000"/>
-      </a:schemeClr>
-    </dgm:fillClrLst>
-    <dgm:linClrLst meth="repeat">
-      <a:schemeClr val="accent1">
-        <a:tint val="60000"/>
-      </a:schemeClr>
-    </dgm:linClrLst>
-    <dgm:effectClrLst/>
-    <dgm:txLinClrLst/>
-    <dgm:txFillClrLst/>
-    <dgm:txEffectClrLst/>
-  </dgm:styleLbl>
-  <dgm:styleLbl name="fgSibTrans2D1">
-    <dgm:fillClrLst meth="repeat">
-      <a:schemeClr val="accent1">
-        <a:tint val="60000"/>
-      </a:schemeClr>
-    </dgm:fillClrLst>
-    <dgm:linClrLst meth="repeat">
-      <a:schemeClr val="accent1">
-        <a:tint val="60000"/>
-      </a:schemeClr>
-    </dgm:linClrLst>
-    <dgm:effectClrLst/>
-    <dgm:txLinClrLst/>
-    <dgm:txFillClrLst/>
-    <dgm:txEffectClrLst/>
-  </dgm:styleLbl>
-  <dgm:styleLbl name="bgSibTrans2D1">
-    <dgm:fillClrLst meth="repeat">
-      <a:schemeClr val="accent1">
-        <a:tint val="60000"/>
-      </a:schemeClr>
-    </dgm:fillClrLst>
-    <dgm:linClrLst meth="repeat">
-      <a:schemeClr val="accent1">
-        <a:tint val="60000"/>
-      </a:schemeClr>
-    </dgm:linClrLst>
-    <dgm:effectClrLst/>
-    <dgm:txLinClrLst/>
-    <dgm:txFillClrLst/>
-    <dgm:txEffectClrLst/>
-  </dgm:styleLbl>
-  <dgm:styleLbl name="sibTrans1D1">
-    <dgm:fillClrLst meth="repeat">
-      <a:schemeClr val="accent1"/>
-    </dgm:fillClrLst>
-    <dgm:linClrLst meth="repeat">
-      <a:schemeClr val="accent1"/>
-    </dgm:linClrLst>
-    <dgm:effectClrLst/>
-    <dgm:txLinClrLst/>
-    <dgm:txFillClrLst meth="repeat">
-      <a:schemeClr val="tx1"/>
-    </dgm:txFillClrLst>
-    <dgm:txEffectClrLst/>
-  </dgm:styleLbl>
-  <dgm:styleLbl name="callout">
-    <dgm:fillClrLst meth="repeat">
-      <a:schemeClr val="accent1"/>
-    </dgm:fillClrLst>
-    <dgm:linClrLst meth="repeat">
-      <a:schemeClr val="accent1">
-        <a:tint val="50000"/>
-      </a:schemeClr>
-    </dgm:linClrLst>
-    <dgm:effectClrLst/>
-    <dgm:txLinClrLst/>
-    <dgm:txFillClrLst meth="repeat">
-      <a:schemeClr val="tx1"/>
-    </dgm:txFillClrLst>
-    <dgm:txEffectClrLst/>
-  </dgm:styleLbl>
-  <dgm:styleLbl name="asst0">
-    <dgm:fillClrLst meth="repeat">
-      <a:schemeClr val="accent1"/>
-    </dgm:fillClrLst>
-    <dgm:linClrLst meth="repeat">
-      <a:schemeClr val="lt1"/>
-    </dgm:linClrLst>
-    <dgm:effectClrLst/>
-    <dgm:txLinClrLst/>
-    <dgm:txFillClrLst/>
-    <dgm:txEffectClrLst/>
-  </dgm:styleLbl>
-  <dgm:styleLbl name="asst1">
-    <dgm:fillClrLst meth="repeat">
-      <a:schemeClr val="accent1"/>
-    </dgm:fillClrLst>
-    <dgm:linClrLst meth="repeat">
-      <a:schemeClr val="lt1"/>
-    </dgm:linClrLst>
-    <dgm:effectClrLst/>
-    <dgm:txLinClrLst/>
-    <dgm:txFillClrLst/>
-    <dgm:txEffectClrLst/>
-  </dgm:styleLbl>
-  <dgm:styleLbl name="asst2">
-    <dgm:fillClrLst meth="repeat">
-      <a:schemeClr val="accent1"/>
-    </dgm:fillClrLst>
-    <dgm:linClrLst meth="repeat">
-      <a:schemeClr val="lt1"/>
-    </dgm:linClrLst>
-    <dgm:effectClrLst/>
-    <dgm:txLinClrLst/>
-    <dgm:txFillClrLst/>
-    <dgm:txEffectClrLst/>
-  </dgm:styleLbl>
-  <dgm:styleLbl name="asst3">
-    <dgm:fillClrLst meth="repeat">
-      <a:schemeClr val="accent1"/>
-    </dgm:fillClrLst>
-    <dgm:linClrLst meth="repeat">
-      <a:schemeClr val="lt1"/>
-    </dgm:linClrLst>
-    <dgm:effectClrLst/>
-    <dgm:txLinClrLst/>
-    <dgm:txFillClrLst/>
-    <dgm:txEffectClrLst/>
-  </dgm:styleLbl>
-  <dgm:styleLbl name="asst4">
-    <dgm:fillClrLst meth="repeat">
-      <a:schemeClr val="accent1"/>
-    </dgm:fillClrLst>
-    <dgm:linClrLst meth="repeat">
-      <a:schemeClr val="lt1"/>
-    </dgm:linClrLst>
-    <dgm:effectClrLst/>
-    <dgm:txLinClrLst/>
-    <dgm:txFillClrLst/>
-    <dgm:txEffectClrLst/>
-  </dgm:styleLbl>
-  <dgm:styleLbl name="parChTrans2D1">
-    <dgm:fillClrLst meth="repeat">
-      <a:schemeClr val="accent1">
-        <a:tint val="60000"/>
-      </a:schemeClr>
-    </dgm:fillClrLst>
-    <dgm:linClrLst meth="repeat">
-      <a:schemeClr val="accent1">
-        <a:tint val="60000"/>
-      </a:schemeClr>
-    </dgm:linClrLst>
-    <dgm:effectClrLst/>
-    <dgm:txLinClrLst/>
-    <dgm:txFillClrLst meth="repeat">
-      <a:schemeClr val="lt1"/>
-    </dgm:txFillClrLst>
-    <dgm:txEffectClrLst/>
-  </dgm:styleLbl>
-  <dgm:styleLbl name="parChTrans2D2">
-    <dgm:fillClrLst meth="repeat">
-      <a:schemeClr val="accent1"/>
-    </dgm:fillClrLst>
-    <dgm:linClrLst meth="repeat">
-      <a:schemeClr val="accent1"/>
-    </dgm:linClrLst>
-    <dgm:effectClrLst/>
-    <dgm:txLinClrLst/>
-    <dgm:txFillClrLst meth="repeat">
-      <a:schemeClr val="lt1"/>
-    </dgm:txFillClrLst>
-    <dgm:txEffectClrLst/>
-  </dgm:styleLbl>
-  <dgm:styleLbl name="parChTrans2D3">
-    <dgm:fillClrLst meth="repeat">
-      <a:schemeClr val="accent1"/>
-    </dgm:fillClrLst>
-    <dgm:linClrLst meth="repeat">
-      <a:schemeClr val="accent1"/>
-    </dgm:linClrLst>
-    <dgm:effectClrLst/>
-    <dgm:txLinClrLst/>
-    <dgm:txFillClrLst meth="repeat">
-      <a:schemeClr val="lt1"/>
-    </dgm:txFillClrLst>
-    <dgm:txEffectClrLst/>
-  </dgm:styleLbl>
-  <dgm:styleLbl name="parChTrans2D4">
-    <dgm:fillClrLst meth="repeat">
-      <a:schemeClr val="accent1"/>
-    </dgm:fillClrLst>
-    <dgm:linClrLst meth="repeat">
-      <a:schemeClr val="accent1"/>
-    </dgm:linClrLst>
-    <dgm:effectClrLst/>
-    <dgm:txLinClrLst/>
-    <dgm:txFillClrLst meth="repeat">
-      <a:schemeClr val="lt1"/>
-    </dgm:txFillClrLst>
-    <dgm:txEffectClrLst/>
-  </dgm:styleLbl>
-  <dgm:styleLbl name="parChTrans1D1">
-    <dgm:fillClrLst meth="repeat">
-      <a:schemeClr val="accent1"/>
-    </dgm:fillClrLst>
-    <dgm:linClrLst meth="repeat">
-      <a:schemeClr val="accent1">
-        <a:shade val="60000"/>
-      </a:schemeClr>
-    </dgm:linClrLst>
-    <dgm:effectClrLst/>
-    <dgm:txLinClrLst/>
-    <dgm:txFillClrLst meth="repeat">
-      <a:schemeClr val="tx1"/>
-    </dgm:txFillClrLst>
-    <dgm:txEffectClrLst/>
-  </dgm:styleLbl>
-  <dgm:styleLbl name="parChTrans1D2">
-    <dgm:fillClrLst meth="repeat">
-      <a:schemeClr val="accent1"/>
-    </dgm:fillClrLst>
-    <dgm:linClrLst meth="repeat">
-      <a:schemeClr val="accent1">
-        <a:shade val="60000"/>
-      </a:schemeClr>
-    </dgm:linClrLst>
-    <dgm:effectClrLst/>
-    <dgm:txLinClrLst/>
-    <dgm:txFillClrLst meth="repeat">
-      <a:schemeClr val="tx1"/>
-    </dgm:txFillClrLst>
-    <dgm:txEffectClrLst/>
-  </dgm:styleLbl>
-  <dgm:styleLbl name="parChTrans1D3">
-    <dgm:fillClrLst meth="repeat">
-      <a:schemeClr val="accent1"/>
-    </dgm:fillClrLst>
-    <dgm:linClrLst meth="repeat">
-      <a:schemeClr val="accent1">
-        <a:shade val="80000"/>
-      </a:schemeClr>
-    </dgm:linClrLst>
-    <dgm:effectClrLst/>
-    <dgm:txLinClrLst/>
-    <dgm:txFillClrLst meth="repeat">
-      <a:schemeClr val="tx1"/>
-    </dgm:txFillClrLst>
-    <dgm:txEffectClrLst/>
-  </dgm:styleLbl>
-  <dgm:styleLbl name="parChTrans1D4">
-    <dgm:fillClrLst meth="repeat">
-      <a:schemeClr val="accent1"/>
-    </dgm:fillClrLst>
-    <dgm:linClrLst meth="repeat">
-      <a:schemeClr val="accent1">
-        <a:shade val="80000"/>
-      </a:schemeClr>
-    </dgm:linClrLst>
-    <dgm:effectClrLst/>
-    <dgm:txLinClrLst/>
-    <dgm:txFillClrLst meth="repeat">
-      <a:schemeClr val="tx1"/>
-    </dgm:txFillClrLst>
-    <dgm:txEffectClrLst/>
-  </dgm:styleLbl>
-  <dgm:styleLbl name="fgAcc1">
-    <dgm:fillClrLst meth="repeat">
-      <a:schemeClr val="lt1">
-        <a:alpha val="90000"/>
-      </a:schemeClr>
-    </dgm:fillClrLst>
-    <dgm:linClrLst meth="repeat">
-      <a:schemeClr val="accent1"/>
-    </dgm:linClrLst>
-    <dgm:effectClrLst/>
-    <dgm:txLinClrLst/>
-    <dgm:txFillClrLst meth="repeat">
-      <a:schemeClr val="dk1"/>
-    </dgm:txFillClrLst>
-    <dgm:txEffectClrLst/>
-  </dgm:styleLbl>
-  <dgm:styleLbl name="conFgAcc1">
-    <dgm:fillClrLst meth="repeat">
-      <a:schemeClr val="lt1">
-        <a:alpha val="90000"/>
-      </a:schemeClr>
-    </dgm:fillClrLst>
-    <dgm:linClrLst meth="repeat">
-      <a:schemeClr val="accent1"/>
-    </dgm:linClrLst>
-    <dgm:effectClrLst/>
-    <dgm:txLinClrLst/>
-    <dgm:txFillClrLst meth="repeat">
-      <a:schemeClr val="dk1"/>
-    </dgm:txFillClrLst>
-    <dgm:txEffectClrLst/>
-  </dgm:styleLbl>
-  <dgm:styleLbl name="alignAcc1">
-    <dgm:fillClrLst meth="repeat">
-      <a:schemeClr val="lt1">
-        <a:alpha val="90000"/>
-      </a:schemeClr>
-    </dgm:fillClrLst>
-    <dgm:linClrLst meth="repeat">
-      <a:schemeClr val="accent1"/>
-    </dgm:linClrLst>
-    <dgm:effectClrLst/>
-    <dgm:txLinClrLst/>
-    <dgm:txFillClrLst meth="repeat">
-      <a:schemeClr val="dk1"/>
-    </dgm:txFillClrLst>
-    <dgm:txEffectClrLst/>
-  </dgm:styleLbl>
-  <dgm:styleLbl name="trAlignAcc1">
-    <dgm:fillClrLst meth="repeat">
-      <a:schemeClr val="lt1">
-        <a:alpha val="40000"/>
-      </a:schemeClr>
-    </dgm:fillClrLst>
-    <dgm:linClrLst meth="repeat">
-      <a:schemeClr val="accent1"/>
-    </dgm:linClrLst>
-    <dgm:effectClrLst/>
-    <dgm:txLinClrLst/>
-    <dgm:txFillClrLst meth="repeat">
-      <a:schemeClr val="dk1"/>
-    </dgm:txFillClrLst>
-    <dgm:txEffectClrLst/>
-  </dgm:styleLbl>
-  <dgm:styleLbl name="bgAcc1">
-    <dgm:fillClrLst meth="repeat">
-      <a:schemeClr val="lt1">
-        <a:alpha val="90000"/>
-      </a:schemeClr>
-    </dgm:fillClrLst>
-    <dgm:linClrLst meth="repeat">
-      <a:schemeClr val="accent1"/>
-    </dgm:linClrLst>
-    <dgm:effectClrLst/>
-    <dgm:txLinClrLst/>
-    <dgm:txFillClrLst meth="repeat">
-      <a:schemeClr val="dk1"/>
-    </dgm:txFillClrLst>
-    <dgm:txEffectClrLst/>
-  </dgm:styleLbl>
-  <dgm:styleLbl name="solidFgAcc1">
-    <dgm:fillClrLst meth="repeat">
-      <a:schemeClr val="lt1"/>
-    </dgm:fillClrLst>
-    <dgm:linClrLst meth="repeat">
-      <a:schemeClr val="accent1"/>
-    </dgm:linClrLst>
-    <dgm:effectClrLst/>
-    <dgm:txLinClrLst/>
-    <dgm:txFillClrLst meth="repeat">
-      <a:schemeClr val="dk1"/>
-    </dgm:txFillClrLst>
-    <dgm:txEffectClrLst/>
-  </dgm:styleLbl>
-  <dgm:styleLbl name="solidAlignAcc1">
-    <dgm:fillClrLst meth="repeat">
-      <a:schemeClr val="lt1"/>
-    </dgm:fillClrLst>
-    <dgm:linClrLst meth="repeat">
-      <a:schemeClr val="accent1"/>
-    </dgm:linClrLst>
-    <dgm:effectClrLst/>
-    <dgm:txLinClrLst/>
-    <dgm:txFillClrLst meth="repeat">
-      <a:schemeClr val="dk1"/>
-    </dgm:txFillClrLst>
-    <dgm:txEffectClrLst/>
-  </dgm:styleLbl>
-  <dgm:styleLbl name="solidBgAcc1">
-    <dgm:fillClrLst meth="repeat">
-      <a:schemeClr val="lt1"/>
-    </dgm:fillClrLst>
-    <dgm:linClrLst meth="repeat">
-      <a:schemeClr val="accent1"/>
-    </dgm:linClrLst>
-    <dgm:effectClrLst/>
-    <dgm:txLinClrLst/>
-    <dgm:txFillClrLst meth="repeat">
-      <a:schemeClr val="dk1"/>
-    </dgm:txFillClrLst>
-    <dgm:txEffectClrLst/>
-  </dgm:styleLbl>
-  <dgm:styleLbl name="fgAccFollowNode1">
-    <dgm:fillClrLst meth="repeat">
-      <a:schemeClr val="accent1">
-        <a:alpha val="90000"/>
-        <a:tint val="40000"/>
-      </a:schemeClr>
-    </dgm:fillClrLst>
-    <dgm:linClrLst meth="repeat">
-      <a:schemeClr val="accent1">
-        <a:alpha val="90000"/>
-        <a:tint val="40000"/>
-      </a:schemeClr>
-    </dgm:linClrLst>
-    <dgm:effectClrLst/>
-    <dgm:txLinClrLst/>
-    <dgm:txFillClrLst meth="repeat">
-      <a:schemeClr val="dk1"/>
-    </dgm:txFillClrLst>
-    <dgm:txEffectClrLst/>
-  </dgm:styleLbl>
-  <dgm:styleLbl name="alignAccFollowNode1">
-    <dgm:fillClrLst meth="repeat">
-      <a:schemeClr val="accent1">
-        <a:alpha val="90000"/>
-        <a:tint val="40000"/>
-      </a:schemeClr>
-    </dgm:fillClrLst>
-    <dgm:linClrLst meth="repeat">
-      <a:schemeClr val="accent1">
-        <a:alpha val="90000"/>
-        <a:tint val="40000"/>
-      </a:schemeClr>
-    </dgm:linClrLst>
-    <dgm:effectClrLst/>
-    <dgm:txLinClrLst/>
-    <dgm:txFillClrLst meth="repeat">
-      <a:schemeClr val="dk1"/>
-    </dgm:txFillClrLst>
-    <dgm:txEffectClrLst/>
-  </dgm:styleLbl>
-  <dgm:styleLbl name="bgAccFollowNode1">
-    <dgm:fillClrLst meth="repeat">
-      <a:schemeClr val="accent1">
-        <a:alpha val="90000"/>
-        <a:tint val="40000"/>
-      </a:schemeClr>
-    </dgm:fillClrLst>
-    <dgm:linClrLst meth="repeat">
-      <a:schemeClr val="accent1">
-        <a:alpha val="90000"/>
-        <a:tint val="40000"/>
-      </a:schemeClr>
-    </dgm:linClrLst>
-    <dgm:effectClrLst/>
-    <dgm:txLinClrLst/>
-    <dgm:txFillClrLst meth="repeat">
-      <a:schemeClr val="dk1"/>
-    </dgm:txFillClrLst>
-    <dgm:txEffectClrLst/>
-  </dgm:styleLbl>
-  <dgm:styleLbl name="fgAcc0">
-    <dgm:fillClrLst meth="repeat">
-      <a:schemeClr val="lt1">
-        <a:alpha val="90000"/>
-      </a:schemeClr>
-    </dgm:fillClrLst>
-    <dgm:linClrLst meth="repeat">
-      <a:schemeClr val="accent1"/>
-    </dgm:linClrLst>
-    <dgm:effectClrLst/>
-    <dgm:txLinClrLst/>
-    <dgm:txFillClrLst meth="repeat">
-      <a:schemeClr val="dk1"/>
-    </dgm:txFillClrLst>
-    <dgm:txEffectClrLst/>
-  </dgm:styleLbl>
-  <dgm:styleLbl name="fgAcc2">
-    <dgm:fillClrLst meth="repeat">
-      <a:schemeClr val="lt1">
-        <a:alpha val="90000"/>
-      </a:schemeClr>
-    </dgm:fillClrLst>
-    <dgm:linClrLst meth="repeat">
-      <a:schemeClr val="accent1"/>
-    </dgm:linClrLst>
-    <dgm:effectClrLst/>
-    <dgm:txLinClrLst/>
-    <dgm:txFillClrLst meth="repeat">
-      <a:schemeClr val="dk1"/>
-    </dgm:txFillClrLst>
-    <dgm:txEffectClrLst/>
-  </dgm:styleLbl>
-  <dgm:styleLbl name="fgAcc3">
-    <dgm:fillClrLst meth="repeat">
-      <a:schemeClr val="lt1">
-        <a:alpha val="90000"/>
-      </a:schemeClr>
-    </dgm:fillClrLst>
-    <dgm:linClrLst meth="repeat">
-      <a:schemeClr val="accent1"/>
-    </dgm:linClrLst>
-    <dgm:effectClrLst/>
-    <dgm:txLinClrLst/>
-    <dgm:txFillClrLst meth="repeat">
-      <a:schemeClr val="dk1"/>
-    </dgm:txFillClrLst>
-    <dgm:txEffectClrLst/>
-  </dgm:styleLbl>
-  <dgm:styleLbl name="fgAcc4">
-    <dgm:fillClrLst meth="repeat">
-      <a:schemeClr val="lt1">
-        <a:alpha val="90000"/>
-      </a:schemeClr>
-    </dgm:fillClrLst>
-    <dgm:linClrLst meth="repeat">
-      <a:schemeClr val="accent1"/>
-    </dgm:linClrLst>
-    <dgm:effectClrLst/>
-    <dgm:txLinClrLst/>
-    <dgm:txFillClrLst meth="repeat">
-      <a:schemeClr val="dk1"/>
-    </dgm:txFillClrLst>
-    <dgm:txEffectClrLst/>
-  </dgm:styleLbl>
-  <dgm:styleLbl name="bgShp">
-    <dgm:fillClrLst meth="repeat">
-      <a:schemeClr val="accent1">
-        <a:tint val="40000"/>
-      </a:schemeClr>
-    </dgm:fillClrLst>
-    <dgm:linClrLst meth="repeat">
-      <a:schemeClr val="accent1"/>
-    </dgm:linClrLst>
-    <dgm:effectClrLst/>
-    <dgm:txLinClrLst/>
-    <dgm:txFillClrLst meth="repeat">
-      <a:schemeClr val="dk1"/>
-    </dgm:txFillClrLst>
-    <dgm:txEffectClrLst/>
-  </dgm:styleLbl>
-  <dgm:styleLbl name="dkBgShp">
-    <dgm:fillClrLst meth="repeat">
-      <a:schemeClr val="accent1">
-        <a:shade val="80000"/>
-      </a:schemeClr>
-    </dgm:fillClrLst>
-    <dgm:linClrLst meth="repeat">
-      <a:schemeClr val="accent1"/>
-    </dgm:linClrLst>
-    <dgm:effectClrLst/>
-    <dgm:txLinClrLst/>
-    <dgm:txFillClrLst meth="repeat">
-      <a:schemeClr val="lt1"/>
-    </dgm:txFillClrLst>
-    <dgm:txEffectClrLst/>
-  </dgm:styleLbl>
-  <dgm:styleLbl name="trBgShp">
-    <dgm:fillClrLst meth="repeat">
-      <a:schemeClr val="accent1">
-        <a:tint val="50000"/>
-        <a:alpha val="40000"/>
-      </a:schemeClr>
-    </dgm:fillClrLst>
-    <dgm:linClrLst meth="repeat">
-      <a:schemeClr val="accent1"/>
-    </dgm:linClrLst>
-    <dgm:effectClrLst/>
-    <dgm:txLinClrLst/>
-    <dgm:txFillClrLst meth="repeat">
-      <a:schemeClr val="lt1"/>
-    </dgm:txFillClrLst>
-    <dgm:txEffectClrLst/>
-  </dgm:styleLbl>
-  <dgm:styleLbl name="fgShp">
-    <dgm:fillClrLst meth="repeat">
-      <a:schemeClr val="accent1">
-        <a:tint val="60000"/>
-      </a:schemeClr>
-    </dgm:fillClrLst>
-    <dgm:linClrLst meth="repeat">
-      <a:schemeClr val="lt1"/>
-    </dgm:linClrLst>
-    <dgm:effectClrLst/>
-    <dgm:txLinClrLst/>
-    <dgm:txFillClrLst meth="repeat">
-      <a:schemeClr val="dk1"/>
-    </dgm:txFillClrLst>
-    <dgm:txEffectClrLst/>
-  </dgm:styleLbl>
-  <dgm:styleLbl name="revTx">
-    <dgm:fillClrLst meth="repeat">
-      <a:schemeClr val="lt1">
-        <a:alpha val="0"/>
-      </a:schemeClr>
-    </dgm:fillClrLst>
-    <dgm:linClrLst meth="repeat">
-      <a:schemeClr val="dk1">
-        <a:alpha val="0"/>
-      </a:schemeClr>
-    </dgm:linClrLst>
-    <dgm:effectClrLst/>
-    <dgm:txLinClrLst/>
-    <dgm:txFillClrLst meth="repeat">
-      <a:schemeClr val="tx1"/>
-    </dgm:txFillClrLst>
-    <dgm:txEffectClrLst/>
-  </dgm:styleLbl>
-</dgm:colorsDef>
-</file>
-
-<file path=ppt/diagrams/colors2.xml><?xml version="1.0" encoding="utf-8"?>
 <dgm:colorsDef xmlns:dgm="http://schemas.openxmlformats.org/drawingml/2006/diagram" xmlns:a="http://schemas.openxmlformats.org/drawingml/2006/main" uniqueId="urn:microsoft.com/office/officeart/2005/8/colors/accent1_2">
   <dgm:title val=""/>
   <dgm:desc val=""/>
@@ -4731,1143 +3983,6 @@
 <file path=ppt/diagrams/data2.xml><?xml version="1.0" encoding="utf-8"?>
 <dgm:dataModel xmlns:dgm="http://schemas.openxmlformats.org/drawingml/2006/diagram" xmlns:a="http://schemas.openxmlformats.org/drawingml/2006/main">
   <dgm:ptLst>
-    <dgm:pt modelId="{67C4C166-1694-4082-AD86-17AC184B67AE}" type="doc">
-      <dgm:prSet loTypeId="urn:microsoft.com/office/officeart/2008/layout/PictureStrips" loCatId="list" qsTypeId="urn:microsoft.com/office/officeart/2005/8/quickstyle/simple1" qsCatId="simple" csTypeId="urn:microsoft.com/office/officeart/2005/8/colors/accent1_2" csCatId="accent1" phldr="1"/>
-      <dgm:spPr/>
-      <dgm:t>
-        <a:bodyPr/>
-        <a:lstStyle/>
-        <a:p>
-          <a:endParaRPr lang="en-US"/>
-        </a:p>
-      </dgm:t>
-    </dgm:pt>
-    <dgm:pt modelId="{E728C00E-A1AA-4739-8323-29D761CFF3E6}">
-      <dgm:prSet phldrT="[Text]" custT="1"/>
-      <dgm:spPr>
-        <a:blipFill>
-          <a:blip xmlns:r="http://schemas.openxmlformats.org/officeDocument/2006/relationships" r:embed="rId1"/>
-          <a:stretch>
-            <a:fillRect r="-1611" b="-3433"/>
-          </a:stretch>
-        </a:blipFill>
-      </dgm:spPr>
-      <dgm:t>
-        <a:bodyPr/>
-        <a:lstStyle/>
-        <a:p>
-          <a:r>
-            <a:rPr lang="en-US">
-              <a:noFill/>
-            </a:rPr>
-            <a:t> </a:t>
-          </a:r>
-        </a:p>
-      </dgm:t>
-    </dgm:pt>
-    <dgm:pt modelId="{FE19B27C-0380-420F-939D-5E3861139F89}" type="parTrans" cxnId="{9E3B8696-BF9E-4C83-BB64-82B06A1ECB38}">
-      <dgm:prSet/>
-      <dgm:spPr/>
-      <dgm:t>
-        <a:bodyPr/>
-        <a:lstStyle/>
-        <a:p>
-          <a:endParaRPr lang="en-US"/>
-        </a:p>
-      </dgm:t>
-    </dgm:pt>
-    <dgm:pt modelId="{175A6747-9761-4569-91D2-FBFBDE38172A}" type="sibTrans" cxnId="{9E3B8696-BF9E-4C83-BB64-82B06A1ECB38}">
-      <dgm:prSet/>
-      <dgm:spPr/>
-      <dgm:t>
-        <a:bodyPr/>
-        <a:lstStyle/>
-        <a:p>
-          <a:endParaRPr lang="en-US"/>
-        </a:p>
-      </dgm:t>
-    </dgm:pt>
-    <dgm:pt modelId="{52B1B63E-41E2-4467-9680-00C3F61C48E1}">
-      <dgm:prSet phldrT="[Text]" custT="1"/>
-      <dgm:spPr>
-        <a:blipFill>
-          <a:blip xmlns:r="http://schemas.openxmlformats.org/officeDocument/2006/relationships" r:embed="rId2"/>
-          <a:stretch>
-            <a:fillRect r="-5876" b="-3879"/>
-          </a:stretch>
-        </a:blipFill>
-      </dgm:spPr>
-      <dgm:t>
-        <a:bodyPr/>
-        <a:lstStyle/>
-        <a:p>
-          <a:r>
-            <a:rPr lang="en-US">
-              <a:noFill/>
-            </a:rPr>
-            <a:t> </a:t>
-          </a:r>
-        </a:p>
-      </dgm:t>
-    </dgm:pt>
-    <dgm:pt modelId="{BD4F415B-843C-472A-927E-46FB71C1D576}" type="parTrans" cxnId="{0029EC16-20F9-4E88-B8BE-F6E87CE65DAB}">
-      <dgm:prSet/>
-      <dgm:spPr/>
-      <dgm:t>
-        <a:bodyPr/>
-        <a:lstStyle/>
-        <a:p>
-          <a:endParaRPr lang="en-US"/>
-        </a:p>
-      </dgm:t>
-    </dgm:pt>
-    <dgm:pt modelId="{FC372CDE-1FA8-43CD-92BF-BE02F8431239}" type="sibTrans" cxnId="{0029EC16-20F9-4E88-B8BE-F6E87CE65DAB}">
-      <dgm:prSet/>
-      <dgm:spPr/>
-      <dgm:t>
-        <a:bodyPr/>
-        <a:lstStyle/>
-        <a:p>
-          <a:endParaRPr lang="en-US"/>
-        </a:p>
-      </dgm:t>
-    </dgm:pt>
-    <dgm:pt modelId="{1D49A373-EC73-423C-844B-BB0FDA7F3F87}">
-      <dgm:prSet phldrT="[Text]" custT="1"/>
-      <dgm:spPr>
-        <a:blipFill>
-          <a:blip xmlns:r="http://schemas.openxmlformats.org/officeDocument/2006/relationships" r:embed="rId3"/>
-          <a:stretch>
-            <a:fillRect t="-429" r="-3907" b="-2146"/>
-          </a:stretch>
-        </a:blipFill>
-      </dgm:spPr>
-      <dgm:t>
-        <a:bodyPr/>
-        <a:lstStyle/>
-        <a:p>
-          <a:r>
-            <a:rPr lang="en-US">
-              <a:noFill/>
-            </a:rPr>
-            <a:t> </a:t>
-          </a:r>
-        </a:p>
-      </dgm:t>
-    </dgm:pt>
-    <dgm:pt modelId="{05E9ABBD-2272-4340-91AE-8AAE86129038}" type="parTrans" cxnId="{4DD332DA-5D47-4685-9556-1CFFEC287F4E}">
-      <dgm:prSet/>
-      <dgm:spPr/>
-      <dgm:t>
-        <a:bodyPr/>
-        <a:lstStyle/>
-        <a:p>
-          <a:endParaRPr lang="en-US"/>
-        </a:p>
-      </dgm:t>
-    </dgm:pt>
-    <dgm:pt modelId="{CC193482-8CD0-4661-A815-DC4D9FE65D61}" type="sibTrans" cxnId="{4DD332DA-5D47-4685-9556-1CFFEC287F4E}">
-      <dgm:prSet/>
-      <dgm:spPr/>
-      <dgm:t>
-        <a:bodyPr/>
-        <a:lstStyle/>
-        <a:p>
-          <a:endParaRPr lang="en-US"/>
-        </a:p>
-      </dgm:t>
-    </dgm:pt>
-    <dgm:pt modelId="{C9B5D593-18E5-4DAB-897B-F8DF3F5C987A}" type="pres">
-      <dgm:prSet presAssocID="{67C4C166-1694-4082-AD86-17AC184B67AE}" presName="Name0" presStyleCnt="0">
-        <dgm:presLayoutVars>
-          <dgm:dir/>
-          <dgm:resizeHandles val="exact"/>
-        </dgm:presLayoutVars>
-      </dgm:prSet>
-      <dgm:spPr/>
-    </dgm:pt>
-    <dgm:pt modelId="{9469D957-E1DE-49A7-B257-109A5BFBD013}" type="pres">
-      <dgm:prSet presAssocID="{E728C00E-A1AA-4739-8323-29D761CFF3E6}" presName="composite" presStyleCnt="0"/>
-      <dgm:spPr/>
-    </dgm:pt>
-    <dgm:pt modelId="{66D0A532-B7B6-4C55-9E1C-ACF9BEE3BB5E}" type="pres">
-      <dgm:prSet presAssocID="{E728C00E-A1AA-4739-8323-29D761CFF3E6}" presName="rect1" presStyleLbl="trAlignAcc1" presStyleIdx="0" presStyleCnt="3" custScaleX="125782" custLinFactNeighborX="12883" custLinFactNeighborY="-3184">
-        <dgm:presLayoutVars>
-          <dgm:bulletEnabled val="1"/>
-        </dgm:presLayoutVars>
-      </dgm:prSet>
-      <dgm:spPr/>
-    </dgm:pt>
-    <dgm:pt modelId="{F10D4FFD-8F5B-4F36-A144-518F5A90FF3D}" type="pres">
-      <dgm:prSet presAssocID="{E728C00E-A1AA-4739-8323-29D761CFF3E6}" presName="rect2" presStyleLbl="fgImgPlace1" presStyleIdx="0" presStyleCnt="3" custScaleX="236890" custLinFactX="-71073" custLinFactNeighborX="-100000" custLinFactNeighborY="5529"/>
-      <dgm:spPr>
-        <a:blipFill>
-          <a:blip xmlns:r="http://schemas.openxmlformats.org/officeDocument/2006/relationships" r:embed="rId4">
-            <a:extLst>
-              <a:ext uri="{28A0092B-C50C-407E-A947-70E740481C1C}">
-                <a14:useLocalDpi xmlns:a14="http://schemas.microsoft.com/office/drawing/2010/main" val="0"/>
-              </a:ext>
-            </a:extLst>
-          </a:blip>
-          <a:srcRect/>
-          <a:stretch>
-            <a:fillRect t="-40000" b="-40000"/>
-          </a:stretch>
-        </a:blipFill>
-      </dgm:spPr>
-    </dgm:pt>
-    <dgm:pt modelId="{2855697A-E96B-4D1C-BA1B-645345D52C4F}" type="pres">
-      <dgm:prSet presAssocID="{175A6747-9761-4569-91D2-FBFBDE38172A}" presName="sibTrans" presStyleCnt="0"/>
-      <dgm:spPr/>
-    </dgm:pt>
-    <dgm:pt modelId="{A183990E-73CE-4F34-8E74-D6147BC92A1C}" type="pres">
-      <dgm:prSet presAssocID="{52B1B63E-41E2-4467-9680-00C3F61C48E1}" presName="composite" presStyleCnt="0"/>
-      <dgm:spPr/>
-    </dgm:pt>
-    <dgm:pt modelId="{94FF6EB2-8032-46F0-A7F4-2F56FD9838D0}" type="pres">
-      <dgm:prSet presAssocID="{52B1B63E-41E2-4467-9680-00C3F61C48E1}" presName="rect1" presStyleLbl="trAlignAcc1" presStyleIdx="1" presStyleCnt="3" custScaleX="128787" custScaleY="99530" custLinFactNeighborX="13996" custLinFactNeighborY="-3720">
-        <dgm:presLayoutVars>
-          <dgm:bulletEnabled val="1"/>
-        </dgm:presLayoutVars>
-      </dgm:prSet>
-      <dgm:spPr/>
-    </dgm:pt>
-    <dgm:pt modelId="{C894DC1D-3BF3-4731-9FC4-ED1F118B5765}" type="pres">
-      <dgm:prSet presAssocID="{52B1B63E-41E2-4467-9680-00C3F61C48E1}" presName="rect2" presStyleLbl="fgImgPlace1" presStyleIdx="1" presStyleCnt="3" custScaleX="235256" custLinFactX="-71073" custLinFactNeighborX="-100000" custLinFactNeighborY="5137"/>
-      <dgm:spPr>
-        <a:blipFill>
-          <a:blip xmlns:r="http://schemas.openxmlformats.org/officeDocument/2006/relationships" r:embed="rId5">
-            <a:extLst>
-              <a:ext uri="{28A0092B-C50C-407E-A947-70E740481C1C}">
-                <a14:useLocalDpi xmlns:a14="http://schemas.microsoft.com/office/drawing/2010/main" val="0"/>
-              </a:ext>
-            </a:extLst>
-          </a:blip>
-          <a:srcRect/>
-          <a:stretch>
-            <a:fillRect t="-40000" b="-40000"/>
-          </a:stretch>
-        </a:blipFill>
-      </dgm:spPr>
-    </dgm:pt>
-    <dgm:pt modelId="{3D4B0FF5-A018-474D-BC99-526BEE3507B4}" type="pres">
-      <dgm:prSet presAssocID="{FC372CDE-1FA8-43CD-92BF-BE02F8431239}" presName="sibTrans" presStyleCnt="0"/>
-      <dgm:spPr/>
-    </dgm:pt>
-    <dgm:pt modelId="{73FFDB61-AB75-442B-8F1A-DD5089CC152C}" type="pres">
-      <dgm:prSet presAssocID="{1D49A373-EC73-423C-844B-BB0FDA7F3F87}" presName="composite" presStyleCnt="0"/>
-      <dgm:spPr/>
-    </dgm:pt>
-    <dgm:pt modelId="{0B494733-9138-43DE-B904-543A92E88131}" type="pres">
-      <dgm:prSet presAssocID="{1D49A373-EC73-423C-844B-BB0FDA7F3F87}" presName="rect1" presStyleLbl="trAlignAcc1" presStyleIdx="2" presStyleCnt="3" custScaleX="127844" custLinFactNeighborX="13703" custLinFactNeighborY="941">
-        <dgm:presLayoutVars>
-          <dgm:bulletEnabled val="1"/>
-        </dgm:presLayoutVars>
-      </dgm:prSet>
-      <dgm:spPr/>
-    </dgm:pt>
-    <dgm:pt modelId="{114784D1-D9A3-4A0E-A0E7-3563F0DD5AD5}" type="pres">
-      <dgm:prSet presAssocID="{1D49A373-EC73-423C-844B-BB0FDA7F3F87}" presName="rect2" presStyleLbl="fgImgPlace1" presStyleIdx="2" presStyleCnt="3" custScaleX="235741" custLinFactX="-71073" custLinFactNeighborX="-100000" custLinFactNeighborY="9942"/>
-      <dgm:spPr>
-        <a:blipFill>
-          <a:blip xmlns:r="http://schemas.openxmlformats.org/officeDocument/2006/relationships" r:embed="rId6">
-            <a:extLst>
-              <a:ext uri="{28A0092B-C50C-407E-A947-70E740481C1C}">
-                <a14:useLocalDpi xmlns:a14="http://schemas.microsoft.com/office/drawing/2010/main" val="0"/>
-              </a:ext>
-            </a:extLst>
-          </a:blip>
-          <a:srcRect/>
-          <a:stretch>
-            <a:fillRect t="-30000" b="-30000"/>
-          </a:stretch>
-        </a:blipFill>
-      </dgm:spPr>
-    </dgm:pt>
-  </dgm:ptLst>
-  <dgm:cxnLst>
-    <dgm:cxn modelId="{0029EC16-20F9-4E88-B8BE-F6E87CE65DAB}" srcId="{67C4C166-1694-4082-AD86-17AC184B67AE}" destId="{52B1B63E-41E2-4467-9680-00C3F61C48E1}" srcOrd="1" destOrd="0" parTransId="{BD4F415B-843C-472A-927E-46FB71C1D576}" sibTransId="{FC372CDE-1FA8-43CD-92BF-BE02F8431239}"/>
-    <dgm:cxn modelId="{9E3B8696-BF9E-4C83-BB64-82B06A1ECB38}" srcId="{67C4C166-1694-4082-AD86-17AC184B67AE}" destId="{E728C00E-A1AA-4739-8323-29D761CFF3E6}" srcOrd="0" destOrd="0" parTransId="{FE19B27C-0380-420F-939D-5E3861139F89}" sibTransId="{175A6747-9761-4569-91D2-FBFBDE38172A}"/>
-    <dgm:cxn modelId="{9B2A5FB2-A76D-459F-AF4A-8F2A6E96AABA}" type="presOf" srcId="{E728C00E-A1AA-4739-8323-29D761CFF3E6}" destId="{66D0A532-B7B6-4C55-9E1C-ACF9BEE3BB5E}" srcOrd="0" destOrd="0" presId="urn:microsoft.com/office/officeart/2008/layout/PictureStrips"/>
-    <dgm:cxn modelId="{0554AF91-C84E-47F1-896C-76E70DB00365}" type="presOf" srcId="{1D49A373-EC73-423C-844B-BB0FDA7F3F87}" destId="{0B494733-9138-43DE-B904-543A92E88131}" srcOrd="0" destOrd="0" presId="urn:microsoft.com/office/officeart/2008/layout/PictureStrips"/>
-    <dgm:cxn modelId="{AA51EC0D-46F1-4A9B-AE2B-13C245219792}" type="presOf" srcId="{67C4C166-1694-4082-AD86-17AC184B67AE}" destId="{C9B5D593-18E5-4DAB-897B-F8DF3F5C987A}" srcOrd="0" destOrd="0" presId="urn:microsoft.com/office/officeart/2008/layout/PictureStrips"/>
-    <dgm:cxn modelId="{799CEF44-01D8-4EA0-A387-D1DC3EDEFCF4}" type="presOf" srcId="{52B1B63E-41E2-4467-9680-00C3F61C48E1}" destId="{94FF6EB2-8032-46F0-A7F4-2F56FD9838D0}" srcOrd="0" destOrd="0" presId="urn:microsoft.com/office/officeart/2008/layout/PictureStrips"/>
-    <dgm:cxn modelId="{4DD332DA-5D47-4685-9556-1CFFEC287F4E}" srcId="{67C4C166-1694-4082-AD86-17AC184B67AE}" destId="{1D49A373-EC73-423C-844B-BB0FDA7F3F87}" srcOrd="2" destOrd="0" parTransId="{05E9ABBD-2272-4340-91AE-8AAE86129038}" sibTransId="{CC193482-8CD0-4661-A815-DC4D9FE65D61}"/>
-    <dgm:cxn modelId="{6349224D-CBF4-4137-9C46-A9FFB36F8326}" type="presParOf" srcId="{C9B5D593-18E5-4DAB-897B-F8DF3F5C987A}" destId="{9469D957-E1DE-49A7-B257-109A5BFBD013}" srcOrd="0" destOrd="0" presId="urn:microsoft.com/office/officeart/2008/layout/PictureStrips"/>
-    <dgm:cxn modelId="{BD2675FD-A595-426D-9454-4DA5B3FD39AB}" type="presParOf" srcId="{9469D957-E1DE-49A7-B257-109A5BFBD013}" destId="{66D0A532-B7B6-4C55-9E1C-ACF9BEE3BB5E}" srcOrd="0" destOrd="0" presId="urn:microsoft.com/office/officeart/2008/layout/PictureStrips"/>
-    <dgm:cxn modelId="{A700A8C7-6AA9-41F5-B97F-940802E42409}" type="presParOf" srcId="{9469D957-E1DE-49A7-B257-109A5BFBD013}" destId="{F10D4FFD-8F5B-4F36-A144-518F5A90FF3D}" srcOrd="1" destOrd="0" presId="urn:microsoft.com/office/officeart/2008/layout/PictureStrips"/>
-    <dgm:cxn modelId="{7AE69B1C-9641-455C-8835-01096E239644}" type="presParOf" srcId="{C9B5D593-18E5-4DAB-897B-F8DF3F5C987A}" destId="{2855697A-E96B-4D1C-BA1B-645345D52C4F}" srcOrd="1" destOrd="0" presId="urn:microsoft.com/office/officeart/2008/layout/PictureStrips"/>
-    <dgm:cxn modelId="{4B9C076F-C283-420B-B9CA-065CF748BACF}" type="presParOf" srcId="{C9B5D593-18E5-4DAB-897B-F8DF3F5C987A}" destId="{A183990E-73CE-4F34-8E74-D6147BC92A1C}" srcOrd="2" destOrd="0" presId="urn:microsoft.com/office/officeart/2008/layout/PictureStrips"/>
-    <dgm:cxn modelId="{671A6A90-3500-4FB4-AB9F-D0D8C891D45F}" type="presParOf" srcId="{A183990E-73CE-4F34-8E74-D6147BC92A1C}" destId="{94FF6EB2-8032-46F0-A7F4-2F56FD9838D0}" srcOrd="0" destOrd="0" presId="urn:microsoft.com/office/officeart/2008/layout/PictureStrips"/>
-    <dgm:cxn modelId="{27DCA281-3F04-478A-BC1A-54D095B33493}" type="presParOf" srcId="{A183990E-73CE-4F34-8E74-D6147BC92A1C}" destId="{C894DC1D-3BF3-4731-9FC4-ED1F118B5765}" srcOrd="1" destOrd="0" presId="urn:microsoft.com/office/officeart/2008/layout/PictureStrips"/>
-    <dgm:cxn modelId="{DF935BA9-3AC5-459E-ADC6-BE2B8298CCF3}" type="presParOf" srcId="{C9B5D593-18E5-4DAB-897B-F8DF3F5C987A}" destId="{3D4B0FF5-A018-474D-BC99-526BEE3507B4}" srcOrd="3" destOrd="0" presId="urn:microsoft.com/office/officeart/2008/layout/PictureStrips"/>
-    <dgm:cxn modelId="{71C213BB-8516-4649-84BE-48E75BB0F488}" type="presParOf" srcId="{C9B5D593-18E5-4DAB-897B-F8DF3F5C987A}" destId="{73FFDB61-AB75-442B-8F1A-DD5089CC152C}" srcOrd="4" destOrd="0" presId="urn:microsoft.com/office/officeart/2008/layout/PictureStrips"/>
-    <dgm:cxn modelId="{5B01EF25-454B-44EA-A677-632052B47B43}" type="presParOf" srcId="{73FFDB61-AB75-442B-8F1A-DD5089CC152C}" destId="{0B494733-9138-43DE-B904-543A92E88131}" srcOrd="0" destOrd="0" presId="urn:microsoft.com/office/officeart/2008/layout/PictureStrips"/>
-    <dgm:cxn modelId="{C9FF04AB-E03F-40D6-94E3-5C04B2C2E2DF}" type="presParOf" srcId="{73FFDB61-AB75-442B-8F1A-DD5089CC152C}" destId="{114784D1-D9A3-4A0E-A0E7-3563F0DD5AD5}" srcOrd="1" destOrd="0" presId="urn:microsoft.com/office/officeart/2008/layout/PictureStrips"/>
-  </dgm:cxnLst>
-  <dgm:bg/>
-  <dgm:whole/>
-  <dgm:extLst>
-    <a:ext uri="http://schemas.microsoft.com/office/drawing/2008/diagram">
-      <dsp:dataModelExt xmlns:dsp="http://schemas.microsoft.com/office/drawing/2008/diagram" relId="rId6" minVer="http://schemas.openxmlformats.org/drawingml/2006/diagram"/>
-    </a:ext>
-  </dgm:extLst>
-</dgm:dataModel>
-</file>
-
-<file path=ppt/diagrams/data3.xml><?xml version="1.0" encoding="utf-8"?>
-<dgm:dataModel xmlns:dgm="http://schemas.openxmlformats.org/drawingml/2006/diagram" xmlns:a="http://schemas.openxmlformats.org/drawingml/2006/main">
-  <dgm:ptLst>
-    <dgm:pt modelId="{67C4C166-1694-4082-AD86-17AC184B67AE}" type="doc">
-      <dgm:prSet loTypeId="urn:microsoft.com/office/officeart/2008/layout/PictureStrips" loCatId="list" qsTypeId="urn:microsoft.com/office/officeart/2005/8/quickstyle/simple1" qsCatId="simple" csTypeId="urn:microsoft.com/office/officeart/2005/8/colors/accent1_2" csCatId="accent1" phldr="1"/>
-      <dgm:spPr/>
-      <dgm:t>
-        <a:bodyPr/>
-        <a:lstStyle/>
-        <a:p>
-          <a:endParaRPr lang="en-US"/>
-        </a:p>
-      </dgm:t>
-    </dgm:pt>
-    <mc:AlternateContent xmlns:mc="http://schemas.openxmlformats.org/markup-compatibility/2006" xmlns:a14="http://schemas.microsoft.com/office/drawing/2010/main">
-      <mc:Choice Requires="a14">
-        <dgm:pt modelId="{E728C00E-A1AA-4739-8323-29D761CFF3E6}">
-          <dgm:prSet phldrT="[Text]" custT="1"/>
-          <dgm:spPr/>
-          <dgm:t>
-            <a:bodyPr/>
-            <a:lstStyle/>
-            <a:p>
-              <a:pPr algn="l"/>
-              <a:r>
-                <a:rPr lang="en-US" sz="2400" b="1" dirty="0"/>
-                <a:t>Metal Industry</a:t>
-              </a:r>
-            </a:p>
-            <a:p>
-              <a:pPr algn="just"/>
-              <a:r>
-                <a:rPr lang="en-US" sz="2400" i="1" dirty="0"/>
-                <a:t>Released 1.77x</a:t>
-              </a:r>
-              <a14:m>
-                <m:oMath xmlns:m="http://schemas.openxmlformats.org/officeDocument/2006/math">
-                  <m:sSup>
-                    <m:sSupPr>
-                      <m:ctrlPr>
-                        <a:rPr lang="en-US" sz="2400" i="1" smtClean="0">
-                          <a:latin typeface="Cambria Math" panose="02040503050406030204" pitchFamily="18" charset="0"/>
-                        </a:rPr>
-                      </m:ctrlPr>
-                    </m:sSupPr>
-                    <m:e>
-                      <m:r>
-                        <a:rPr lang="en-US" sz="2400" b="0" i="1" smtClean="0">
-                          <a:latin typeface="Cambria Math"/>
-                        </a:rPr>
-                        <m:t>10</m:t>
-                      </m:r>
-                    </m:e>
-                    <m:sup>
-                      <m:r>
-                        <a:rPr lang="en-US" sz="2400" b="0" i="1" smtClean="0">
-                          <a:latin typeface="Cambria Math"/>
-                        </a:rPr>
-                        <m:t>09</m:t>
-                      </m:r>
-                    </m:sup>
-                  </m:sSup>
-                </m:oMath>
-              </a14:m>
-              <a:r>
-                <a:rPr lang="en-US" sz="2400" i="1" dirty="0"/>
-                <a:t> pounds of toxic waste in 2014</a:t>
-              </a:r>
-              <a:r>
-                <a:rPr lang="en-US" sz="1800" i="1" dirty="0"/>
-                <a:t>.</a:t>
-              </a:r>
-            </a:p>
-          </dgm:t>
-        </dgm:pt>
-      </mc:Choice>
-      <mc:Fallback xmlns="">
-        <dgm:pt modelId="{E728C00E-A1AA-4739-8323-29D761CFF3E6}">
-          <dgm:prSet phldrT="[Text]" custT="1"/>
-          <dgm:spPr/>
-          <dgm:t>
-            <a:bodyPr/>
-            <a:lstStyle/>
-            <a:p>
-              <a:pPr algn="l"/>
-              <a:r>
-                <a:rPr lang="en-US" sz="2400" b="1" dirty="0" smtClean="0"/>
-                <a:t>Metal Industry</a:t>
-              </a:r>
-            </a:p>
-            <a:p>
-              <a:pPr algn="just"/>
-              <a:r>
-                <a:rPr lang="en-US" sz="2400" i="1" dirty="0" smtClean="0"/>
-                <a:t>Released 1.77x</a:t>
-              </a:r>
-              <a:r>
-                <a:rPr lang="en-US" sz="2400" i="0" smtClean="0">
-                  <a:latin typeface="Cambria Math"/>
-                </a:rPr>
-                <a:t>〖</a:t>
-              </a:r>
-              <a:r>
-                <a:rPr lang="en-US" sz="2400" b="0" i="0" smtClean="0">
-                  <a:latin typeface="Cambria Math"/>
-                </a:rPr>
-                <a:t>10〗^09</a:t>
-              </a:r>
-              <a:r>
-                <a:rPr lang="en-US" sz="2400" i="1" dirty="0" smtClean="0"/>
-                <a:t> pounds of toxic waste in 2014</a:t>
-              </a:r>
-              <a:r>
-                <a:rPr lang="en-US" sz="1800" i="1" dirty="0" smtClean="0"/>
-                <a:t>.</a:t>
-              </a:r>
-              <a:endParaRPr lang="en-US" sz="1800" i="1" dirty="0"/>
-            </a:p>
-          </dgm:t>
-        </dgm:pt>
-      </mc:Fallback>
-    </mc:AlternateContent>
-    <dgm:pt modelId="{FE19B27C-0380-420F-939D-5E3861139F89}" type="parTrans" cxnId="{9E3B8696-BF9E-4C83-BB64-82B06A1ECB38}">
-      <dgm:prSet/>
-      <dgm:spPr/>
-      <dgm:t>
-        <a:bodyPr/>
-        <a:lstStyle/>
-        <a:p>
-          <a:endParaRPr lang="en-US"/>
-        </a:p>
-      </dgm:t>
-    </dgm:pt>
-    <dgm:pt modelId="{175A6747-9761-4569-91D2-FBFBDE38172A}" type="sibTrans" cxnId="{9E3B8696-BF9E-4C83-BB64-82B06A1ECB38}">
-      <dgm:prSet/>
-      <dgm:spPr/>
-      <dgm:t>
-        <a:bodyPr/>
-        <a:lstStyle/>
-        <a:p>
-          <a:endParaRPr lang="en-US"/>
-        </a:p>
-      </dgm:t>
-    </dgm:pt>
-    <mc:AlternateContent xmlns:mc="http://schemas.openxmlformats.org/markup-compatibility/2006" xmlns:a14="http://schemas.microsoft.com/office/drawing/2010/main">
-      <mc:Choice Requires="a14">
-        <dgm:pt modelId="{52B1B63E-41E2-4467-9680-00C3F61C48E1}">
-          <dgm:prSet phldrT="[Text]" custT="1"/>
-          <dgm:spPr/>
-          <dgm:t>
-            <a:bodyPr/>
-            <a:lstStyle/>
-            <a:p>
-              <a:pPr algn="l"/>
-              <a:r>
-                <a:rPr lang="en-US" sz="2400" b="1" dirty="0"/>
-                <a:t>Electric Utilities</a:t>
-              </a:r>
-            </a:p>
-            <a:p>
-              <a:pPr algn="l"/>
-              <a:r>
-                <a:rPr lang="en-US" sz="2400" i="1" dirty="0"/>
-                <a:t>Released 5.35x</a:t>
-              </a:r>
-              <a14:m>
-                <m:oMath xmlns:m="http://schemas.openxmlformats.org/officeDocument/2006/math">
-                  <m:sSup>
-                    <m:sSupPr>
-                      <m:ctrlPr>
-                        <a:rPr lang="en-US" sz="2400" i="1" smtClean="0">
-                          <a:latin typeface="Cambria Math" panose="02040503050406030204" pitchFamily="18" charset="0"/>
-                        </a:rPr>
-                      </m:ctrlPr>
-                    </m:sSupPr>
-                    <m:e>
-                      <m:r>
-                        <a:rPr lang="en-US" sz="2400" b="0" i="1" smtClean="0">
-                          <a:latin typeface="Cambria Math"/>
-                        </a:rPr>
-                        <m:t>10</m:t>
-                      </m:r>
-                    </m:e>
-                    <m:sup>
-                      <m:r>
-                        <a:rPr lang="en-US" sz="2400" b="0" i="1" smtClean="0">
-                          <a:latin typeface="Cambria Math"/>
-                        </a:rPr>
-                        <m:t>08</m:t>
-                      </m:r>
-                    </m:sup>
-                  </m:sSup>
-                </m:oMath>
-              </a14:m>
-              <a:r>
-                <a:rPr lang="en-US" sz="2400" i="1" dirty="0"/>
-                <a:t> pounds of toxic         waste in 2014</a:t>
-              </a:r>
-              <a:r>
-                <a:rPr lang="en-US" sz="1800" i="1" dirty="0"/>
-                <a:t>.</a:t>
-              </a:r>
-              <a:endParaRPr lang="en-US" sz="1800" dirty="0"/>
-            </a:p>
-          </dgm:t>
-        </dgm:pt>
-      </mc:Choice>
-      <mc:Fallback xmlns="">
-        <dgm:pt modelId="{52B1B63E-41E2-4467-9680-00C3F61C48E1}">
-          <dgm:prSet phldrT="[Text]" custT="1"/>
-          <dgm:spPr/>
-          <dgm:t>
-            <a:bodyPr/>
-            <a:lstStyle/>
-            <a:p>
-              <a:pPr algn="l"/>
-              <a:r>
-                <a:rPr lang="en-US" sz="2400" b="1" dirty="0" smtClean="0"/>
-                <a:t>Electric Utilities</a:t>
-              </a:r>
-            </a:p>
-            <a:p>
-              <a:pPr algn="l"/>
-              <a:r>
-                <a:rPr lang="en-US" sz="2400" i="1" dirty="0" smtClean="0"/>
-                <a:t>Released 5.35x</a:t>
-              </a:r>
-              <a:r>
-                <a:rPr lang="en-US" sz="2400" i="0" smtClean="0">
-                  <a:latin typeface="Cambria Math"/>
-                </a:rPr>
-                <a:t>〖</a:t>
-              </a:r>
-              <a:r>
-                <a:rPr lang="en-US" sz="2400" b="0" i="0" smtClean="0">
-                  <a:latin typeface="Cambria Math"/>
-                </a:rPr>
-                <a:t>10〗^0</a:t>
-              </a:r>
-              <a:r>
-                <a:rPr lang="en-US" sz="2400" b="0" i="0" smtClean="0">
-                  <a:latin typeface="Cambria Math"/>
-                </a:rPr>
-                <a:t>8</a:t>
-              </a:r>
-              <a:r>
-                <a:rPr lang="en-US" sz="2400" i="1" dirty="0" smtClean="0"/>
-                <a:t> pounds of toxic </a:t>
-              </a:r>
-              <a:r>
-                <a:rPr lang="en-US" sz="2400" i="1" dirty="0" smtClean="0"/>
-                <a:t>        waste </a:t>
-              </a:r>
-              <a:r>
-                <a:rPr lang="en-US" sz="2400" i="1" dirty="0" smtClean="0"/>
-                <a:t>in 2014</a:t>
-              </a:r>
-              <a:r>
-                <a:rPr lang="en-US" sz="1800" i="1" dirty="0" smtClean="0"/>
-                <a:t>.</a:t>
-              </a:r>
-              <a:endParaRPr lang="en-US" sz="1800" dirty="0"/>
-            </a:p>
-          </dgm:t>
-        </dgm:pt>
-      </mc:Fallback>
-    </mc:AlternateContent>
-    <dgm:pt modelId="{BD4F415B-843C-472A-927E-46FB71C1D576}" type="parTrans" cxnId="{0029EC16-20F9-4E88-B8BE-F6E87CE65DAB}">
-      <dgm:prSet/>
-      <dgm:spPr/>
-      <dgm:t>
-        <a:bodyPr/>
-        <a:lstStyle/>
-        <a:p>
-          <a:endParaRPr lang="en-US"/>
-        </a:p>
-      </dgm:t>
-    </dgm:pt>
-    <dgm:pt modelId="{FC372CDE-1FA8-43CD-92BF-BE02F8431239}" type="sibTrans" cxnId="{0029EC16-20F9-4E88-B8BE-F6E87CE65DAB}">
-      <dgm:prSet/>
-      <dgm:spPr/>
-      <dgm:t>
-        <a:bodyPr/>
-        <a:lstStyle/>
-        <a:p>
-          <a:endParaRPr lang="en-US"/>
-        </a:p>
-      </dgm:t>
-    </dgm:pt>
-    <mc:AlternateContent xmlns:mc="http://schemas.openxmlformats.org/markup-compatibility/2006" xmlns:a14="http://schemas.microsoft.com/office/drawing/2010/main">
-      <mc:Choice Requires="a14">
-        <dgm:pt modelId="{1D49A373-EC73-423C-844B-BB0FDA7F3F87}">
-          <dgm:prSet phldrT="[Text]" custT="1"/>
-          <dgm:spPr/>
-          <dgm:t>
-            <a:bodyPr/>
-            <a:lstStyle/>
-            <a:p>
-              <a:r>
-                <a:rPr lang="en-US" sz="1800" b="1" dirty="0"/>
-                <a:t>  </a:t>
-              </a:r>
-            </a:p>
-            <a:p>
-              <a:r>
-                <a:rPr lang="en-US" sz="2400" b="1" i="0" dirty="0"/>
-                <a:t>Chemical Industries</a:t>
-              </a:r>
-            </a:p>
-            <a:p>
-              <a:r>
-                <a:rPr lang="en-US" sz="2400" b="0" i="1" dirty="0"/>
-                <a:t>Released  5.30 x </a:t>
-              </a:r>
-              <a14:m>
-                <m:oMath xmlns:m="http://schemas.openxmlformats.org/officeDocument/2006/math">
-                  <m:sSup>
-                    <m:sSupPr>
-                      <m:ctrlPr>
-                        <a:rPr lang="en-US" sz="2400" b="0" i="1" smtClean="0">
-                          <a:latin typeface="Cambria Math" panose="02040503050406030204" pitchFamily="18" charset="0"/>
-                        </a:rPr>
-                      </m:ctrlPr>
-                    </m:sSupPr>
-                    <m:e>
-                      <m:r>
-                        <a:rPr lang="en-US" sz="2400" b="0" i="1" smtClean="0">
-                          <a:latin typeface="Cambria Math"/>
-                        </a:rPr>
-                        <m:t>10</m:t>
-                      </m:r>
-                    </m:e>
-                    <m:sup>
-                      <m:r>
-                        <a:rPr lang="en-US" sz="2400" b="0" i="1" smtClean="0">
-                          <a:latin typeface="Cambria Math"/>
-                        </a:rPr>
-                        <m:t>08 </m:t>
-                      </m:r>
-                    </m:sup>
-                  </m:sSup>
-                </m:oMath>
-              </a14:m>
-              <a:r>
-                <a:rPr lang="en-US" sz="2400" b="0" i="1" dirty="0"/>
-                <a:t> pounds of toxic   waste in  2014</a:t>
-              </a:r>
-            </a:p>
-            <a:p>
-              <a:r>
-                <a:rPr lang="en-US" sz="1800" dirty="0"/>
-                <a:t> </a:t>
-              </a:r>
-            </a:p>
-          </dgm:t>
-        </dgm:pt>
-      </mc:Choice>
-      <mc:Fallback xmlns="">
-        <dgm:pt modelId="{1D49A373-EC73-423C-844B-BB0FDA7F3F87}">
-          <dgm:prSet phldrT="[Text]" custT="1"/>
-          <dgm:spPr/>
-          <dgm:t>
-            <a:bodyPr/>
-            <a:lstStyle/>
-            <a:p>
-              <a:r>
-                <a:rPr lang="en-US" sz="1800" b="1" dirty="0" smtClean="0"/>
-                <a:t>  </a:t>
-              </a:r>
-            </a:p>
-            <a:p>
-              <a:r>
-                <a:rPr lang="en-US" sz="2400" b="1" i="0" dirty="0" smtClean="0"/>
-                <a:t>Chemical Industries</a:t>
-              </a:r>
-            </a:p>
-            <a:p>
-              <a:r>
-                <a:rPr lang="en-US" sz="2400" b="0" i="1" dirty="0" smtClean="0"/>
-                <a:t>Released  5.30 x </a:t>
-              </a:r>
-              <a:r>
-                <a:rPr lang="en-US" sz="2400" b="0" i="0" smtClean="0">
-                  <a:latin typeface="Cambria Math"/>
-                </a:rPr>
-                <a:t>〖10〗^(08 )</a:t>
-              </a:r>
-              <a:r>
-                <a:rPr lang="en-US" sz="2400" b="0" i="1" dirty="0" smtClean="0"/>
-                <a:t> pounds of toxic   waste in  2014</a:t>
-              </a:r>
-            </a:p>
-            <a:p>
-              <a:r>
-                <a:rPr lang="en-US" sz="1800" dirty="0" smtClean="0"/>
-                <a:t> </a:t>
-              </a:r>
-              <a:endParaRPr lang="en-US" sz="1800" dirty="0"/>
-            </a:p>
-          </dgm:t>
-        </dgm:pt>
-      </mc:Fallback>
-    </mc:AlternateContent>
-    <dgm:pt modelId="{05E9ABBD-2272-4340-91AE-8AAE86129038}" type="parTrans" cxnId="{4DD332DA-5D47-4685-9556-1CFFEC287F4E}">
-      <dgm:prSet/>
-      <dgm:spPr/>
-      <dgm:t>
-        <a:bodyPr/>
-        <a:lstStyle/>
-        <a:p>
-          <a:endParaRPr lang="en-US"/>
-        </a:p>
-      </dgm:t>
-    </dgm:pt>
-    <dgm:pt modelId="{CC193482-8CD0-4661-A815-DC4D9FE65D61}" type="sibTrans" cxnId="{4DD332DA-5D47-4685-9556-1CFFEC287F4E}">
-      <dgm:prSet/>
-      <dgm:spPr/>
-      <dgm:t>
-        <a:bodyPr/>
-        <a:lstStyle/>
-        <a:p>
-          <a:endParaRPr lang="en-US"/>
-        </a:p>
-      </dgm:t>
-    </dgm:pt>
-    <dgm:pt modelId="{C9B5D593-18E5-4DAB-897B-F8DF3F5C987A}" type="pres">
-      <dgm:prSet presAssocID="{67C4C166-1694-4082-AD86-17AC184B67AE}" presName="Name0" presStyleCnt="0">
-        <dgm:presLayoutVars>
-          <dgm:dir/>
-          <dgm:resizeHandles val="exact"/>
-        </dgm:presLayoutVars>
-      </dgm:prSet>
-      <dgm:spPr/>
-    </dgm:pt>
-    <dgm:pt modelId="{9469D957-E1DE-49A7-B257-109A5BFBD013}" type="pres">
-      <dgm:prSet presAssocID="{E728C00E-A1AA-4739-8323-29D761CFF3E6}" presName="composite" presStyleCnt="0"/>
-      <dgm:spPr/>
-    </dgm:pt>
-    <dgm:pt modelId="{66D0A532-B7B6-4C55-9E1C-ACF9BEE3BB5E}" type="pres">
-      <dgm:prSet presAssocID="{E728C00E-A1AA-4739-8323-29D761CFF3E6}" presName="rect1" presStyleLbl="trAlignAcc1" presStyleIdx="0" presStyleCnt="3" custScaleX="125782" custLinFactNeighborX="12883" custLinFactNeighborY="-3184">
-        <dgm:presLayoutVars>
-          <dgm:bulletEnabled val="1"/>
-        </dgm:presLayoutVars>
-      </dgm:prSet>
-      <dgm:spPr/>
-    </dgm:pt>
-    <dgm:pt modelId="{F10D4FFD-8F5B-4F36-A144-518F5A90FF3D}" type="pres">
-      <dgm:prSet presAssocID="{E728C00E-A1AA-4739-8323-29D761CFF3E6}" presName="rect2" presStyleLbl="fgImgPlace1" presStyleIdx="0" presStyleCnt="3" custScaleX="236890" custLinFactX="-71073" custLinFactNeighborX="-100000" custLinFactNeighborY="5529"/>
-      <dgm:spPr>
-        <a:blipFill>
-          <a:blip xmlns:r="http://schemas.openxmlformats.org/officeDocument/2006/relationships" r:embed="rId1">
-            <a:extLst>
-              <a:ext uri="{28A0092B-C50C-407E-A947-70E740481C1C}">
-                <a14:useLocalDpi xmlns:a14="http://schemas.microsoft.com/office/drawing/2010/main" val="0"/>
-              </a:ext>
-            </a:extLst>
-          </a:blip>
-          <a:srcRect/>
-          <a:stretch>
-            <a:fillRect t="-40000" b="-40000"/>
-          </a:stretch>
-        </a:blipFill>
-      </dgm:spPr>
-    </dgm:pt>
-    <dgm:pt modelId="{2855697A-E96B-4D1C-BA1B-645345D52C4F}" type="pres">
-      <dgm:prSet presAssocID="{175A6747-9761-4569-91D2-FBFBDE38172A}" presName="sibTrans" presStyleCnt="0"/>
-      <dgm:spPr/>
-    </dgm:pt>
-    <dgm:pt modelId="{A183990E-73CE-4F34-8E74-D6147BC92A1C}" type="pres">
-      <dgm:prSet presAssocID="{52B1B63E-41E2-4467-9680-00C3F61C48E1}" presName="composite" presStyleCnt="0"/>
-      <dgm:spPr/>
-    </dgm:pt>
-    <dgm:pt modelId="{94FF6EB2-8032-46F0-A7F4-2F56FD9838D0}" type="pres">
-      <dgm:prSet presAssocID="{52B1B63E-41E2-4467-9680-00C3F61C48E1}" presName="rect1" presStyleLbl="trAlignAcc1" presStyleIdx="1" presStyleCnt="3" custScaleX="128787" custScaleY="99530" custLinFactNeighborX="13996" custLinFactNeighborY="-3720">
-        <dgm:presLayoutVars>
-          <dgm:bulletEnabled val="1"/>
-        </dgm:presLayoutVars>
-      </dgm:prSet>
-      <dgm:spPr/>
-    </dgm:pt>
-    <dgm:pt modelId="{C894DC1D-3BF3-4731-9FC4-ED1F118B5765}" type="pres">
-      <dgm:prSet presAssocID="{52B1B63E-41E2-4467-9680-00C3F61C48E1}" presName="rect2" presStyleLbl="fgImgPlace1" presStyleIdx="1" presStyleCnt="3" custScaleX="235256" custLinFactX="-71073" custLinFactNeighborX="-100000" custLinFactNeighborY="5137"/>
-      <dgm:spPr>
-        <a:blipFill>
-          <a:blip xmlns:r="http://schemas.openxmlformats.org/officeDocument/2006/relationships" r:embed="rId2">
-            <a:extLst>
-              <a:ext uri="{28A0092B-C50C-407E-A947-70E740481C1C}">
-                <a14:useLocalDpi xmlns:a14="http://schemas.microsoft.com/office/drawing/2010/main" val="0"/>
-              </a:ext>
-            </a:extLst>
-          </a:blip>
-          <a:srcRect/>
-          <a:stretch>
-            <a:fillRect t="-40000" b="-40000"/>
-          </a:stretch>
-        </a:blipFill>
-      </dgm:spPr>
-    </dgm:pt>
-    <dgm:pt modelId="{3D4B0FF5-A018-474D-BC99-526BEE3507B4}" type="pres">
-      <dgm:prSet presAssocID="{FC372CDE-1FA8-43CD-92BF-BE02F8431239}" presName="sibTrans" presStyleCnt="0"/>
-      <dgm:spPr/>
-    </dgm:pt>
-    <dgm:pt modelId="{73FFDB61-AB75-442B-8F1A-DD5089CC152C}" type="pres">
-      <dgm:prSet presAssocID="{1D49A373-EC73-423C-844B-BB0FDA7F3F87}" presName="composite" presStyleCnt="0"/>
-      <dgm:spPr/>
-    </dgm:pt>
-    <dgm:pt modelId="{0B494733-9138-43DE-B904-543A92E88131}" type="pres">
-      <dgm:prSet presAssocID="{1D49A373-EC73-423C-844B-BB0FDA7F3F87}" presName="rect1" presStyleLbl="trAlignAcc1" presStyleIdx="2" presStyleCnt="3" custScaleX="127844" custLinFactNeighborX="13703" custLinFactNeighborY="941">
-        <dgm:presLayoutVars>
-          <dgm:bulletEnabled val="1"/>
-        </dgm:presLayoutVars>
-      </dgm:prSet>
-      <dgm:spPr/>
-    </dgm:pt>
-    <dgm:pt modelId="{114784D1-D9A3-4A0E-A0E7-3563F0DD5AD5}" type="pres">
-      <dgm:prSet presAssocID="{1D49A373-EC73-423C-844B-BB0FDA7F3F87}" presName="rect2" presStyleLbl="fgImgPlace1" presStyleIdx="2" presStyleCnt="3" custScaleX="235741" custLinFactX="-71073" custLinFactNeighborX="-100000" custLinFactNeighborY="9942"/>
-      <dgm:spPr>
-        <a:blipFill>
-          <a:blip xmlns:r="http://schemas.openxmlformats.org/officeDocument/2006/relationships" r:embed="rId3">
-            <a:extLst>
-              <a:ext uri="{28A0092B-C50C-407E-A947-70E740481C1C}">
-                <a14:useLocalDpi xmlns:a14="http://schemas.microsoft.com/office/drawing/2010/main" val="0"/>
-              </a:ext>
-            </a:extLst>
-          </a:blip>
-          <a:srcRect/>
-          <a:stretch>
-            <a:fillRect t="-30000" b="-30000"/>
-          </a:stretch>
-        </a:blipFill>
-      </dgm:spPr>
-    </dgm:pt>
-  </dgm:ptLst>
-  <dgm:cxnLst>
-    <dgm:cxn modelId="{0029EC16-20F9-4E88-B8BE-F6E87CE65DAB}" srcId="{67C4C166-1694-4082-AD86-17AC184B67AE}" destId="{52B1B63E-41E2-4467-9680-00C3F61C48E1}" srcOrd="1" destOrd="0" parTransId="{BD4F415B-843C-472A-927E-46FB71C1D576}" sibTransId="{FC372CDE-1FA8-43CD-92BF-BE02F8431239}"/>
-    <dgm:cxn modelId="{9E3B8696-BF9E-4C83-BB64-82B06A1ECB38}" srcId="{67C4C166-1694-4082-AD86-17AC184B67AE}" destId="{E728C00E-A1AA-4739-8323-29D761CFF3E6}" srcOrd="0" destOrd="0" parTransId="{FE19B27C-0380-420F-939D-5E3861139F89}" sibTransId="{175A6747-9761-4569-91D2-FBFBDE38172A}"/>
-    <dgm:cxn modelId="{9B2A5FB2-A76D-459F-AF4A-8F2A6E96AABA}" type="presOf" srcId="{E728C00E-A1AA-4739-8323-29D761CFF3E6}" destId="{66D0A532-B7B6-4C55-9E1C-ACF9BEE3BB5E}" srcOrd="0" destOrd="0" presId="urn:microsoft.com/office/officeart/2008/layout/PictureStrips"/>
-    <dgm:cxn modelId="{0554AF91-C84E-47F1-896C-76E70DB00365}" type="presOf" srcId="{1D49A373-EC73-423C-844B-BB0FDA7F3F87}" destId="{0B494733-9138-43DE-B904-543A92E88131}" srcOrd="0" destOrd="0" presId="urn:microsoft.com/office/officeart/2008/layout/PictureStrips"/>
-    <dgm:cxn modelId="{AA51EC0D-46F1-4A9B-AE2B-13C245219792}" type="presOf" srcId="{67C4C166-1694-4082-AD86-17AC184B67AE}" destId="{C9B5D593-18E5-4DAB-897B-F8DF3F5C987A}" srcOrd="0" destOrd="0" presId="urn:microsoft.com/office/officeart/2008/layout/PictureStrips"/>
-    <dgm:cxn modelId="{799CEF44-01D8-4EA0-A387-D1DC3EDEFCF4}" type="presOf" srcId="{52B1B63E-41E2-4467-9680-00C3F61C48E1}" destId="{94FF6EB2-8032-46F0-A7F4-2F56FD9838D0}" srcOrd="0" destOrd="0" presId="urn:microsoft.com/office/officeart/2008/layout/PictureStrips"/>
-    <dgm:cxn modelId="{4DD332DA-5D47-4685-9556-1CFFEC287F4E}" srcId="{67C4C166-1694-4082-AD86-17AC184B67AE}" destId="{1D49A373-EC73-423C-844B-BB0FDA7F3F87}" srcOrd="2" destOrd="0" parTransId="{05E9ABBD-2272-4340-91AE-8AAE86129038}" sibTransId="{CC193482-8CD0-4661-A815-DC4D9FE65D61}"/>
-    <dgm:cxn modelId="{6349224D-CBF4-4137-9C46-A9FFB36F8326}" type="presParOf" srcId="{C9B5D593-18E5-4DAB-897B-F8DF3F5C987A}" destId="{9469D957-E1DE-49A7-B257-109A5BFBD013}" srcOrd="0" destOrd="0" presId="urn:microsoft.com/office/officeart/2008/layout/PictureStrips"/>
-    <dgm:cxn modelId="{BD2675FD-A595-426D-9454-4DA5B3FD39AB}" type="presParOf" srcId="{9469D957-E1DE-49A7-B257-109A5BFBD013}" destId="{66D0A532-B7B6-4C55-9E1C-ACF9BEE3BB5E}" srcOrd="0" destOrd="0" presId="urn:microsoft.com/office/officeart/2008/layout/PictureStrips"/>
-    <dgm:cxn modelId="{A700A8C7-6AA9-41F5-B97F-940802E42409}" type="presParOf" srcId="{9469D957-E1DE-49A7-B257-109A5BFBD013}" destId="{F10D4FFD-8F5B-4F36-A144-518F5A90FF3D}" srcOrd="1" destOrd="0" presId="urn:microsoft.com/office/officeart/2008/layout/PictureStrips"/>
-    <dgm:cxn modelId="{7AE69B1C-9641-455C-8835-01096E239644}" type="presParOf" srcId="{C9B5D593-18E5-4DAB-897B-F8DF3F5C987A}" destId="{2855697A-E96B-4D1C-BA1B-645345D52C4F}" srcOrd="1" destOrd="0" presId="urn:microsoft.com/office/officeart/2008/layout/PictureStrips"/>
-    <dgm:cxn modelId="{4B9C076F-C283-420B-B9CA-065CF748BACF}" type="presParOf" srcId="{C9B5D593-18E5-4DAB-897B-F8DF3F5C987A}" destId="{A183990E-73CE-4F34-8E74-D6147BC92A1C}" srcOrd="2" destOrd="0" presId="urn:microsoft.com/office/officeart/2008/layout/PictureStrips"/>
-    <dgm:cxn modelId="{671A6A90-3500-4FB4-AB9F-D0D8C891D45F}" type="presParOf" srcId="{A183990E-73CE-4F34-8E74-D6147BC92A1C}" destId="{94FF6EB2-8032-46F0-A7F4-2F56FD9838D0}" srcOrd="0" destOrd="0" presId="urn:microsoft.com/office/officeart/2008/layout/PictureStrips"/>
-    <dgm:cxn modelId="{27DCA281-3F04-478A-BC1A-54D095B33493}" type="presParOf" srcId="{A183990E-73CE-4F34-8E74-D6147BC92A1C}" destId="{C894DC1D-3BF3-4731-9FC4-ED1F118B5765}" srcOrd="1" destOrd="0" presId="urn:microsoft.com/office/officeart/2008/layout/PictureStrips"/>
-    <dgm:cxn modelId="{DF935BA9-3AC5-459E-ADC6-BE2B8298CCF3}" type="presParOf" srcId="{C9B5D593-18E5-4DAB-897B-F8DF3F5C987A}" destId="{3D4B0FF5-A018-474D-BC99-526BEE3507B4}" srcOrd="3" destOrd="0" presId="urn:microsoft.com/office/officeart/2008/layout/PictureStrips"/>
-    <dgm:cxn modelId="{71C213BB-8516-4649-84BE-48E75BB0F488}" type="presParOf" srcId="{C9B5D593-18E5-4DAB-897B-F8DF3F5C987A}" destId="{73FFDB61-AB75-442B-8F1A-DD5089CC152C}" srcOrd="4" destOrd="0" presId="urn:microsoft.com/office/officeart/2008/layout/PictureStrips"/>
-    <dgm:cxn modelId="{5B01EF25-454B-44EA-A677-632052B47B43}" type="presParOf" srcId="{73FFDB61-AB75-442B-8F1A-DD5089CC152C}" destId="{0B494733-9138-43DE-B904-543A92E88131}" srcOrd="0" destOrd="0" presId="urn:microsoft.com/office/officeart/2008/layout/PictureStrips"/>
-    <dgm:cxn modelId="{C9FF04AB-E03F-40D6-94E3-5C04B2C2E2DF}" type="presParOf" srcId="{73FFDB61-AB75-442B-8F1A-DD5089CC152C}" destId="{114784D1-D9A3-4A0E-A0E7-3563F0DD5AD5}" srcOrd="1" destOrd="0" presId="urn:microsoft.com/office/officeart/2008/layout/PictureStrips"/>
-  </dgm:cxnLst>
-  <dgm:bg/>
-  <dgm:whole/>
-  <dgm:extLst>
-    <a:ext uri="http://schemas.microsoft.com/office/drawing/2008/diagram">
-      <dsp:dataModelExt xmlns:dsp="http://schemas.microsoft.com/office/drawing/2008/diagram" relId="rId6" minVer="http://schemas.openxmlformats.org/drawingml/2006/diagram"/>
-    </a:ext>
-  </dgm:extLst>
-</dgm:dataModel>
-</file>
-
-<file path=ppt/diagrams/data4.xml><?xml version="1.0" encoding="utf-8"?>
-<dgm:dataModel xmlns:dgm="http://schemas.openxmlformats.org/drawingml/2006/diagram" xmlns:a="http://schemas.openxmlformats.org/drawingml/2006/main">
-  <dgm:ptLst>
-    <dgm:pt modelId="{67C4C166-1694-4082-AD86-17AC184B67AE}" type="doc">
-      <dgm:prSet loTypeId="urn:microsoft.com/office/officeart/2008/layout/PictureStrips" loCatId="list" qsTypeId="urn:microsoft.com/office/officeart/2005/8/quickstyle/simple1" qsCatId="simple" csTypeId="urn:microsoft.com/office/officeart/2005/8/colors/accent1_2" csCatId="accent1" phldr="1"/>
-      <dgm:spPr/>
-      <dgm:t>
-        <a:bodyPr/>
-        <a:lstStyle/>
-        <a:p>
-          <a:endParaRPr lang="en-US"/>
-        </a:p>
-      </dgm:t>
-    </dgm:pt>
-    <dgm:pt modelId="{E728C00E-A1AA-4739-8323-29D761CFF3E6}">
-      <dgm:prSet phldrT="[Text]" custT="1"/>
-      <dgm:spPr>
-        <a:blipFill>
-          <a:blip xmlns:r="http://schemas.openxmlformats.org/officeDocument/2006/relationships" r:embed="rId1"/>
-          <a:stretch>
-            <a:fillRect r="-1611" b="-3433"/>
-          </a:stretch>
-        </a:blipFill>
-      </dgm:spPr>
-      <dgm:t>
-        <a:bodyPr/>
-        <a:lstStyle/>
-        <a:p>
-          <a:r>
-            <a:rPr lang="en-US">
-              <a:noFill/>
-            </a:rPr>
-            <a:t> </a:t>
-          </a:r>
-        </a:p>
-      </dgm:t>
-    </dgm:pt>
-    <dgm:pt modelId="{FE19B27C-0380-420F-939D-5E3861139F89}" type="parTrans" cxnId="{9E3B8696-BF9E-4C83-BB64-82B06A1ECB38}">
-      <dgm:prSet/>
-      <dgm:spPr/>
-      <dgm:t>
-        <a:bodyPr/>
-        <a:lstStyle/>
-        <a:p>
-          <a:endParaRPr lang="en-US"/>
-        </a:p>
-      </dgm:t>
-    </dgm:pt>
-    <dgm:pt modelId="{175A6747-9761-4569-91D2-FBFBDE38172A}" type="sibTrans" cxnId="{9E3B8696-BF9E-4C83-BB64-82B06A1ECB38}">
-      <dgm:prSet/>
-      <dgm:spPr/>
-      <dgm:t>
-        <a:bodyPr/>
-        <a:lstStyle/>
-        <a:p>
-          <a:endParaRPr lang="en-US"/>
-        </a:p>
-      </dgm:t>
-    </dgm:pt>
-    <dgm:pt modelId="{52B1B63E-41E2-4467-9680-00C3F61C48E1}">
-      <dgm:prSet phldrT="[Text]" custT="1"/>
-      <dgm:spPr>
-        <a:blipFill>
-          <a:blip xmlns:r="http://schemas.openxmlformats.org/officeDocument/2006/relationships" r:embed="rId2"/>
-          <a:stretch>
-            <a:fillRect r="-5870" b="-3879"/>
-          </a:stretch>
-        </a:blipFill>
-      </dgm:spPr>
-      <dgm:t>
-        <a:bodyPr/>
-        <a:lstStyle/>
-        <a:p>
-          <a:r>
-            <a:rPr lang="en-US">
-              <a:noFill/>
-            </a:rPr>
-            <a:t> </a:t>
-          </a:r>
-        </a:p>
-      </dgm:t>
-    </dgm:pt>
-    <dgm:pt modelId="{BD4F415B-843C-472A-927E-46FB71C1D576}" type="parTrans" cxnId="{0029EC16-20F9-4E88-B8BE-F6E87CE65DAB}">
-      <dgm:prSet/>
-      <dgm:spPr/>
-      <dgm:t>
-        <a:bodyPr/>
-        <a:lstStyle/>
-        <a:p>
-          <a:endParaRPr lang="en-US"/>
-        </a:p>
-      </dgm:t>
-    </dgm:pt>
-    <dgm:pt modelId="{FC372CDE-1FA8-43CD-92BF-BE02F8431239}" type="sibTrans" cxnId="{0029EC16-20F9-4E88-B8BE-F6E87CE65DAB}">
-      <dgm:prSet/>
-      <dgm:spPr/>
-      <dgm:t>
-        <a:bodyPr/>
-        <a:lstStyle/>
-        <a:p>
-          <a:endParaRPr lang="en-US"/>
-        </a:p>
-      </dgm:t>
-    </dgm:pt>
-    <dgm:pt modelId="{1D49A373-EC73-423C-844B-BB0FDA7F3F87}">
-      <dgm:prSet phldrT="[Text]" custT="1"/>
-      <dgm:spPr>
-        <a:blipFill>
-          <a:blip xmlns:r="http://schemas.openxmlformats.org/officeDocument/2006/relationships" r:embed="rId3"/>
-          <a:stretch>
-            <a:fillRect t="-429" r="-3911" b="-2146"/>
-          </a:stretch>
-        </a:blipFill>
-      </dgm:spPr>
-      <dgm:t>
-        <a:bodyPr/>
-        <a:lstStyle/>
-        <a:p>
-          <a:r>
-            <a:rPr lang="en-US">
-              <a:noFill/>
-            </a:rPr>
-            <a:t> </a:t>
-          </a:r>
-        </a:p>
-      </dgm:t>
-    </dgm:pt>
-    <dgm:pt modelId="{05E9ABBD-2272-4340-91AE-8AAE86129038}" type="parTrans" cxnId="{4DD332DA-5D47-4685-9556-1CFFEC287F4E}">
-      <dgm:prSet/>
-      <dgm:spPr/>
-      <dgm:t>
-        <a:bodyPr/>
-        <a:lstStyle/>
-        <a:p>
-          <a:endParaRPr lang="en-US"/>
-        </a:p>
-      </dgm:t>
-    </dgm:pt>
-    <dgm:pt modelId="{CC193482-8CD0-4661-A815-DC4D9FE65D61}" type="sibTrans" cxnId="{4DD332DA-5D47-4685-9556-1CFFEC287F4E}">
-      <dgm:prSet/>
-      <dgm:spPr/>
-      <dgm:t>
-        <a:bodyPr/>
-        <a:lstStyle/>
-        <a:p>
-          <a:endParaRPr lang="en-US"/>
-        </a:p>
-      </dgm:t>
-    </dgm:pt>
-    <dgm:pt modelId="{C9B5D593-18E5-4DAB-897B-F8DF3F5C987A}" type="pres">
-      <dgm:prSet presAssocID="{67C4C166-1694-4082-AD86-17AC184B67AE}" presName="Name0" presStyleCnt="0">
-        <dgm:presLayoutVars>
-          <dgm:dir/>
-          <dgm:resizeHandles val="exact"/>
-        </dgm:presLayoutVars>
-      </dgm:prSet>
-      <dgm:spPr/>
-    </dgm:pt>
-    <dgm:pt modelId="{9469D957-E1DE-49A7-B257-109A5BFBD013}" type="pres">
-      <dgm:prSet presAssocID="{E728C00E-A1AA-4739-8323-29D761CFF3E6}" presName="composite" presStyleCnt="0"/>
-      <dgm:spPr/>
-    </dgm:pt>
-    <dgm:pt modelId="{66D0A532-B7B6-4C55-9E1C-ACF9BEE3BB5E}" type="pres">
-      <dgm:prSet presAssocID="{E728C00E-A1AA-4739-8323-29D761CFF3E6}" presName="rect1" presStyleLbl="trAlignAcc1" presStyleIdx="0" presStyleCnt="3" custScaleX="125782" custLinFactNeighborX="12883" custLinFactNeighborY="-3184">
-        <dgm:presLayoutVars>
-          <dgm:bulletEnabled val="1"/>
-        </dgm:presLayoutVars>
-      </dgm:prSet>
-      <dgm:spPr/>
-    </dgm:pt>
-    <dgm:pt modelId="{F10D4FFD-8F5B-4F36-A144-518F5A90FF3D}" type="pres">
-      <dgm:prSet presAssocID="{E728C00E-A1AA-4739-8323-29D761CFF3E6}" presName="rect2" presStyleLbl="fgImgPlace1" presStyleIdx="0" presStyleCnt="3" custScaleX="236890" custLinFactX="-71073" custLinFactNeighborX="-100000" custLinFactNeighborY="5529"/>
-      <dgm:spPr>
-        <a:blipFill>
-          <a:blip xmlns:r="http://schemas.openxmlformats.org/officeDocument/2006/relationships" r:embed="rId4">
-            <a:extLst>
-              <a:ext uri="{28A0092B-C50C-407E-A947-70E740481C1C}">
-                <a14:useLocalDpi xmlns:a14="http://schemas.microsoft.com/office/drawing/2010/main" val="0"/>
-              </a:ext>
-            </a:extLst>
-          </a:blip>
-          <a:srcRect/>
-          <a:stretch>
-            <a:fillRect t="-40000" b="-40000"/>
-          </a:stretch>
-        </a:blipFill>
-      </dgm:spPr>
-    </dgm:pt>
-    <dgm:pt modelId="{2855697A-E96B-4D1C-BA1B-645345D52C4F}" type="pres">
-      <dgm:prSet presAssocID="{175A6747-9761-4569-91D2-FBFBDE38172A}" presName="sibTrans" presStyleCnt="0"/>
-      <dgm:spPr/>
-    </dgm:pt>
-    <dgm:pt modelId="{A183990E-73CE-4F34-8E74-D6147BC92A1C}" type="pres">
-      <dgm:prSet presAssocID="{52B1B63E-41E2-4467-9680-00C3F61C48E1}" presName="composite" presStyleCnt="0"/>
-      <dgm:spPr/>
-    </dgm:pt>
-    <dgm:pt modelId="{94FF6EB2-8032-46F0-A7F4-2F56FD9838D0}" type="pres">
-      <dgm:prSet presAssocID="{52B1B63E-41E2-4467-9680-00C3F61C48E1}" presName="rect1" presStyleLbl="trAlignAcc1" presStyleIdx="1" presStyleCnt="3" custScaleX="128787" custScaleY="99530" custLinFactNeighborX="13996" custLinFactNeighborY="-3720">
-        <dgm:presLayoutVars>
-          <dgm:bulletEnabled val="1"/>
-        </dgm:presLayoutVars>
-      </dgm:prSet>
-      <dgm:spPr/>
-    </dgm:pt>
-    <dgm:pt modelId="{C894DC1D-3BF3-4731-9FC4-ED1F118B5765}" type="pres">
-      <dgm:prSet presAssocID="{52B1B63E-41E2-4467-9680-00C3F61C48E1}" presName="rect2" presStyleLbl="fgImgPlace1" presStyleIdx="1" presStyleCnt="3" custScaleX="235256" custLinFactX="-71073" custLinFactNeighborX="-100000" custLinFactNeighborY="5137"/>
-      <dgm:spPr>
-        <a:blipFill>
-          <a:blip xmlns:r="http://schemas.openxmlformats.org/officeDocument/2006/relationships" r:embed="rId5">
-            <a:extLst>
-              <a:ext uri="{28A0092B-C50C-407E-A947-70E740481C1C}">
-                <a14:useLocalDpi xmlns:a14="http://schemas.microsoft.com/office/drawing/2010/main" val="0"/>
-              </a:ext>
-            </a:extLst>
-          </a:blip>
-          <a:srcRect/>
-          <a:stretch>
-            <a:fillRect t="-40000" b="-40000"/>
-          </a:stretch>
-        </a:blipFill>
-      </dgm:spPr>
-    </dgm:pt>
-    <dgm:pt modelId="{3D4B0FF5-A018-474D-BC99-526BEE3507B4}" type="pres">
-      <dgm:prSet presAssocID="{FC372CDE-1FA8-43CD-92BF-BE02F8431239}" presName="sibTrans" presStyleCnt="0"/>
-      <dgm:spPr/>
-    </dgm:pt>
-    <dgm:pt modelId="{73FFDB61-AB75-442B-8F1A-DD5089CC152C}" type="pres">
-      <dgm:prSet presAssocID="{1D49A373-EC73-423C-844B-BB0FDA7F3F87}" presName="composite" presStyleCnt="0"/>
-      <dgm:spPr/>
-    </dgm:pt>
-    <dgm:pt modelId="{0B494733-9138-43DE-B904-543A92E88131}" type="pres">
-      <dgm:prSet presAssocID="{1D49A373-EC73-423C-844B-BB0FDA7F3F87}" presName="rect1" presStyleLbl="trAlignAcc1" presStyleIdx="2" presStyleCnt="3" custScaleX="127844" custLinFactNeighborX="13703" custLinFactNeighborY="941">
-        <dgm:presLayoutVars>
-          <dgm:bulletEnabled val="1"/>
-        </dgm:presLayoutVars>
-      </dgm:prSet>
-      <dgm:spPr/>
-    </dgm:pt>
-    <dgm:pt modelId="{114784D1-D9A3-4A0E-A0E7-3563F0DD5AD5}" type="pres">
-      <dgm:prSet presAssocID="{1D49A373-EC73-423C-844B-BB0FDA7F3F87}" presName="rect2" presStyleLbl="fgImgPlace1" presStyleIdx="2" presStyleCnt="3" custScaleX="235741" custLinFactX="-71073" custLinFactNeighborX="-100000" custLinFactNeighborY="9942"/>
-      <dgm:spPr>
-        <a:blipFill>
-          <a:blip xmlns:r="http://schemas.openxmlformats.org/officeDocument/2006/relationships" r:embed="rId6">
-            <a:extLst>
-              <a:ext uri="{28A0092B-C50C-407E-A947-70E740481C1C}">
-                <a14:useLocalDpi xmlns:a14="http://schemas.microsoft.com/office/drawing/2010/main" val="0"/>
-              </a:ext>
-            </a:extLst>
-          </a:blip>
-          <a:srcRect/>
-          <a:stretch>
-            <a:fillRect t="-30000" b="-30000"/>
-          </a:stretch>
-        </a:blipFill>
-      </dgm:spPr>
-    </dgm:pt>
-  </dgm:ptLst>
-  <dgm:cxnLst>
-    <dgm:cxn modelId="{0029EC16-20F9-4E88-B8BE-F6E87CE65DAB}" srcId="{67C4C166-1694-4082-AD86-17AC184B67AE}" destId="{52B1B63E-41E2-4467-9680-00C3F61C48E1}" srcOrd="1" destOrd="0" parTransId="{BD4F415B-843C-472A-927E-46FB71C1D576}" sibTransId="{FC372CDE-1FA8-43CD-92BF-BE02F8431239}"/>
-    <dgm:cxn modelId="{9E3B8696-BF9E-4C83-BB64-82B06A1ECB38}" srcId="{67C4C166-1694-4082-AD86-17AC184B67AE}" destId="{E728C00E-A1AA-4739-8323-29D761CFF3E6}" srcOrd="0" destOrd="0" parTransId="{FE19B27C-0380-420F-939D-5E3861139F89}" sibTransId="{175A6747-9761-4569-91D2-FBFBDE38172A}"/>
-    <dgm:cxn modelId="{9B2A5FB2-A76D-459F-AF4A-8F2A6E96AABA}" type="presOf" srcId="{E728C00E-A1AA-4739-8323-29D761CFF3E6}" destId="{66D0A532-B7B6-4C55-9E1C-ACF9BEE3BB5E}" srcOrd="0" destOrd="0" presId="urn:microsoft.com/office/officeart/2008/layout/PictureStrips"/>
-    <dgm:cxn modelId="{0554AF91-C84E-47F1-896C-76E70DB00365}" type="presOf" srcId="{1D49A373-EC73-423C-844B-BB0FDA7F3F87}" destId="{0B494733-9138-43DE-B904-543A92E88131}" srcOrd="0" destOrd="0" presId="urn:microsoft.com/office/officeart/2008/layout/PictureStrips"/>
-    <dgm:cxn modelId="{AA51EC0D-46F1-4A9B-AE2B-13C245219792}" type="presOf" srcId="{67C4C166-1694-4082-AD86-17AC184B67AE}" destId="{C9B5D593-18E5-4DAB-897B-F8DF3F5C987A}" srcOrd="0" destOrd="0" presId="urn:microsoft.com/office/officeart/2008/layout/PictureStrips"/>
-    <dgm:cxn modelId="{799CEF44-01D8-4EA0-A387-D1DC3EDEFCF4}" type="presOf" srcId="{52B1B63E-41E2-4467-9680-00C3F61C48E1}" destId="{94FF6EB2-8032-46F0-A7F4-2F56FD9838D0}" srcOrd="0" destOrd="0" presId="urn:microsoft.com/office/officeart/2008/layout/PictureStrips"/>
-    <dgm:cxn modelId="{4DD332DA-5D47-4685-9556-1CFFEC287F4E}" srcId="{67C4C166-1694-4082-AD86-17AC184B67AE}" destId="{1D49A373-EC73-423C-844B-BB0FDA7F3F87}" srcOrd="2" destOrd="0" parTransId="{05E9ABBD-2272-4340-91AE-8AAE86129038}" sibTransId="{CC193482-8CD0-4661-A815-DC4D9FE65D61}"/>
-    <dgm:cxn modelId="{6349224D-CBF4-4137-9C46-A9FFB36F8326}" type="presParOf" srcId="{C9B5D593-18E5-4DAB-897B-F8DF3F5C987A}" destId="{9469D957-E1DE-49A7-B257-109A5BFBD013}" srcOrd="0" destOrd="0" presId="urn:microsoft.com/office/officeart/2008/layout/PictureStrips"/>
-    <dgm:cxn modelId="{BD2675FD-A595-426D-9454-4DA5B3FD39AB}" type="presParOf" srcId="{9469D957-E1DE-49A7-B257-109A5BFBD013}" destId="{66D0A532-B7B6-4C55-9E1C-ACF9BEE3BB5E}" srcOrd="0" destOrd="0" presId="urn:microsoft.com/office/officeart/2008/layout/PictureStrips"/>
-    <dgm:cxn modelId="{A700A8C7-6AA9-41F5-B97F-940802E42409}" type="presParOf" srcId="{9469D957-E1DE-49A7-B257-109A5BFBD013}" destId="{F10D4FFD-8F5B-4F36-A144-518F5A90FF3D}" srcOrd="1" destOrd="0" presId="urn:microsoft.com/office/officeart/2008/layout/PictureStrips"/>
-    <dgm:cxn modelId="{7AE69B1C-9641-455C-8835-01096E239644}" type="presParOf" srcId="{C9B5D593-18E5-4DAB-897B-F8DF3F5C987A}" destId="{2855697A-E96B-4D1C-BA1B-645345D52C4F}" srcOrd="1" destOrd="0" presId="urn:microsoft.com/office/officeart/2008/layout/PictureStrips"/>
-    <dgm:cxn modelId="{4B9C076F-C283-420B-B9CA-065CF748BACF}" type="presParOf" srcId="{C9B5D593-18E5-4DAB-897B-F8DF3F5C987A}" destId="{A183990E-73CE-4F34-8E74-D6147BC92A1C}" srcOrd="2" destOrd="0" presId="urn:microsoft.com/office/officeart/2008/layout/PictureStrips"/>
-    <dgm:cxn modelId="{671A6A90-3500-4FB4-AB9F-D0D8C891D45F}" type="presParOf" srcId="{A183990E-73CE-4F34-8E74-D6147BC92A1C}" destId="{94FF6EB2-8032-46F0-A7F4-2F56FD9838D0}" srcOrd="0" destOrd="0" presId="urn:microsoft.com/office/officeart/2008/layout/PictureStrips"/>
-    <dgm:cxn modelId="{27DCA281-3F04-478A-BC1A-54D095B33493}" type="presParOf" srcId="{A183990E-73CE-4F34-8E74-D6147BC92A1C}" destId="{C894DC1D-3BF3-4731-9FC4-ED1F118B5765}" srcOrd="1" destOrd="0" presId="urn:microsoft.com/office/officeart/2008/layout/PictureStrips"/>
-    <dgm:cxn modelId="{DF935BA9-3AC5-459E-ADC6-BE2B8298CCF3}" type="presParOf" srcId="{C9B5D593-18E5-4DAB-897B-F8DF3F5C987A}" destId="{3D4B0FF5-A018-474D-BC99-526BEE3507B4}" srcOrd="3" destOrd="0" presId="urn:microsoft.com/office/officeart/2008/layout/PictureStrips"/>
-    <dgm:cxn modelId="{71C213BB-8516-4649-84BE-48E75BB0F488}" type="presParOf" srcId="{C9B5D593-18E5-4DAB-897B-F8DF3F5C987A}" destId="{73FFDB61-AB75-442B-8F1A-DD5089CC152C}" srcOrd="4" destOrd="0" presId="urn:microsoft.com/office/officeart/2008/layout/PictureStrips"/>
-    <dgm:cxn modelId="{5B01EF25-454B-44EA-A677-632052B47B43}" type="presParOf" srcId="{73FFDB61-AB75-442B-8F1A-DD5089CC152C}" destId="{0B494733-9138-43DE-B904-543A92E88131}" srcOrd="0" destOrd="0" presId="urn:microsoft.com/office/officeart/2008/layout/PictureStrips"/>
-    <dgm:cxn modelId="{C9FF04AB-E03F-40D6-94E3-5C04B2C2E2DF}" type="presParOf" srcId="{73FFDB61-AB75-442B-8F1A-DD5089CC152C}" destId="{114784D1-D9A3-4A0E-A0E7-3563F0DD5AD5}" srcOrd="1" destOrd="0" presId="urn:microsoft.com/office/officeart/2008/layout/PictureStrips"/>
-  </dgm:cxnLst>
-  <dgm:bg/>
-  <dgm:whole/>
-  <dgm:extLst>
-    <a:ext uri="http://schemas.microsoft.com/office/drawing/2008/diagram">
-      <dsp:dataModelExt xmlns:dsp="http://schemas.microsoft.com/office/drawing/2008/diagram" relId="rId6" minVer="http://schemas.openxmlformats.org/drawingml/2006/diagram"/>
-    </a:ext>
-  </dgm:extLst>
-</dgm:dataModel>
-</file>
-
-<file path=ppt/diagrams/data5.xml><?xml version="1.0" encoding="utf-8"?>
-<dgm:dataModel xmlns:dgm="http://schemas.openxmlformats.org/drawingml/2006/diagram" xmlns:a="http://schemas.openxmlformats.org/drawingml/2006/main">
-  <dgm:ptLst>
     <dgm:pt modelId="{07B8C0C7-DEE1-4E00-9785-8D91690AD589}" type="doc">
       <dgm:prSet loTypeId="urn:microsoft.com/office/officeart/2005/8/layout/vList3" loCatId="list" qsTypeId="urn:microsoft.com/office/officeart/2005/8/quickstyle/simple1" qsCatId="simple" csTypeId="urn:microsoft.com/office/officeart/2005/8/colors/accent2_1" csCatId="accent2" phldr="1"/>
       <dgm:spPr/>
@@ -6198,7 +4313,7 @@
 </dgm:dataModel>
 </file>
 
-<file path=ppt/diagrams/data6.xml><?xml version="1.0" encoding="utf-8"?>
+<file path=ppt/diagrams/data3.xml><?xml version="1.0" encoding="utf-8"?>
 <dgm:dataModel xmlns:dgm="http://schemas.openxmlformats.org/drawingml/2006/diagram" xmlns:a="http://schemas.openxmlformats.org/drawingml/2006/main">
   <dgm:ptLst>
     <dgm:pt modelId="{BAB48130-70C5-4A63-AAF2-09DEB50FDF69}" type="doc">
@@ -6509,7 +4624,294 @@
 </dgm:dataModel>
 </file>
 
-<file path=ppt/diagrams/data7.xml><?xml version="1.0" encoding="utf-8"?>
+<file path=ppt/diagrams/data4.xml><?xml version="1.0" encoding="utf-8"?>
+<dgm:dataModel xmlns:dgm="http://schemas.openxmlformats.org/drawingml/2006/diagram" xmlns:a="http://schemas.openxmlformats.org/drawingml/2006/main">
+  <dgm:ptLst>
+    <dgm:pt modelId="{67C4C166-1694-4082-AD86-17AC184B67AE}" type="doc">
+      <dgm:prSet loTypeId="urn:microsoft.com/office/officeart/2008/layout/PictureStrips" loCatId="list" qsTypeId="urn:microsoft.com/office/officeart/2005/8/quickstyle/simple1" qsCatId="simple" csTypeId="urn:microsoft.com/office/officeart/2005/8/colors/accent1_2" csCatId="accent1" phldr="1"/>
+      <dgm:spPr/>
+      <dgm:t>
+        <a:bodyPr/>
+        <a:lstStyle/>
+        <a:p>
+          <a:endParaRPr lang="en-US"/>
+        </a:p>
+      </dgm:t>
+    </dgm:pt>
+    <dgm:pt modelId="{E728C00E-A1AA-4739-8323-29D761CFF3E6}">
+      <dgm:prSet phldrT="[Text]" custT="1"/>
+      <dgm:spPr>
+        <a:blipFill>
+          <a:blip xmlns:r="http://schemas.openxmlformats.org/officeDocument/2006/relationships" r:embed="rId1"/>
+          <a:stretch>
+            <a:fillRect r="-1611" b="-3433"/>
+          </a:stretch>
+        </a:blipFill>
+      </dgm:spPr>
+      <dgm:t>
+        <a:bodyPr/>
+        <a:lstStyle/>
+        <a:p>
+          <a:r>
+            <a:rPr lang="en-US">
+              <a:noFill/>
+            </a:rPr>
+            <a:t> </a:t>
+          </a:r>
+        </a:p>
+      </dgm:t>
+    </dgm:pt>
+    <dgm:pt modelId="{FE19B27C-0380-420F-939D-5E3861139F89}" type="parTrans" cxnId="{9E3B8696-BF9E-4C83-BB64-82B06A1ECB38}">
+      <dgm:prSet/>
+      <dgm:spPr/>
+      <dgm:t>
+        <a:bodyPr/>
+        <a:lstStyle/>
+        <a:p>
+          <a:endParaRPr lang="en-US"/>
+        </a:p>
+      </dgm:t>
+    </dgm:pt>
+    <dgm:pt modelId="{175A6747-9761-4569-91D2-FBFBDE38172A}" type="sibTrans" cxnId="{9E3B8696-BF9E-4C83-BB64-82B06A1ECB38}">
+      <dgm:prSet/>
+      <dgm:spPr/>
+      <dgm:t>
+        <a:bodyPr/>
+        <a:lstStyle/>
+        <a:p>
+          <a:endParaRPr lang="en-US"/>
+        </a:p>
+      </dgm:t>
+    </dgm:pt>
+    <dgm:pt modelId="{52B1B63E-41E2-4467-9680-00C3F61C48E1}">
+      <dgm:prSet phldrT="[Text]" custT="1"/>
+      <dgm:spPr>
+        <a:blipFill>
+          <a:blip xmlns:r="http://schemas.openxmlformats.org/officeDocument/2006/relationships" r:embed="rId2"/>
+          <a:stretch>
+            <a:fillRect r="-5870" b="-3879"/>
+          </a:stretch>
+        </a:blipFill>
+      </dgm:spPr>
+      <dgm:t>
+        <a:bodyPr/>
+        <a:lstStyle/>
+        <a:p>
+          <a:r>
+            <a:rPr lang="en-US">
+              <a:noFill/>
+            </a:rPr>
+            <a:t> </a:t>
+          </a:r>
+        </a:p>
+      </dgm:t>
+    </dgm:pt>
+    <dgm:pt modelId="{BD4F415B-843C-472A-927E-46FB71C1D576}" type="parTrans" cxnId="{0029EC16-20F9-4E88-B8BE-F6E87CE65DAB}">
+      <dgm:prSet/>
+      <dgm:spPr/>
+      <dgm:t>
+        <a:bodyPr/>
+        <a:lstStyle/>
+        <a:p>
+          <a:endParaRPr lang="en-US"/>
+        </a:p>
+      </dgm:t>
+    </dgm:pt>
+    <dgm:pt modelId="{FC372CDE-1FA8-43CD-92BF-BE02F8431239}" type="sibTrans" cxnId="{0029EC16-20F9-4E88-B8BE-F6E87CE65DAB}">
+      <dgm:prSet/>
+      <dgm:spPr/>
+      <dgm:t>
+        <a:bodyPr/>
+        <a:lstStyle/>
+        <a:p>
+          <a:endParaRPr lang="en-US"/>
+        </a:p>
+      </dgm:t>
+    </dgm:pt>
+    <dgm:pt modelId="{1D49A373-EC73-423C-844B-BB0FDA7F3F87}">
+      <dgm:prSet phldrT="[Text]" custT="1"/>
+      <dgm:spPr>
+        <a:blipFill>
+          <a:blip xmlns:r="http://schemas.openxmlformats.org/officeDocument/2006/relationships" r:embed="rId3"/>
+          <a:stretch>
+            <a:fillRect t="-429" r="-3911" b="-2146"/>
+          </a:stretch>
+        </a:blipFill>
+      </dgm:spPr>
+      <dgm:t>
+        <a:bodyPr/>
+        <a:lstStyle/>
+        <a:p>
+          <a:r>
+            <a:rPr lang="en-US">
+              <a:noFill/>
+            </a:rPr>
+            <a:t> </a:t>
+          </a:r>
+        </a:p>
+      </dgm:t>
+    </dgm:pt>
+    <dgm:pt modelId="{05E9ABBD-2272-4340-91AE-8AAE86129038}" type="parTrans" cxnId="{4DD332DA-5D47-4685-9556-1CFFEC287F4E}">
+      <dgm:prSet/>
+      <dgm:spPr/>
+      <dgm:t>
+        <a:bodyPr/>
+        <a:lstStyle/>
+        <a:p>
+          <a:endParaRPr lang="en-US"/>
+        </a:p>
+      </dgm:t>
+    </dgm:pt>
+    <dgm:pt modelId="{CC193482-8CD0-4661-A815-DC4D9FE65D61}" type="sibTrans" cxnId="{4DD332DA-5D47-4685-9556-1CFFEC287F4E}">
+      <dgm:prSet/>
+      <dgm:spPr/>
+      <dgm:t>
+        <a:bodyPr/>
+        <a:lstStyle/>
+        <a:p>
+          <a:endParaRPr lang="en-US"/>
+        </a:p>
+      </dgm:t>
+    </dgm:pt>
+    <dgm:pt modelId="{C9B5D593-18E5-4DAB-897B-F8DF3F5C987A}" type="pres">
+      <dgm:prSet presAssocID="{67C4C166-1694-4082-AD86-17AC184B67AE}" presName="Name0" presStyleCnt="0">
+        <dgm:presLayoutVars>
+          <dgm:dir/>
+          <dgm:resizeHandles val="exact"/>
+        </dgm:presLayoutVars>
+      </dgm:prSet>
+      <dgm:spPr/>
+    </dgm:pt>
+    <dgm:pt modelId="{9469D957-E1DE-49A7-B257-109A5BFBD013}" type="pres">
+      <dgm:prSet presAssocID="{E728C00E-A1AA-4739-8323-29D761CFF3E6}" presName="composite" presStyleCnt="0"/>
+      <dgm:spPr/>
+    </dgm:pt>
+    <dgm:pt modelId="{66D0A532-B7B6-4C55-9E1C-ACF9BEE3BB5E}" type="pres">
+      <dgm:prSet presAssocID="{E728C00E-A1AA-4739-8323-29D761CFF3E6}" presName="rect1" presStyleLbl="trAlignAcc1" presStyleIdx="0" presStyleCnt="3" custScaleX="125782" custLinFactNeighborX="12883" custLinFactNeighborY="-3184">
+        <dgm:presLayoutVars>
+          <dgm:bulletEnabled val="1"/>
+        </dgm:presLayoutVars>
+      </dgm:prSet>
+      <dgm:spPr/>
+    </dgm:pt>
+    <dgm:pt modelId="{F10D4FFD-8F5B-4F36-A144-518F5A90FF3D}" type="pres">
+      <dgm:prSet presAssocID="{E728C00E-A1AA-4739-8323-29D761CFF3E6}" presName="rect2" presStyleLbl="fgImgPlace1" presStyleIdx="0" presStyleCnt="3" custScaleX="236890" custLinFactX="-71073" custLinFactNeighborX="-100000" custLinFactNeighborY="5529"/>
+      <dgm:spPr>
+        <a:blipFill>
+          <a:blip xmlns:r="http://schemas.openxmlformats.org/officeDocument/2006/relationships" r:embed="rId4">
+            <a:extLst>
+              <a:ext uri="{28A0092B-C50C-407E-A947-70E740481C1C}">
+                <a14:useLocalDpi xmlns:a14="http://schemas.microsoft.com/office/drawing/2010/main" val="0"/>
+              </a:ext>
+            </a:extLst>
+          </a:blip>
+          <a:srcRect/>
+          <a:stretch>
+            <a:fillRect t="-40000" b="-40000"/>
+          </a:stretch>
+        </a:blipFill>
+      </dgm:spPr>
+    </dgm:pt>
+    <dgm:pt modelId="{2855697A-E96B-4D1C-BA1B-645345D52C4F}" type="pres">
+      <dgm:prSet presAssocID="{175A6747-9761-4569-91D2-FBFBDE38172A}" presName="sibTrans" presStyleCnt="0"/>
+      <dgm:spPr/>
+    </dgm:pt>
+    <dgm:pt modelId="{A183990E-73CE-4F34-8E74-D6147BC92A1C}" type="pres">
+      <dgm:prSet presAssocID="{52B1B63E-41E2-4467-9680-00C3F61C48E1}" presName="composite" presStyleCnt="0"/>
+      <dgm:spPr/>
+    </dgm:pt>
+    <dgm:pt modelId="{94FF6EB2-8032-46F0-A7F4-2F56FD9838D0}" type="pres">
+      <dgm:prSet presAssocID="{52B1B63E-41E2-4467-9680-00C3F61C48E1}" presName="rect1" presStyleLbl="trAlignAcc1" presStyleIdx="1" presStyleCnt="3" custScaleX="128787" custScaleY="99530" custLinFactNeighborX="13996" custLinFactNeighborY="-3720">
+        <dgm:presLayoutVars>
+          <dgm:bulletEnabled val="1"/>
+        </dgm:presLayoutVars>
+      </dgm:prSet>
+      <dgm:spPr/>
+    </dgm:pt>
+    <dgm:pt modelId="{C894DC1D-3BF3-4731-9FC4-ED1F118B5765}" type="pres">
+      <dgm:prSet presAssocID="{52B1B63E-41E2-4467-9680-00C3F61C48E1}" presName="rect2" presStyleLbl="fgImgPlace1" presStyleIdx="1" presStyleCnt="3" custScaleX="235256" custLinFactX="-71073" custLinFactNeighborX="-100000" custLinFactNeighborY="5137"/>
+      <dgm:spPr>
+        <a:blipFill>
+          <a:blip xmlns:r="http://schemas.openxmlformats.org/officeDocument/2006/relationships" r:embed="rId5">
+            <a:extLst>
+              <a:ext uri="{28A0092B-C50C-407E-A947-70E740481C1C}">
+                <a14:useLocalDpi xmlns:a14="http://schemas.microsoft.com/office/drawing/2010/main" val="0"/>
+              </a:ext>
+            </a:extLst>
+          </a:blip>
+          <a:srcRect/>
+          <a:stretch>
+            <a:fillRect t="-40000" b="-40000"/>
+          </a:stretch>
+        </a:blipFill>
+      </dgm:spPr>
+    </dgm:pt>
+    <dgm:pt modelId="{3D4B0FF5-A018-474D-BC99-526BEE3507B4}" type="pres">
+      <dgm:prSet presAssocID="{FC372CDE-1FA8-43CD-92BF-BE02F8431239}" presName="sibTrans" presStyleCnt="0"/>
+      <dgm:spPr/>
+    </dgm:pt>
+    <dgm:pt modelId="{73FFDB61-AB75-442B-8F1A-DD5089CC152C}" type="pres">
+      <dgm:prSet presAssocID="{1D49A373-EC73-423C-844B-BB0FDA7F3F87}" presName="composite" presStyleCnt="0"/>
+      <dgm:spPr/>
+    </dgm:pt>
+    <dgm:pt modelId="{0B494733-9138-43DE-B904-543A92E88131}" type="pres">
+      <dgm:prSet presAssocID="{1D49A373-EC73-423C-844B-BB0FDA7F3F87}" presName="rect1" presStyleLbl="trAlignAcc1" presStyleIdx="2" presStyleCnt="3" custScaleX="127844" custLinFactNeighborX="13703" custLinFactNeighborY="941">
+        <dgm:presLayoutVars>
+          <dgm:bulletEnabled val="1"/>
+        </dgm:presLayoutVars>
+      </dgm:prSet>
+      <dgm:spPr/>
+    </dgm:pt>
+    <dgm:pt modelId="{114784D1-D9A3-4A0E-A0E7-3563F0DD5AD5}" type="pres">
+      <dgm:prSet presAssocID="{1D49A373-EC73-423C-844B-BB0FDA7F3F87}" presName="rect2" presStyleLbl="fgImgPlace1" presStyleIdx="2" presStyleCnt="3" custScaleX="235741" custLinFactX="-71073" custLinFactNeighborX="-100000" custLinFactNeighborY="9942"/>
+      <dgm:spPr>
+        <a:blipFill>
+          <a:blip xmlns:r="http://schemas.openxmlformats.org/officeDocument/2006/relationships" r:embed="rId6">
+            <a:extLst>
+              <a:ext uri="{28A0092B-C50C-407E-A947-70E740481C1C}">
+                <a14:useLocalDpi xmlns:a14="http://schemas.microsoft.com/office/drawing/2010/main" val="0"/>
+              </a:ext>
+            </a:extLst>
+          </a:blip>
+          <a:srcRect/>
+          <a:stretch>
+            <a:fillRect t="-30000" b="-30000"/>
+          </a:stretch>
+        </a:blipFill>
+      </dgm:spPr>
+    </dgm:pt>
+  </dgm:ptLst>
+  <dgm:cxnLst>
+    <dgm:cxn modelId="{0029EC16-20F9-4E88-B8BE-F6E87CE65DAB}" srcId="{67C4C166-1694-4082-AD86-17AC184B67AE}" destId="{52B1B63E-41E2-4467-9680-00C3F61C48E1}" srcOrd="1" destOrd="0" parTransId="{BD4F415B-843C-472A-927E-46FB71C1D576}" sibTransId="{FC372CDE-1FA8-43CD-92BF-BE02F8431239}"/>
+    <dgm:cxn modelId="{9E3B8696-BF9E-4C83-BB64-82B06A1ECB38}" srcId="{67C4C166-1694-4082-AD86-17AC184B67AE}" destId="{E728C00E-A1AA-4739-8323-29D761CFF3E6}" srcOrd="0" destOrd="0" parTransId="{FE19B27C-0380-420F-939D-5E3861139F89}" sibTransId="{175A6747-9761-4569-91D2-FBFBDE38172A}"/>
+    <dgm:cxn modelId="{9B2A5FB2-A76D-459F-AF4A-8F2A6E96AABA}" type="presOf" srcId="{E728C00E-A1AA-4739-8323-29D761CFF3E6}" destId="{66D0A532-B7B6-4C55-9E1C-ACF9BEE3BB5E}" srcOrd="0" destOrd="0" presId="urn:microsoft.com/office/officeart/2008/layout/PictureStrips"/>
+    <dgm:cxn modelId="{0554AF91-C84E-47F1-896C-76E70DB00365}" type="presOf" srcId="{1D49A373-EC73-423C-844B-BB0FDA7F3F87}" destId="{0B494733-9138-43DE-B904-543A92E88131}" srcOrd="0" destOrd="0" presId="urn:microsoft.com/office/officeart/2008/layout/PictureStrips"/>
+    <dgm:cxn modelId="{AA51EC0D-46F1-4A9B-AE2B-13C245219792}" type="presOf" srcId="{67C4C166-1694-4082-AD86-17AC184B67AE}" destId="{C9B5D593-18E5-4DAB-897B-F8DF3F5C987A}" srcOrd="0" destOrd="0" presId="urn:microsoft.com/office/officeart/2008/layout/PictureStrips"/>
+    <dgm:cxn modelId="{799CEF44-01D8-4EA0-A387-D1DC3EDEFCF4}" type="presOf" srcId="{52B1B63E-41E2-4467-9680-00C3F61C48E1}" destId="{94FF6EB2-8032-46F0-A7F4-2F56FD9838D0}" srcOrd="0" destOrd="0" presId="urn:microsoft.com/office/officeart/2008/layout/PictureStrips"/>
+    <dgm:cxn modelId="{4DD332DA-5D47-4685-9556-1CFFEC287F4E}" srcId="{67C4C166-1694-4082-AD86-17AC184B67AE}" destId="{1D49A373-EC73-423C-844B-BB0FDA7F3F87}" srcOrd="2" destOrd="0" parTransId="{05E9ABBD-2272-4340-91AE-8AAE86129038}" sibTransId="{CC193482-8CD0-4661-A815-DC4D9FE65D61}"/>
+    <dgm:cxn modelId="{6349224D-CBF4-4137-9C46-A9FFB36F8326}" type="presParOf" srcId="{C9B5D593-18E5-4DAB-897B-F8DF3F5C987A}" destId="{9469D957-E1DE-49A7-B257-109A5BFBD013}" srcOrd="0" destOrd="0" presId="urn:microsoft.com/office/officeart/2008/layout/PictureStrips"/>
+    <dgm:cxn modelId="{BD2675FD-A595-426D-9454-4DA5B3FD39AB}" type="presParOf" srcId="{9469D957-E1DE-49A7-B257-109A5BFBD013}" destId="{66D0A532-B7B6-4C55-9E1C-ACF9BEE3BB5E}" srcOrd="0" destOrd="0" presId="urn:microsoft.com/office/officeart/2008/layout/PictureStrips"/>
+    <dgm:cxn modelId="{A700A8C7-6AA9-41F5-B97F-940802E42409}" type="presParOf" srcId="{9469D957-E1DE-49A7-B257-109A5BFBD013}" destId="{F10D4FFD-8F5B-4F36-A144-518F5A90FF3D}" srcOrd="1" destOrd="0" presId="urn:microsoft.com/office/officeart/2008/layout/PictureStrips"/>
+    <dgm:cxn modelId="{7AE69B1C-9641-455C-8835-01096E239644}" type="presParOf" srcId="{C9B5D593-18E5-4DAB-897B-F8DF3F5C987A}" destId="{2855697A-E96B-4D1C-BA1B-645345D52C4F}" srcOrd="1" destOrd="0" presId="urn:microsoft.com/office/officeart/2008/layout/PictureStrips"/>
+    <dgm:cxn modelId="{4B9C076F-C283-420B-B9CA-065CF748BACF}" type="presParOf" srcId="{C9B5D593-18E5-4DAB-897B-F8DF3F5C987A}" destId="{A183990E-73CE-4F34-8E74-D6147BC92A1C}" srcOrd="2" destOrd="0" presId="urn:microsoft.com/office/officeart/2008/layout/PictureStrips"/>
+    <dgm:cxn modelId="{671A6A90-3500-4FB4-AB9F-D0D8C891D45F}" type="presParOf" srcId="{A183990E-73CE-4F34-8E74-D6147BC92A1C}" destId="{94FF6EB2-8032-46F0-A7F4-2F56FD9838D0}" srcOrd="0" destOrd="0" presId="urn:microsoft.com/office/officeart/2008/layout/PictureStrips"/>
+    <dgm:cxn modelId="{27DCA281-3F04-478A-BC1A-54D095B33493}" type="presParOf" srcId="{A183990E-73CE-4F34-8E74-D6147BC92A1C}" destId="{C894DC1D-3BF3-4731-9FC4-ED1F118B5765}" srcOrd="1" destOrd="0" presId="urn:microsoft.com/office/officeart/2008/layout/PictureStrips"/>
+    <dgm:cxn modelId="{DF935BA9-3AC5-459E-ADC6-BE2B8298CCF3}" type="presParOf" srcId="{C9B5D593-18E5-4DAB-897B-F8DF3F5C987A}" destId="{3D4B0FF5-A018-474D-BC99-526BEE3507B4}" srcOrd="3" destOrd="0" presId="urn:microsoft.com/office/officeart/2008/layout/PictureStrips"/>
+    <dgm:cxn modelId="{71C213BB-8516-4649-84BE-48E75BB0F488}" type="presParOf" srcId="{C9B5D593-18E5-4DAB-897B-F8DF3F5C987A}" destId="{73FFDB61-AB75-442B-8F1A-DD5089CC152C}" srcOrd="4" destOrd="0" presId="urn:microsoft.com/office/officeart/2008/layout/PictureStrips"/>
+    <dgm:cxn modelId="{5B01EF25-454B-44EA-A677-632052B47B43}" type="presParOf" srcId="{73FFDB61-AB75-442B-8F1A-DD5089CC152C}" destId="{0B494733-9138-43DE-B904-543A92E88131}" srcOrd="0" destOrd="0" presId="urn:microsoft.com/office/officeart/2008/layout/PictureStrips"/>
+    <dgm:cxn modelId="{C9FF04AB-E03F-40D6-94E3-5C04B2C2E2DF}" type="presParOf" srcId="{73FFDB61-AB75-442B-8F1A-DD5089CC152C}" destId="{114784D1-D9A3-4A0E-A0E7-3563F0DD5AD5}" srcOrd="1" destOrd="0" presId="urn:microsoft.com/office/officeart/2008/layout/PictureStrips"/>
+  </dgm:cxnLst>
+  <dgm:bg/>
+  <dgm:whole/>
+  <dgm:extLst>
+    <a:ext uri="http://schemas.microsoft.com/office/drawing/2008/diagram">
+      <dsp:dataModelExt xmlns:dsp="http://schemas.microsoft.com/office/drawing/2008/diagram" relId="rId6" minVer="http://schemas.openxmlformats.org/drawingml/2006/diagram"/>
+    </a:ext>
+  </dgm:extLst>
+</dgm:dataModel>
+</file>
+
+<file path=ppt/diagrams/data5.xml><?xml version="1.0" encoding="utf-8"?>
 <dgm:dataModel xmlns:dgm="http://schemas.openxmlformats.org/drawingml/2006/diagram" xmlns:a="http://schemas.openxmlformats.org/drawingml/2006/main">
   <dgm:ptLst>
     <dgm:pt modelId="{9C7A37B0-E0BD-4182-AD04-54BBDFF161C7}" type="doc">
@@ -7656,600 +6058,6 @@
       <dsp:cNvGrpSpPr/>
     </dsp:nvGrpSpPr>
     <dsp:grpSpPr/>
-    <dsp:sp modelId="{66D0A532-B7B6-4C55-9E1C-ACF9BEE3BB5E}">
-      <dsp:nvSpPr>
-        <dsp:cNvPr id="0" name=""/>
-        <dsp:cNvSpPr/>
-      </dsp:nvSpPr>
-      <dsp:spPr>
-        <a:xfrm>
-          <a:off x="2295378" y="288535"/>
-          <a:ext cx="5663862" cy="1407162"/>
-        </a:xfrm>
-        <a:prstGeom prst="rect">
-          <a:avLst/>
-        </a:prstGeom>
-        <a:solidFill>
-          <a:schemeClr val="lt1">
-            <a:alpha val="40000"/>
-            <a:hueOff val="0"/>
-            <a:satOff val="0"/>
-            <a:lumOff val="0"/>
-            <a:alphaOff val="0"/>
-          </a:schemeClr>
-        </a:solidFill>
-        <a:ln w="9525" cap="flat" cmpd="sng" algn="ctr">
-          <a:solidFill>
-            <a:schemeClr val="accent1">
-              <a:hueOff val="0"/>
-              <a:satOff val="0"/>
-              <a:lumOff val="0"/>
-              <a:alphaOff val="0"/>
-            </a:schemeClr>
-          </a:solidFill>
-          <a:prstDash val="solid"/>
-        </a:ln>
-        <a:effectLst/>
-      </dsp:spPr>
-      <dsp:style>
-        <a:lnRef idx="1">
-          <a:scrgbClr r="0" g="0" b="0"/>
-        </a:lnRef>
-        <a:fillRef idx="1">
-          <a:scrgbClr r="0" g="0" b="0"/>
-        </a:fillRef>
-        <a:effectRef idx="0">
-          <a:scrgbClr r="0" g="0" b="0"/>
-        </a:effectRef>
-        <a:fontRef idx="minor"/>
-      </dsp:style>
-      <dsp:txBody>
-        <a:bodyPr spcFirstLastPara="0" vert="horz" wrap="square" lIns="953118" tIns="91440" rIns="91440" bIns="91440" numCol="1" spcCol="1270" anchor="ctr" anchorCtr="0">
-          <a:noAutofit/>
-        </a:bodyPr>
-        <a:lstStyle/>
-        <a:p>
-          <a:pPr marL="0" lvl="0" indent="0" algn="l" defTabSz="1066800">
-            <a:lnSpc>
-              <a:spcPct val="90000"/>
-            </a:lnSpc>
-            <a:spcBef>
-              <a:spcPct val="0"/>
-            </a:spcBef>
-            <a:spcAft>
-              <a:spcPct val="35000"/>
-            </a:spcAft>
-            <a:buNone/>
-          </a:pPr>
-          <a:r>
-            <a:rPr lang="en-US" sz="2400" b="1" kern="1200" dirty="0"/>
-            <a:t>Metal Industry</a:t>
-          </a:r>
-        </a:p>
-        <a:p>
-          <a:pPr marL="0" lvl="0" indent="0" algn="just" defTabSz="1066800">
-            <a:lnSpc>
-              <a:spcPct val="90000"/>
-            </a:lnSpc>
-            <a:spcBef>
-              <a:spcPct val="0"/>
-            </a:spcBef>
-            <a:spcAft>
-              <a:spcPct val="35000"/>
-            </a:spcAft>
-            <a:buNone/>
-          </a:pPr>
-          <a:r>
-            <a:rPr lang="en-US" sz="2400" i="1" kern="1200" dirty="0"/>
-            <a:t>Released 1.77x</a:t>
-          </a:r>
-          <a14:m xmlns:a14="http://schemas.microsoft.com/office/drawing/2010/main">
-            <m:oMath xmlns:m="http://schemas.openxmlformats.org/officeDocument/2006/math">
-              <m:sSup>
-                <m:sSupPr>
-                  <m:ctrlPr>
-                    <a:rPr lang="en-US" sz="2400" i="1" kern="1200" smtClean="0">
-                      <a:latin typeface="Cambria Math" panose="02040503050406030204" pitchFamily="18" charset="0"/>
-                    </a:rPr>
-                  </m:ctrlPr>
-                </m:sSupPr>
-                <m:e>
-                  <m:r>
-                    <a:rPr lang="en-US" sz="2400" b="0" i="1" kern="1200" smtClean="0">
-                      <a:latin typeface="Cambria Math"/>
-                    </a:rPr>
-                    <m:t>10</m:t>
-                  </m:r>
-                </m:e>
-                <m:sup>
-                  <m:r>
-                    <a:rPr lang="en-US" sz="2400" b="0" i="1" kern="1200" smtClean="0">
-                      <a:latin typeface="Cambria Math"/>
-                    </a:rPr>
-                    <m:t>09</m:t>
-                  </m:r>
-                </m:sup>
-              </m:sSup>
-            </m:oMath>
-          </a14:m>
-          <a:r>
-            <a:rPr lang="en-US" sz="2400" i="1" kern="1200" dirty="0"/>
-            <a:t> pounds of toxic waste in 2014</a:t>
-          </a:r>
-          <a:r>
-            <a:rPr lang="en-US" sz="1800" i="1" kern="1200" dirty="0"/>
-            <a:t>.</a:t>
-          </a:r>
-        </a:p>
-      </dsp:txBody>
-      <dsp:txXfrm>
-        <a:off x="2295378" y="288535"/>
-        <a:ext cx="5663862" cy="1407162"/>
-      </dsp:txXfrm>
-    </dsp:sp>
-    <dsp:sp modelId="{F10D4FFD-8F5B-4F36-A144-518F5A90FF3D}">
-      <dsp:nvSpPr>
-        <dsp:cNvPr id="0" name=""/>
-        <dsp:cNvSpPr/>
-      </dsp:nvSpPr>
-      <dsp:spPr>
-        <a:xfrm>
-          <a:off x="0" y="211774"/>
-          <a:ext cx="2333398" cy="1477520"/>
-        </a:xfrm>
-        <a:prstGeom prst="rect">
-          <a:avLst/>
-        </a:prstGeom>
-        <a:blipFill>
-          <a:blip xmlns:r="http://schemas.openxmlformats.org/officeDocument/2006/relationships" r:embed="rId1">
-            <a:extLst>
-              <a:ext uri="{28A0092B-C50C-407E-A947-70E740481C1C}">
-                <a14:useLocalDpi xmlns:a14="http://schemas.microsoft.com/office/drawing/2010/main" val="0"/>
-              </a:ext>
-            </a:extLst>
-          </a:blip>
-          <a:srcRect/>
-          <a:stretch>
-            <a:fillRect t="-40000" b="-40000"/>
-          </a:stretch>
-        </a:blipFill>
-        <a:ln w="25400" cap="flat" cmpd="sng" algn="ctr">
-          <a:solidFill>
-            <a:schemeClr val="lt1">
-              <a:hueOff val="0"/>
-              <a:satOff val="0"/>
-              <a:lumOff val="0"/>
-              <a:alphaOff val="0"/>
-            </a:schemeClr>
-          </a:solidFill>
-          <a:prstDash val="solid"/>
-        </a:ln>
-        <a:effectLst/>
-      </dsp:spPr>
-      <dsp:style>
-        <a:lnRef idx="2">
-          <a:scrgbClr r="0" g="0" b="0"/>
-        </a:lnRef>
-        <a:fillRef idx="1">
-          <a:scrgbClr r="0" g="0" b="0"/>
-        </a:fillRef>
-        <a:effectRef idx="0">
-          <a:scrgbClr r="0" g="0" b="0"/>
-        </a:effectRef>
-        <a:fontRef idx="minor"/>
-      </dsp:style>
-    </dsp:sp>
-    <dsp:sp modelId="{94FF6EB2-8032-46F0-A7F4-2F56FD9838D0}">
-      <dsp:nvSpPr>
-        <dsp:cNvPr id="0" name=""/>
-        <dsp:cNvSpPr/>
-      </dsp:nvSpPr>
-      <dsp:spPr>
-        <a:xfrm>
-          <a:off x="2239987" y="2055760"/>
-          <a:ext cx="5799175" cy="1400548"/>
-        </a:xfrm>
-        <a:prstGeom prst="rect">
-          <a:avLst/>
-        </a:prstGeom>
-        <a:solidFill>
-          <a:schemeClr val="lt1">
-            <a:alpha val="40000"/>
-            <a:hueOff val="0"/>
-            <a:satOff val="0"/>
-            <a:lumOff val="0"/>
-            <a:alphaOff val="0"/>
-          </a:schemeClr>
-        </a:solidFill>
-        <a:ln w="9525" cap="flat" cmpd="sng" algn="ctr">
-          <a:solidFill>
-            <a:schemeClr val="accent1">
-              <a:hueOff val="0"/>
-              <a:satOff val="0"/>
-              <a:lumOff val="0"/>
-              <a:alphaOff val="0"/>
-            </a:schemeClr>
-          </a:solidFill>
-          <a:prstDash val="solid"/>
-        </a:ln>
-        <a:effectLst/>
-      </dsp:spPr>
-      <dsp:style>
-        <a:lnRef idx="1">
-          <a:scrgbClr r="0" g="0" b="0"/>
-        </a:lnRef>
-        <a:fillRef idx="1">
-          <a:scrgbClr r="0" g="0" b="0"/>
-        </a:fillRef>
-        <a:effectRef idx="0">
-          <a:scrgbClr r="0" g="0" b="0"/>
-        </a:effectRef>
-        <a:fontRef idx="minor"/>
-      </dsp:style>
-      <dsp:txBody>
-        <a:bodyPr spcFirstLastPara="0" vert="horz" wrap="square" lIns="953118" tIns="91440" rIns="91440" bIns="91440" numCol="1" spcCol="1270" anchor="ctr" anchorCtr="0">
-          <a:noAutofit/>
-        </a:bodyPr>
-        <a:lstStyle/>
-        <a:p>
-          <a:pPr marL="0" lvl="0" indent="0" algn="l" defTabSz="1066800">
-            <a:lnSpc>
-              <a:spcPct val="90000"/>
-            </a:lnSpc>
-            <a:spcBef>
-              <a:spcPct val="0"/>
-            </a:spcBef>
-            <a:spcAft>
-              <a:spcPct val="35000"/>
-            </a:spcAft>
-            <a:buNone/>
-          </a:pPr>
-          <a:r>
-            <a:rPr lang="en-US" sz="2400" b="1" kern="1200" dirty="0"/>
-            <a:t>Electric Utilities</a:t>
-          </a:r>
-        </a:p>
-        <a:p>
-          <a:pPr marL="0" lvl="0" indent="0" algn="l" defTabSz="1066800">
-            <a:lnSpc>
-              <a:spcPct val="90000"/>
-            </a:lnSpc>
-            <a:spcBef>
-              <a:spcPct val="0"/>
-            </a:spcBef>
-            <a:spcAft>
-              <a:spcPct val="35000"/>
-            </a:spcAft>
-            <a:buNone/>
-          </a:pPr>
-          <a:r>
-            <a:rPr lang="en-US" sz="2400" i="1" kern="1200" dirty="0"/>
-            <a:t>Released 5.35x</a:t>
-          </a:r>
-          <a14:m xmlns:a14="http://schemas.microsoft.com/office/drawing/2010/main">
-            <m:oMath xmlns:m="http://schemas.openxmlformats.org/officeDocument/2006/math">
-              <m:sSup>
-                <m:sSupPr>
-                  <m:ctrlPr>
-                    <a:rPr lang="en-US" sz="2400" i="1" kern="1200" smtClean="0">
-                      <a:latin typeface="Cambria Math" panose="02040503050406030204" pitchFamily="18" charset="0"/>
-                    </a:rPr>
-                  </m:ctrlPr>
-                </m:sSupPr>
-                <m:e>
-                  <m:r>
-                    <a:rPr lang="en-US" sz="2400" b="0" i="1" kern="1200" smtClean="0">
-                      <a:latin typeface="Cambria Math"/>
-                    </a:rPr>
-                    <m:t>10</m:t>
-                  </m:r>
-                </m:e>
-                <m:sup>
-                  <m:r>
-                    <a:rPr lang="en-US" sz="2400" b="0" i="1" kern="1200" smtClean="0">
-                      <a:latin typeface="Cambria Math"/>
-                    </a:rPr>
-                    <m:t>08</m:t>
-                  </m:r>
-                </m:sup>
-              </m:sSup>
-            </m:oMath>
-          </a14:m>
-          <a:r>
-            <a:rPr lang="en-US" sz="2400" i="1" kern="1200" dirty="0"/>
-            <a:t> pounds of toxic         waste in 2014</a:t>
-          </a:r>
-          <a:r>
-            <a:rPr lang="en-US" sz="1800" i="1" kern="1200" dirty="0"/>
-            <a:t>.</a:t>
-          </a:r>
-          <a:endParaRPr lang="en-US" sz="1800" kern="1200" dirty="0"/>
-        </a:p>
-      </dsp:txBody>
-      <dsp:txXfrm>
-        <a:off x="2239987" y="2055760"/>
-        <a:ext cx="5799175" cy="1400548"/>
-      </dsp:txXfrm>
-    </dsp:sp>
-    <dsp:sp modelId="{C894DC1D-3BF3-4731-9FC4-ED1F118B5765}">
-      <dsp:nvSpPr>
-        <dsp:cNvPr id="0" name=""/>
-        <dsp:cNvSpPr/>
-      </dsp:nvSpPr>
-      <dsp:spPr>
-        <a:xfrm>
-          <a:off x="0" y="1977444"/>
-          <a:ext cx="2317303" cy="1477520"/>
-        </a:xfrm>
-        <a:prstGeom prst="rect">
-          <a:avLst/>
-        </a:prstGeom>
-        <a:blipFill>
-          <a:blip xmlns:r="http://schemas.openxmlformats.org/officeDocument/2006/relationships" r:embed="rId2">
-            <a:extLst>
-              <a:ext uri="{28A0092B-C50C-407E-A947-70E740481C1C}">
-                <a14:useLocalDpi xmlns:a14="http://schemas.microsoft.com/office/drawing/2010/main" val="0"/>
-              </a:ext>
-            </a:extLst>
-          </a:blip>
-          <a:srcRect/>
-          <a:stretch>
-            <a:fillRect t="-40000" b="-40000"/>
-          </a:stretch>
-        </a:blipFill>
-        <a:ln w="25400" cap="flat" cmpd="sng" algn="ctr">
-          <a:solidFill>
-            <a:schemeClr val="lt1">
-              <a:hueOff val="0"/>
-              <a:satOff val="0"/>
-              <a:lumOff val="0"/>
-              <a:alphaOff val="0"/>
-            </a:schemeClr>
-          </a:solidFill>
-          <a:prstDash val="solid"/>
-        </a:ln>
-        <a:effectLst/>
-      </dsp:spPr>
-      <dsp:style>
-        <a:lnRef idx="2">
-          <a:scrgbClr r="0" g="0" b="0"/>
-        </a:lnRef>
-        <a:fillRef idx="1">
-          <a:scrgbClr r="0" g="0" b="0"/>
-        </a:fillRef>
-        <a:effectRef idx="0">
-          <a:scrgbClr r="0" g="0" b="0"/>
-        </a:effectRef>
-        <a:fontRef idx="minor"/>
-      </dsp:style>
-    </dsp:sp>
-    <dsp:sp modelId="{0B494733-9138-43DE-B904-543A92E88131}">
-      <dsp:nvSpPr>
-        <dsp:cNvPr id="0" name=""/>
-        <dsp:cNvSpPr/>
-      </dsp:nvSpPr>
-      <dsp:spPr>
-        <a:xfrm>
-          <a:off x="2259835" y="3886196"/>
-          <a:ext cx="5756712" cy="1407162"/>
-        </a:xfrm>
-        <a:prstGeom prst="rect">
-          <a:avLst/>
-        </a:prstGeom>
-        <a:solidFill>
-          <a:schemeClr val="lt1">
-            <a:alpha val="40000"/>
-            <a:hueOff val="0"/>
-            <a:satOff val="0"/>
-            <a:lumOff val="0"/>
-            <a:alphaOff val="0"/>
-          </a:schemeClr>
-        </a:solidFill>
-        <a:ln w="9525" cap="flat" cmpd="sng" algn="ctr">
-          <a:solidFill>
-            <a:schemeClr val="accent1">
-              <a:hueOff val="0"/>
-              <a:satOff val="0"/>
-              <a:lumOff val="0"/>
-              <a:alphaOff val="0"/>
-            </a:schemeClr>
-          </a:solidFill>
-          <a:prstDash val="solid"/>
-        </a:ln>
-        <a:effectLst/>
-      </dsp:spPr>
-      <dsp:style>
-        <a:lnRef idx="1">
-          <a:scrgbClr r="0" g="0" b="0"/>
-        </a:lnRef>
-        <a:fillRef idx="1">
-          <a:scrgbClr r="0" g="0" b="0"/>
-        </a:fillRef>
-        <a:effectRef idx="0">
-          <a:scrgbClr r="0" g="0" b="0"/>
-        </a:effectRef>
-        <a:fontRef idx="minor"/>
-      </dsp:style>
-      <dsp:txBody>
-        <a:bodyPr spcFirstLastPara="0" vert="horz" wrap="square" lIns="953118" tIns="68580" rIns="68580" bIns="68580" numCol="1" spcCol="1270" anchor="ctr" anchorCtr="0">
-          <a:noAutofit/>
-        </a:bodyPr>
-        <a:lstStyle/>
-        <a:p>
-          <a:pPr marL="0" lvl="0" indent="0" algn="l" defTabSz="800100">
-            <a:lnSpc>
-              <a:spcPct val="90000"/>
-            </a:lnSpc>
-            <a:spcBef>
-              <a:spcPct val="0"/>
-            </a:spcBef>
-            <a:spcAft>
-              <a:spcPct val="35000"/>
-            </a:spcAft>
-            <a:buNone/>
-          </a:pPr>
-          <a:r>
-            <a:rPr lang="en-US" sz="1800" b="1" kern="1200" dirty="0"/>
-            <a:t>  </a:t>
-          </a:r>
-        </a:p>
-        <a:p>
-          <a:pPr marL="0" lvl="0" indent="0" algn="l" defTabSz="800100">
-            <a:lnSpc>
-              <a:spcPct val="90000"/>
-            </a:lnSpc>
-            <a:spcBef>
-              <a:spcPct val="0"/>
-            </a:spcBef>
-            <a:spcAft>
-              <a:spcPct val="35000"/>
-            </a:spcAft>
-            <a:buNone/>
-          </a:pPr>
-          <a:r>
-            <a:rPr lang="en-US" sz="2400" b="1" i="0" kern="1200" dirty="0"/>
-            <a:t>Chemical Industries</a:t>
-          </a:r>
-        </a:p>
-        <a:p>
-          <a:pPr marL="0" lvl="0" indent="0" algn="l" defTabSz="800100">
-            <a:lnSpc>
-              <a:spcPct val="90000"/>
-            </a:lnSpc>
-            <a:spcBef>
-              <a:spcPct val="0"/>
-            </a:spcBef>
-            <a:spcAft>
-              <a:spcPct val="35000"/>
-            </a:spcAft>
-            <a:buNone/>
-          </a:pPr>
-          <a:r>
-            <a:rPr lang="en-US" sz="2400" b="0" i="1" kern="1200" dirty="0"/>
-            <a:t>Released  5.30 x </a:t>
-          </a:r>
-          <a14:m xmlns:a14="http://schemas.microsoft.com/office/drawing/2010/main">
-            <m:oMath xmlns:m="http://schemas.openxmlformats.org/officeDocument/2006/math">
-              <m:sSup>
-                <m:sSupPr>
-                  <m:ctrlPr>
-                    <a:rPr lang="en-US" sz="2400" b="0" i="1" kern="1200" smtClean="0">
-                      <a:latin typeface="Cambria Math" panose="02040503050406030204" pitchFamily="18" charset="0"/>
-                    </a:rPr>
-                  </m:ctrlPr>
-                </m:sSupPr>
-                <m:e>
-                  <m:r>
-                    <a:rPr lang="en-US" sz="2400" b="0" i="1" kern="1200" smtClean="0">
-                      <a:latin typeface="Cambria Math"/>
-                    </a:rPr>
-                    <m:t>10</m:t>
-                  </m:r>
-                </m:e>
-                <m:sup>
-                  <m:r>
-                    <a:rPr lang="en-US" sz="2400" b="0" i="1" kern="1200" smtClean="0">
-                      <a:latin typeface="Cambria Math"/>
-                    </a:rPr>
-                    <m:t>08 </m:t>
-                  </m:r>
-                </m:sup>
-              </m:sSup>
-            </m:oMath>
-          </a14:m>
-          <a:r>
-            <a:rPr lang="en-US" sz="2400" b="0" i="1" kern="1200" dirty="0"/>
-            <a:t> pounds of toxic   waste in  2014</a:t>
-          </a:r>
-        </a:p>
-        <a:p>
-          <a:pPr marL="0" lvl="0" indent="0" algn="l" defTabSz="800100">
-            <a:lnSpc>
-              <a:spcPct val="90000"/>
-            </a:lnSpc>
-            <a:spcBef>
-              <a:spcPct val="0"/>
-            </a:spcBef>
-            <a:spcAft>
-              <a:spcPct val="35000"/>
-            </a:spcAft>
-            <a:buNone/>
-          </a:pPr>
-          <a:r>
-            <a:rPr lang="en-US" sz="1800" kern="1200" dirty="0"/>
-            <a:t> </a:t>
-          </a:r>
-        </a:p>
-      </dsp:txBody>
-      <dsp:txXfrm>
-        <a:off x="2259835" y="3886196"/>
-        <a:ext cx="5756712" cy="1407162"/>
-      </dsp:txXfrm>
-    </dsp:sp>
-    <dsp:sp modelId="{114784D1-D9A3-4A0E-A0E7-3563F0DD5AD5}">
-      <dsp:nvSpPr>
-        <dsp:cNvPr id="0" name=""/>
-        <dsp:cNvSpPr/>
-      </dsp:nvSpPr>
-      <dsp:spPr>
-        <a:xfrm>
-          <a:off x="0" y="3816593"/>
-          <a:ext cx="2322081" cy="1477520"/>
-        </a:xfrm>
-        <a:prstGeom prst="rect">
-          <a:avLst/>
-        </a:prstGeom>
-        <a:blipFill>
-          <a:blip xmlns:r="http://schemas.openxmlformats.org/officeDocument/2006/relationships" r:embed="rId3">
-            <a:extLst>
-              <a:ext uri="{28A0092B-C50C-407E-A947-70E740481C1C}">
-                <a14:useLocalDpi xmlns:a14="http://schemas.microsoft.com/office/drawing/2010/main" val="0"/>
-              </a:ext>
-            </a:extLst>
-          </a:blip>
-          <a:srcRect/>
-          <a:stretch>
-            <a:fillRect t="-30000" b="-30000"/>
-          </a:stretch>
-        </a:blipFill>
-        <a:ln w="25400" cap="flat" cmpd="sng" algn="ctr">
-          <a:solidFill>
-            <a:schemeClr val="lt1">
-              <a:hueOff val="0"/>
-              <a:satOff val="0"/>
-              <a:lumOff val="0"/>
-              <a:alphaOff val="0"/>
-            </a:schemeClr>
-          </a:solidFill>
-          <a:prstDash val="solid"/>
-        </a:ln>
-        <a:effectLst/>
-      </dsp:spPr>
-      <dsp:style>
-        <a:lnRef idx="2">
-          <a:scrgbClr r="0" g="0" b="0"/>
-        </a:lnRef>
-        <a:fillRef idx="1">
-          <a:scrgbClr r="0" g="0" b="0"/>
-        </a:fillRef>
-        <a:effectRef idx="0">
-          <a:scrgbClr r="0" g="0" b="0"/>
-        </a:effectRef>
-        <a:fontRef idx="minor"/>
-      </dsp:style>
-    </dsp:sp>
-  </dsp:spTree>
-</dsp:drawing>
-</file>
-
-<file path=ppt/diagrams/drawing3.xml><?xml version="1.0" encoding="utf-8"?>
-<dsp:drawing xmlns:dgm="http://schemas.openxmlformats.org/drawingml/2006/diagram" xmlns:dsp="http://schemas.microsoft.com/office/drawing/2008/diagram" xmlns:a="http://schemas.openxmlformats.org/drawingml/2006/main">
-  <dsp:spTree>
-    <dsp:nvGrpSpPr>
-      <dsp:cNvPr id="0" name=""/>
-      <dsp:cNvGrpSpPr/>
-    </dsp:nvGrpSpPr>
-    <dsp:grpSpPr/>
     <dsp:sp modelId="{81D6004C-A0A0-4C7F-91B9-5986AB81914E}">
       <dsp:nvSpPr>
         <dsp:cNvPr id="0" name=""/>
@@ -8716,7 +6524,7 @@
 </dsp:drawing>
 </file>
 
-<file path=ppt/diagrams/drawing4.xml><?xml version="1.0" encoding="utf-8"?>
+<file path=ppt/diagrams/drawing3.xml><?xml version="1.0" encoding="utf-8"?>
 <dsp:drawing xmlns:dgm="http://schemas.openxmlformats.org/drawingml/2006/diagram" xmlns:dsp="http://schemas.microsoft.com/office/drawing/2008/diagram" xmlns:a="http://schemas.openxmlformats.org/drawingml/2006/main">
   <dsp:spTree>
     <dsp:nvGrpSpPr>
@@ -9274,7 +7082,7 @@
 </dsp:drawing>
 </file>
 
-<file path=ppt/diagrams/drawing5.xml><?xml version="1.0" encoding="utf-8"?>
+<file path=ppt/diagrams/drawing4.xml><?xml version="1.0" encoding="utf-8"?>
 <dsp:drawing xmlns:dgm="http://schemas.openxmlformats.org/drawingml/2006/diagram" xmlns:dsp="http://schemas.microsoft.com/office/drawing/2008/diagram" xmlns:a="http://schemas.openxmlformats.org/drawingml/2006/main">
   <dsp:spTree>
     <dsp:nvGrpSpPr>
@@ -9675,201 +7483,6 @@
 </file>
 
 <file path=ppt/diagrams/layout1.xml><?xml version="1.0" encoding="utf-8"?>
-<dgm:layoutDef xmlns:dgm="http://schemas.openxmlformats.org/drawingml/2006/diagram" xmlns:a="http://schemas.openxmlformats.org/drawingml/2006/main" uniqueId="urn:microsoft.com/office/officeart/2008/layout/PictureStrips">
-  <dgm:title val=""/>
-  <dgm:desc val=""/>
-  <dgm:catLst>
-    <dgm:cat type="list" pri="12500"/>
-    <dgm:cat type="picture" pri="13000"/>
-    <dgm:cat type="pictureconvert" pri="13000"/>
-  </dgm:catLst>
-  <dgm:sampData>
-    <dgm:dataModel>
-      <dgm:ptLst>
-        <dgm:pt modelId="0" type="doc"/>
-        <dgm:pt modelId="10">
-          <dgm:prSet phldr="1"/>
-        </dgm:pt>
-        <dgm:pt modelId="20">
-          <dgm:prSet phldr="1"/>
-        </dgm:pt>
-        <dgm:pt modelId="30">
-          <dgm:prSet phldr="1"/>
-        </dgm:pt>
-      </dgm:ptLst>
-      <dgm:cxnLst>
-        <dgm:cxn modelId="40" srcId="0" destId="10" srcOrd="0" destOrd="0"/>
-        <dgm:cxn modelId="50" srcId="0" destId="20" srcOrd="1" destOrd="0"/>
-        <dgm:cxn modelId="60" srcId="0" destId="30" srcOrd="2" destOrd="0"/>
-      </dgm:cxnLst>
-      <dgm:bg/>
-      <dgm:whole/>
-    </dgm:dataModel>
-  </dgm:sampData>
-  <dgm:styleData>
-    <dgm:dataModel>
-      <dgm:ptLst>
-        <dgm:pt modelId="0" type="doc"/>
-        <dgm:pt modelId="10">
-          <dgm:prSet phldr="1"/>
-        </dgm:pt>
-        <dgm:pt modelId="20">
-          <dgm:prSet phldr="1"/>
-        </dgm:pt>
-      </dgm:ptLst>
-      <dgm:cxnLst>
-        <dgm:cxn modelId="40" srcId="0" destId="10" srcOrd="0" destOrd="0"/>
-        <dgm:cxn modelId="50" srcId="0" destId="20" srcOrd="1" destOrd="0"/>
-      </dgm:cxnLst>
-      <dgm:bg/>
-      <dgm:whole/>
-    </dgm:dataModel>
-  </dgm:styleData>
-  <dgm:clrData>
-    <dgm:dataModel>
-      <dgm:ptLst>
-        <dgm:pt modelId="0" type="doc"/>
-        <dgm:pt modelId="10">
-          <dgm:prSet phldr="1"/>
-        </dgm:pt>
-        <dgm:pt modelId="20">
-          <dgm:prSet phldr="1"/>
-        </dgm:pt>
-        <dgm:pt modelId="30">
-          <dgm:prSet phldr="1"/>
-        </dgm:pt>
-        <dgm:pt modelId="40">
-          <dgm:prSet phldr="1"/>
-        </dgm:pt>
-      </dgm:ptLst>
-      <dgm:cxnLst>
-        <dgm:cxn modelId="40" srcId="0" destId="10" srcOrd="0" destOrd="0"/>
-        <dgm:cxn modelId="50" srcId="0" destId="20" srcOrd="1" destOrd="0"/>
-        <dgm:cxn modelId="60" srcId="0" destId="30" srcOrd="2" destOrd="0"/>
-        <dgm:cxn modelId="70" srcId="0" destId="40" srcOrd="2" destOrd="0"/>
-      </dgm:cxnLst>
-      <dgm:bg/>
-      <dgm:whole/>
-    </dgm:dataModel>
-  </dgm:clrData>
-  <dgm:layoutNode name="Name0">
-    <dgm:varLst>
-      <dgm:dir/>
-      <dgm:resizeHandles val="exact"/>
-    </dgm:varLst>
-    <dgm:choose name="Name1">
-      <dgm:if name="Name2" func="var" arg="dir" op="equ" val="norm">
-        <dgm:alg type="snake">
-          <dgm:param type="off" val="ctr"/>
-        </dgm:alg>
-      </dgm:if>
-      <dgm:else name="Name3">
-        <dgm:alg type="snake">
-          <dgm:param type="off" val="ctr"/>
-          <dgm:param type="grDir" val="tR"/>
-        </dgm:alg>
-      </dgm:else>
-    </dgm:choose>
-    <dgm:shape xmlns:r="http://schemas.openxmlformats.org/officeDocument/2006/relationships" r:blip="">
-      <dgm:adjLst/>
-    </dgm:shape>
-    <dgm:constrLst>
-      <dgm:constr type="primFontSz" for="des" ptType="node" op="equ" val="65"/>
-      <dgm:constr type="w" for="ch" forName="composite" refType="w"/>
-      <dgm:constr type="h" for="ch" forName="composite" refType="h"/>
-      <dgm:constr type="sp" refType="h" refFor="ch" refForName="composite" op="equ" fact="0.1"/>
-      <dgm:constr type="h" for="ch" forName="sibTrans" refType="h" refFor="ch" refForName="composite" op="equ" fact="0.1"/>
-      <dgm:constr type="w" for="ch" forName="sibTrans" refType="h" refFor="ch" refForName="sibTrans" op="equ"/>
-    </dgm:constrLst>
-    <dgm:forEach name="nodesForEach" axis="ch" ptType="node">
-      <dgm:layoutNode name="composite">
-        <dgm:alg type="composite">
-          <dgm:param type="ar" val="3"/>
-        </dgm:alg>
-        <dgm:shape xmlns:r="http://schemas.openxmlformats.org/officeDocument/2006/relationships" r:blip="">
-          <dgm:adjLst/>
-        </dgm:shape>
-        <dgm:choose name="Name4">
-          <dgm:if name="Name5" func="var" arg="dir" op="equ" val="norm">
-            <dgm:constrLst>
-              <dgm:constr type="l" for="ch" forName="rect1" refType="w" fact="0.04"/>
-              <dgm:constr type="t" for="ch" forName="rect1" refType="h" fact="0.13"/>
-              <dgm:constr type="w" for="ch" forName="rect1" refType="w" fact="0.96"/>
-              <dgm:constr type="h" for="ch" forName="rect1" refType="h" fact="0.9"/>
-              <dgm:constr type="l" for="ch" forName="rect2" refType="w" fact="0"/>
-              <dgm:constr type="t" for="ch" forName="rect2" refType="h" fact="0"/>
-              <dgm:constr type="w" for="ch" forName="rect2" refType="w" fact="0.21"/>
-              <dgm:constr type="h" for="ch" forName="rect2" refType="w" fact="0.315"/>
-            </dgm:constrLst>
-          </dgm:if>
-          <dgm:else name="Name6">
-            <dgm:constrLst>
-              <dgm:constr type="l" for="ch" forName="rect1" refType="w" fact="0"/>
-              <dgm:constr type="t" for="ch" forName="rect1" refType="h" fact="0.13"/>
-              <dgm:constr type="w" for="ch" forName="rect1" refType="w" fact="0.96"/>
-              <dgm:constr type="h" for="ch" forName="rect1" refType="h" fact="0.9"/>
-              <dgm:constr type="l" for="ch" forName="rect2" refType="w" fact="0.79"/>
-              <dgm:constr type="t" for="ch" forName="rect2" refType="h" fact="0"/>
-              <dgm:constr type="w" for="ch" forName="rect2" refType="w" fact="0.21"/>
-              <dgm:constr type="h" for="ch" forName="rect2" refType="w" fact="0.315"/>
-            </dgm:constrLst>
-          </dgm:else>
-        </dgm:choose>
-        <dgm:layoutNode name="rect1" styleLbl="trAlignAcc1">
-          <dgm:varLst>
-            <dgm:bulletEnabled val="1"/>
-          </dgm:varLst>
-          <dgm:alg type="tx">
-            <dgm:param type="parTxLTRAlign" val="l"/>
-          </dgm:alg>
-          <dgm:shape xmlns:r="http://schemas.openxmlformats.org/officeDocument/2006/relationships" type="rect" r:blip="">
-            <dgm:adjLst/>
-          </dgm:shape>
-          <dgm:presOf axis="desOrSelf" ptType="node"/>
-          <dgm:choose name="Name7">
-            <dgm:if name="Name8" func="var" arg="dir" op="equ" val="norm">
-              <dgm:constrLst>
-                <dgm:constr type="lMarg" refType="w" fact="0.6"/>
-                <dgm:constr type="rMarg" refType="primFontSz" fact="0.3"/>
-                <dgm:constr type="tMarg" refType="primFontSz" fact="0.3"/>
-                <dgm:constr type="bMarg" refType="primFontSz" fact="0.3"/>
-              </dgm:constrLst>
-            </dgm:if>
-            <dgm:else name="Name9">
-              <dgm:constrLst>
-                <dgm:constr type="lMarg" refType="primFontSz" fact="0.3"/>
-                <dgm:constr type="rMarg" refType="w" fact="0.6"/>
-                <dgm:constr type="tMarg" refType="primFontSz" fact="0.3"/>
-                <dgm:constr type="bMarg" refType="primFontSz" fact="0.3"/>
-              </dgm:constrLst>
-            </dgm:else>
-          </dgm:choose>
-          <dgm:ruleLst>
-            <dgm:rule type="primFontSz" val="5" fact="NaN" max="NaN"/>
-          </dgm:ruleLst>
-        </dgm:layoutNode>
-        <dgm:layoutNode name="rect2" styleLbl="fgImgPlace1">
-          <dgm:alg type="sp"/>
-          <dgm:shape xmlns:r="http://schemas.openxmlformats.org/officeDocument/2006/relationships" type="rect" r:blip="" blipPhldr="1">
-            <dgm:adjLst/>
-          </dgm:shape>
-          <dgm:presOf/>
-        </dgm:layoutNode>
-      </dgm:layoutNode>
-      <dgm:forEach name="sibTransForEach" axis="followSib" ptType="sibTrans" cnt="1">
-        <dgm:layoutNode name="sibTrans">
-          <dgm:alg type="sp"/>
-          <dgm:shape xmlns:r="http://schemas.openxmlformats.org/officeDocument/2006/relationships" r:blip="">
-            <dgm:adjLst/>
-          </dgm:shape>
-        </dgm:layoutNode>
-      </dgm:forEach>
-    </dgm:forEach>
-  </dgm:layoutNode>
-</dgm:layoutDef>
-</file>
-
-<file path=ppt/diagrams/layout2.xml><?xml version="1.0" encoding="utf-8"?>
 <dgm:layoutDef xmlns:dgm="http://schemas.openxmlformats.org/drawingml/2006/diagram" xmlns:a="http://schemas.openxmlformats.org/drawingml/2006/main" uniqueId="urn:microsoft.com/office/officeart/2008/layout/PictureStrips">
   <dgm:title val=""/>
   <dgm:desc val=""/>
@@ -10684,1040 +8297,6 @@
 </file>
 
 <file path=ppt/diagrams/quickStyle1.xml><?xml version="1.0" encoding="utf-8"?>
-<dgm:styleDef xmlns:dgm="http://schemas.openxmlformats.org/drawingml/2006/diagram" xmlns:a="http://schemas.openxmlformats.org/drawingml/2006/main" uniqueId="urn:microsoft.com/office/officeart/2005/8/quickstyle/simple1">
-  <dgm:title val=""/>
-  <dgm:desc val=""/>
-  <dgm:catLst>
-    <dgm:cat type="simple" pri="10100"/>
-  </dgm:catLst>
-  <dgm:scene3d>
-    <a:camera prst="orthographicFront"/>
-    <a:lightRig rig="threePt" dir="t"/>
-  </dgm:scene3d>
-  <dgm:styleLbl name="node0">
-    <dgm:scene3d>
-      <a:camera prst="orthographicFront"/>
-      <a:lightRig rig="threePt" dir="t"/>
-    </dgm:scene3d>
-    <dgm:sp3d/>
-    <dgm:txPr/>
-    <dgm:style>
-      <a:lnRef idx="2">
-        <a:scrgbClr r="0" g="0" b="0"/>
-      </a:lnRef>
-      <a:fillRef idx="1">
-        <a:scrgbClr r="0" g="0" b="0"/>
-      </a:fillRef>
-      <a:effectRef idx="0">
-        <a:scrgbClr r="0" g="0" b="0"/>
-      </a:effectRef>
-      <a:fontRef idx="minor">
-        <a:schemeClr val="lt1"/>
-      </a:fontRef>
-    </dgm:style>
-  </dgm:styleLbl>
-  <dgm:styleLbl name="lnNode1">
-    <dgm:scene3d>
-      <a:camera prst="orthographicFront"/>
-      <a:lightRig rig="threePt" dir="t"/>
-    </dgm:scene3d>
-    <dgm:sp3d/>
-    <dgm:txPr/>
-    <dgm:style>
-      <a:lnRef idx="2">
-        <a:scrgbClr r="0" g="0" b="0"/>
-      </a:lnRef>
-      <a:fillRef idx="1">
-        <a:scrgbClr r="0" g="0" b="0"/>
-      </a:fillRef>
-      <a:effectRef idx="0">
-        <a:scrgbClr r="0" g="0" b="0"/>
-      </a:effectRef>
-      <a:fontRef idx="minor">
-        <a:schemeClr val="lt1"/>
-      </a:fontRef>
-    </dgm:style>
-  </dgm:styleLbl>
-  <dgm:styleLbl name="vennNode1">
-    <dgm:scene3d>
-      <a:camera prst="orthographicFront"/>
-      <a:lightRig rig="threePt" dir="t"/>
-    </dgm:scene3d>
-    <dgm:sp3d/>
-    <dgm:txPr/>
-    <dgm:style>
-      <a:lnRef idx="2">
-        <a:scrgbClr r="0" g="0" b="0"/>
-      </a:lnRef>
-      <a:fillRef idx="1">
-        <a:scrgbClr r="0" g="0" b="0"/>
-      </a:fillRef>
-      <a:effectRef idx="0">
-        <a:scrgbClr r="0" g="0" b="0"/>
-      </a:effectRef>
-      <a:fontRef idx="minor">
-        <a:schemeClr val="tx1"/>
-      </a:fontRef>
-    </dgm:style>
-  </dgm:styleLbl>
-  <dgm:styleLbl name="alignNode1">
-    <dgm:scene3d>
-      <a:camera prst="orthographicFront"/>
-      <a:lightRig rig="threePt" dir="t"/>
-    </dgm:scene3d>
-    <dgm:sp3d/>
-    <dgm:txPr/>
-    <dgm:style>
-      <a:lnRef idx="2">
-        <a:scrgbClr r="0" g="0" b="0"/>
-      </a:lnRef>
-      <a:fillRef idx="1">
-        <a:scrgbClr r="0" g="0" b="0"/>
-      </a:fillRef>
-      <a:effectRef idx="0">
-        <a:scrgbClr r="0" g="0" b="0"/>
-      </a:effectRef>
-      <a:fontRef idx="minor">
-        <a:schemeClr val="lt1"/>
-      </a:fontRef>
-    </dgm:style>
-  </dgm:styleLbl>
-  <dgm:styleLbl name="node1">
-    <dgm:scene3d>
-      <a:camera prst="orthographicFront"/>
-      <a:lightRig rig="threePt" dir="t"/>
-    </dgm:scene3d>
-    <dgm:sp3d/>
-    <dgm:txPr/>
-    <dgm:style>
-      <a:lnRef idx="2">
-        <a:scrgbClr r="0" g="0" b="0"/>
-      </a:lnRef>
-      <a:fillRef idx="1">
-        <a:scrgbClr r="0" g="0" b="0"/>
-      </a:fillRef>
-      <a:effectRef idx="0">
-        <a:scrgbClr r="0" g="0" b="0"/>
-      </a:effectRef>
-      <a:fontRef idx="minor">
-        <a:schemeClr val="lt1"/>
-      </a:fontRef>
-    </dgm:style>
-  </dgm:styleLbl>
-  <dgm:styleLbl name="node2">
-    <dgm:scene3d>
-      <a:camera prst="orthographicFront"/>
-      <a:lightRig rig="threePt" dir="t"/>
-    </dgm:scene3d>
-    <dgm:sp3d/>
-    <dgm:txPr/>
-    <dgm:style>
-      <a:lnRef idx="2">
-        <a:scrgbClr r="0" g="0" b="0"/>
-      </a:lnRef>
-      <a:fillRef idx="1">
-        <a:scrgbClr r="0" g="0" b="0"/>
-      </a:fillRef>
-      <a:effectRef idx="0">
-        <a:scrgbClr r="0" g="0" b="0"/>
-      </a:effectRef>
-      <a:fontRef idx="minor">
-        <a:schemeClr val="lt1"/>
-      </a:fontRef>
-    </dgm:style>
-  </dgm:styleLbl>
-  <dgm:styleLbl name="node3">
-    <dgm:scene3d>
-      <a:camera prst="orthographicFront"/>
-      <a:lightRig rig="threePt" dir="t"/>
-    </dgm:scene3d>
-    <dgm:sp3d/>
-    <dgm:txPr/>
-    <dgm:style>
-      <a:lnRef idx="2">
-        <a:scrgbClr r="0" g="0" b="0"/>
-      </a:lnRef>
-      <a:fillRef idx="1">
-        <a:scrgbClr r="0" g="0" b="0"/>
-      </a:fillRef>
-      <a:effectRef idx="0">
-        <a:scrgbClr r="0" g="0" b="0"/>
-      </a:effectRef>
-      <a:fontRef idx="minor">
-        <a:schemeClr val="lt1"/>
-      </a:fontRef>
-    </dgm:style>
-  </dgm:styleLbl>
-  <dgm:styleLbl name="node4">
-    <dgm:scene3d>
-      <a:camera prst="orthographicFront"/>
-      <a:lightRig rig="threePt" dir="t"/>
-    </dgm:scene3d>
-    <dgm:sp3d/>
-    <dgm:txPr/>
-    <dgm:style>
-      <a:lnRef idx="2">
-        <a:scrgbClr r="0" g="0" b="0"/>
-      </a:lnRef>
-      <a:fillRef idx="1">
-        <a:scrgbClr r="0" g="0" b="0"/>
-      </a:fillRef>
-      <a:effectRef idx="0">
-        <a:scrgbClr r="0" g="0" b="0"/>
-      </a:effectRef>
-      <a:fontRef idx="minor">
-        <a:schemeClr val="lt1"/>
-      </a:fontRef>
-    </dgm:style>
-  </dgm:styleLbl>
-  <dgm:styleLbl name="fgImgPlace1">
-    <dgm:scene3d>
-      <a:camera prst="orthographicFront"/>
-      <a:lightRig rig="threePt" dir="t"/>
-    </dgm:scene3d>
-    <dgm:sp3d/>
-    <dgm:txPr/>
-    <dgm:style>
-      <a:lnRef idx="2">
-        <a:scrgbClr r="0" g="0" b="0"/>
-      </a:lnRef>
-      <a:fillRef idx="1">
-        <a:scrgbClr r="0" g="0" b="0"/>
-      </a:fillRef>
-      <a:effectRef idx="0">
-        <a:scrgbClr r="0" g="0" b="0"/>
-      </a:effectRef>
-      <a:fontRef idx="minor"/>
-    </dgm:style>
-  </dgm:styleLbl>
-  <dgm:styleLbl name="alignImgPlace1">
-    <dgm:scene3d>
-      <a:camera prst="orthographicFront"/>
-      <a:lightRig rig="threePt" dir="t"/>
-    </dgm:scene3d>
-    <dgm:sp3d/>
-    <dgm:txPr/>
-    <dgm:style>
-      <a:lnRef idx="2">
-        <a:scrgbClr r="0" g="0" b="0"/>
-      </a:lnRef>
-      <a:fillRef idx="1">
-        <a:scrgbClr r="0" g="0" b="0"/>
-      </a:fillRef>
-      <a:effectRef idx="0">
-        <a:scrgbClr r="0" g="0" b="0"/>
-      </a:effectRef>
-      <a:fontRef idx="minor"/>
-    </dgm:style>
-  </dgm:styleLbl>
-  <dgm:styleLbl name="bgImgPlace1">
-    <dgm:scene3d>
-      <a:camera prst="orthographicFront"/>
-      <a:lightRig rig="threePt" dir="t"/>
-    </dgm:scene3d>
-    <dgm:sp3d/>
-    <dgm:txPr/>
-    <dgm:style>
-      <a:lnRef idx="2">
-        <a:scrgbClr r="0" g="0" b="0"/>
-      </a:lnRef>
-      <a:fillRef idx="1">
-        <a:scrgbClr r="0" g="0" b="0"/>
-      </a:fillRef>
-      <a:effectRef idx="0">
-        <a:scrgbClr r="0" g="0" b="0"/>
-      </a:effectRef>
-      <a:fontRef idx="minor"/>
-    </dgm:style>
-  </dgm:styleLbl>
-  <dgm:styleLbl name="sibTrans2D1">
-    <dgm:scene3d>
-      <a:camera prst="orthographicFront"/>
-      <a:lightRig rig="threePt" dir="t"/>
-    </dgm:scene3d>
-    <dgm:sp3d/>
-    <dgm:txPr/>
-    <dgm:style>
-      <a:lnRef idx="0">
-        <a:scrgbClr r="0" g="0" b="0"/>
-      </a:lnRef>
-      <a:fillRef idx="1">
-        <a:scrgbClr r="0" g="0" b="0"/>
-      </a:fillRef>
-      <a:effectRef idx="0">
-        <a:scrgbClr r="0" g="0" b="0"/>
-      </a:effectRef>
-      <a:fontRef idx="minor">
-        <a:schemeClr val="lt1"/>
-      </a:fontRef>
-    </dgm:style>
-  </dgm:styleLbl>
-  <dgm:styleLbl name="fgSibTrans2D1">
-    <dgm:scene3d>
-      <a:camera prst="orthographicFront"/>
-      <a:lightRig rig="threePt" dir="t"/>
-    </dgm:scene3d>
-    <dgm:sp3d/>
-    <dgm:txPr/>
-    <dgm:style>
-      <a:lnRef idx="0">
-        <a:scrgbClr r="0" g="0" b="0"/>
-      </a:lnRef>
-      <a:fillRef idx="1">
-        <a:scrgbClr r="0" g="0" b="0"/>
-      </a:fillRef>
-      <a:effectRef idx="0">
-        <a:scrgbClr r="0" g="0" b="0"/>
-      </a:effectRef>
-      <a:fontRef idx="minor">
-        <a:schemeClr val="lt1"/>
-      </a:fontRef>
-    </dgm:style>
-  </dgm:styleLbl>
-  <dgm:styleLbl name="bgSibTrans2D1">
-    <dgm:scene3d>
-      <a:camera prst="orthographicFront"/>
-      <a:lightRig rig="threePt" dir="t"/>
-    </dgm:scene3d>
-    <dgm:sp3d/>
-    <dgm:txPr/>
-    <dgm:style>
-      <a:lnRef idx="0">
-        <a:scrgbClr r="0" g="0" b="0"/>
-      </a:lnRef>
-      <a:fillRef idx="1">
-        <a:scrgbClr r="0" g="0" b="0"/>
-      </a:fillRef>
-      <a:effectRef idx="0">
-        <a:scrgbClr r="0" g="0" b="0"/>
-      </a:effectRef>
-      <a:fontRef idx="minor">
-        <a:schemeClr val="lt1"/>
-      </a:fontRef>
-    </dgm:style>
-  </dgm:styleLbl>
-  <dgm:styleLbl name="sibTrans1D1">
-    <dgm:scene3d>
-      <a:camera prst="orthographicFront"/>
-      <a:lightRig rig="threePt" dir="t"/>
-    </dgm:scene3d>
-    <dgm:sp3d/>
-    <dgm:txPr/>
-    <dgm:style>
-      <a:lnRef idx="1">
-        <a:scrgbClr r="0" g="0" b="0"/>
-      </a:lnRef>
-      <a:fillRef idx="0">
-        <a:scrgbClr r="0" g="0" b="0"/>
-      </a:fillRef>
-      <a:effectRef idx="0">
-        <a:scrgbClr r="0" g="0" b="0"/>
-      </a:effectRef>
-      <a:fontRef idx="minor"/>
-    </dgm:style>
-  </dgm:styleLbl>
-  <dgm:styleLbl name="callout">
-    <dgm:scene3d>
-      <a:camera prst="orthographicFront"/>
-      <a:lightRig rig="threePt" dir="t"/>
-    </dgm:scene3d>
-    <dgm:sp3d/>
-    <dgm:txPr/>
-    <dgm:style>
-      <a:lnRef idx="2">
-        <a:scrgbClr r="0" g="0" b="0"/>
-      </a:lnRef>
-      <a:fillRef idx="1">
-        <a:scrgbClr r="0" g="0" b="0"/>
-      </a:fillRef>
-      <a:effectRef idx="0">
-        <a:scrgbClr r="0" g="0" b="0"/>
-      </a:effectRef>
-      <a:fontRef idx="minor"/>
-    </dgm:style>
-  </dgm:styleLbl>
-  <dgm:styleLbl name="asst0">
-    <dgm:scene3d>
-      <a:camera prst="orthographicFront"/>
-      <a:lightRig rig="threePt" dir="t"/>
-    </dgm:scene3d>
-    <dgm:sp3d/>
-    <dgm:txPr/>
-    <dgm:style>
-      <a:lnRef idx="2">
-        <a:scrgbClr r="0" g="0" b="0"/>
-      </a:lnRef>
-      <a:fillRef idx="1">
-        <a:scrgbClr r="0" g="0" b="0"/>
-      </a:fillRef>
-      <a:effectRef idx="0">
-        <a:scrgbClr r="0" g="0" b="0"/>
-      </a:effectRef>
-      <a:fontRef idx="minor">
-        <a:schemeClr val="lt1"/>
-      </a:fontRef>
-    </dgm:style>
-  </dgm:styleLbl>
-  <dgm:styleLbl name="asst1">
-    <dgm:scene3d>
-      <a:camera prst="orthographicFront"/>
-      <a:lightRig rig="threePt" dir="t"/>
-    </dgm:scene3d>
-    <dgm:sp3d/>
-    <dgm:txPr/>
-    <dgm:style>
-      <a:lnRef idx="2">
-        <a:scrgbClr r="0" g="0" b="0"/>
-      </a:lnRef>
-      <a:fillRef idx="1">
-        <a:scrgbClr r="0" g="0" b="0"/>
-      </a:fillRef>
-      <a:effectRef idx="0">
-        <a:scrgbClr r="0" g="0" b="0"/>
-      </a:effectRef>
-      <a:fontRef idx="minor">
-        <a:schemeClr val="lt1"/>
-      </a:fontRef>
-    </dgm:style>
-  </dgm:styleLbl>
-  <dgm:styleLbl name="asst2">
-    <dgm:scene3d>
-      <a:camera prst="orthographicFront"/>
-      <a:lightRig rig="threePt" dir="t"/>
-    </dgm:scene3d>
-    <dgm:sp3d/>
-    <dgm:txPr/>
-    <dgm:style>
-      <a:lnRef idx="2">
-        <a:scrgbClr r="0" g="0" b="0"/>
-      </a:lnRef>
-      <a:fillRef idx="1">
-        <a:scrgbClr r="0" g="0" b="0"/>
-      </a:fillRef>
-      <a:effectRef idx="0">
-        <a:scrgbClr r="0" g="0" b="0"/>
-      </a:effectRef>
-      <a:fontRef idx="minor">
-        <a:schemeClr val="lt1"/>
-      </a:fontRef>
-    </dgm:style>
-  </dgm:styleLbl>
-  <dgm:styleLbl name="asst3">
-    <dgm:scene3d>
-      <a:camera prst="orthographicFront"/>
-      <a:lightRig rig="threePt" dir="t"/>
-    </dgm:scene3d>
-    <dgm:sp3d/>
-    <dgm:txPr/>
-    <dgm:style>
-      <a:lnRef idx="2">
-        <a:scrgbClr r="0" g="0" b="0"/>
-      </a:lnRef>
-      <a:fillRef idx="1">
-        <a:scrgbClr r="0" g="0" b="0"/>
-      </a:fillRef>
-      <a:effectRef idx="0">
-        <a:scrgbClr r="0" g="0" b="0"/>
-      </a:effectRef>
-      <a:fontRef idx="minor">
-        <a:schemeClr val="lt1"/>
-      </a:fontRef>
-    </dgm:style>
-  </dgm:styleLbl>
-  <dgm:styleLbl name="asst4">
-    <dgm:scene3d>
-      <a:camera prst="orthographicFront"/>
-      <a:lightRig rig="threePt" dir="t"/>
-    </dgm:scene3d>
-    <dgm:sp3d/>
-    <dgm:txPr/>
-    <dgm:style>
-      <a:lnRef idx="2">
-        <a:scrgbClr r="0" g="0" b="0"/>
-      </a:lnRef>
-      <a:fillRef idx="1">
-        <a:scrgbClr r="0" g="0" b="0"/>
-      </a:fillRef>
-      <a:effectRef idx="0">
-        <a:scrgbClr r="0" g="0" b="0"/>
-      </a:effectRef>
-      <a:fontRef idx="minor">
-        <a:schemeClr val="lt1"/>
-      </a:fontRef>
-    </dgm:style>
-  </dgm:styleLbl>
-  <dgm:styleLbl name="parChTrans2D1">
-    <dgm:scene3d>
-      <a:camera prst="orthographicFront"/>
-      <a:lightRig rig="threePt" dir="t"/>
-    </dgm:scene3d>
-    <dgm:sp3d/>
-    <dgm:txPr/>
-    <dgm:style>
-      <a:lnRef idx="2">
-        <a:scrgbClr r="0" g="0" b="0"/>
-      </a:lnRef>
-      <a:fillRef idx="1">
-        <a:scrgbClr r="0" g="0" b="0"/>
-      </a:fillRef>
-      <a:effectRef idx="0">
-        <a:scrgbClr r="0" g="0" b="0"/>
-      </a:effectRef>
-      <a:fontRef idx="minor">
-        <a:schemeClr val="lt1"/>
-      </a:fontRef>
-    </dgm:style>
-  </dgm:styleLbl>
-  <dgm:styleLbl name="parChTrans2D2">
-    <dgm:scene3d>
-      <a:camera prst="orthographicFront"/>
-      <a:lightRig rig="threePt" dir="t"/>
-    </dgm:scene3d>
-    <dgm:sp3d/>
-    <dgm:txPr/>
-    <dgm:style>
-      <a:lnRef idx="2">
-        <a:scrgbClr r="0" g="0" b="0"/>
-      </a:lnRef>
-      <a:fillRef idx="1">
-        <a:scrgbClr r="0" g="0" b="0"/>
-      </a:fillRef>
-      <a:effectRef idx="0">
-        <a:scrgbClr r="0" g="0" b="0"/>
-      </a:effectRef>
-      <a:fontRef idx="minor">
-        <a:schemeClr val="lt1"/>
-      </a:fontRef>
-    </dgm:style>
-  </dgm:styleLbl>
-  <dgm:styleLbl name="parChTrans2D3">
-    <dgm:scene3d>
-      <a:camera prst="orthographicFront"/>
-      <a:lightRig rig="threePt" dir="t"/>
-    </dgm:scene3d>
-    <dgm:sp3d/>
-    <dgm:txPr/>
-    <dgm:style>
-      <a:lnRef idx="2">
-        <a:scrgbClr r="0" g="0" b="0"/>
-      </a:lnRef>
-      <a:fillRef idx="1">
-        <a:scrgbClr r="0" g="0" b="0"/>
-      </a:fillRef>
-      <a:effectRef idx="0">
-        <a:scrgbClr r="0" g="0" b="0"/>
-      </a:effectRef>
-      <a:fontRef idx="minor">
-        <a:schemeClr val="lt1"/>
-      </a:fontRef>
-    </dgm:style>
-  </dgm:styleLbl>
-  <dgm:styleLbl name="parChTrans2D4">
-    <dgm:scene3d>
-      <a:camera prst="orthographicFront"/>
-      <a:lightRig rig="threePt" dir="t"/>
-    </dgm:scene3d>
-    <dgm:sp3d/>
-    <dgm:txPr/>
-    <dgm:style>
-      <a:lnRef idx="2">
-        <a:scrgbClr r="0" g="0" b="0"/>
-      </a:lnRef>
-      <a:fillRef idx="1">
-        <a:scrgbClr r="0" g="0" b="0"/>
-      </a:fillRef>
-      <a:effectRef idx="0">
-        <a:scrgbClr r="0" g="0" b="0"/>
-      </a:effectRef>
-      <a:fontRef idx="minor">
-        <a:schemeClr val="lt1"/>
-      </a:fontRef>
-    </dgm:style>
-  </dgm:styleLbl>
-  <dgm:styleLbl name="parChTrans1D1">
-    <dgm:scene3d>
-      <a:camera prst="orthographicFront"/>
-      <a:lightRig rig="threePt" dir="t"/>
-    </dgm:scene3d>
-    <dgm:sp3d/>
-    <dgm:txPr/>
-    <dgm:style>
-      <a:lnRef idx="2">
-        <a:scrgbClr r="0" g="0" b="0"/>
-      </a:lnRef>
-      <a:fillRef idx="0">
-        <a:scrgbClr r="0" g="0" b="0"/>
-      </a:fillRef>
-      <a:effectRef idx="0">
-        <a:scrgbClr r="0" g="0" b="0"/>
-      </a:effectRef>
-      <a:fontRef idx="minor"/>
-    </dgm:style>
-  </dgm:styleLbl>
-  <dgm:styleLbl name="parChTrans1D2">
-    <dgm:scene3d>
-      <a:camera prst="orthographicFront"/>
-      <a:lightRig rig="threePt" dir="t"/>
-    </dgm:scene3d>
-    <dgm:sp3d/>
-    <dgm:txPr/>
-    <dgm:style>
-      <a:lnRef idx="2">
-        <a:scrgbClr r="0" g="0" b="0"/>
-      </a:lnRef>
-      <a:fillRef idx="0">
-        <a:scrgbClr r="0" g="0" b="0"/>
-      </a:fillRef>
-      <a:effectRef idx="0">
-        <a:scrgbClr r="0" g="0" b="0"/>
-      </a:effectRef>
-      <a:fontRef idx="minor"/>
-    </dgm:style>
-  </dgm:styleLbl>
-  <dgm:styleLbl name="parChTrans1D3">
-    <dgm:scene3d>
-      <a:camera prst="orthographicFront"/>
-      <a:lightRig rig="threePt" dir="t"/>
-    </dgm:scene3d>
-    <dgm:sp3d/>
-    <dgm:txPr/>
-    <dgm:style>
-      <a:lnRef idx="2">
-        <a:scrgbClr r="0" g="0" b="0"/>
-      </a:lnRef>
-      <a:fillRef idx="0">
-        <a:scrgbClr r="0" g="0" b="0"/>
-      </a:fillRef>
-      <a:effectRef idx="0">
-        <a:scrgbClr r="0" g="0" b="0"/>
-      </a:effectRef>
-      <a:fontRef idx="minor"/>
-    </dgm:style>
-  </dgm:styleLbl>
-  <dgm:styleLbl name="parChTrans1D4">
-    <dgm:scene3d>
-      <a:camera prst="orthographicFront"/>
-      <a:lightRig rig="threePt" dir="t"/>
-    </dgm:scene3d>
-    <dgm:sp3d/>
-    <dgm:txPr/>
-    <dgm:style>
-      <a:lnRef idx="2">
-        <a:scrgbClr r="0" g="0" b="0"/>
-      </a:lnRef>
-      <a:fillRef idx="0">
-        <a:scrgbClr r="0" g="0" b="0"/>
-      </a:fillRef>
-      <a:effectRef idx="0">
-        <a:scrgbClr r="0" g="0" b="0"/>
-      </a:effectRef>
-      <a:fontRef idx="minor"/>
-    </dgm:style>
-  </dgm:styleLbl>
-  <dgm:styleLbl name="fgAcc1">
-    <dgm:scene3d>
-      <a:camera prst="orthographicFront"/>
-      <a:lightRig rig="threePt" dir="t"/>
-    </dgm:scene3d>
-    <dgm:sp3d/>
-    <dgm:txPr/>
-    <dgm:style>
-      <a:lnRef idx="2">
-        <a:scrgbClr r="0" g="0" b="0"/>
-      </a:lnRef>
-      <a:fillRef idx="1">
-        <a:scrgbClr r="0" g="0" b="0"/>
-      </a:fillRef>
-      <a:effectRef idx="0">
-        <a:scrgbClr r="0" g="0" b="0"/>
-      </a:effectRef>
-      <a:fontRef idx="minor"/>
-    </dgm:style>
-  </dgm:styleLbl>
-  <dgm:styleLbl name="conFgAcc1">
-    <dgm:scene3d>
-      <a:camera prst="orthographicFront"/>
-      <a:lightRig rig="threePt" dir="t"/>
-    </dgm:scene3d>
-    <dgm:sp3d/>
-    <dgm:txPr/>
-    <dgm:style>
-      <a:lnRef idx="2">
-        <a:scrgbClr r="0" g="0" b="0"/>
-      </a:lnRef>
-      <a:fillRef idx="1">
-        <a:scrgbClr r="0" g="0" b="0"/>
-      </a:fillRef>
-      <a:effectRef idx="0">
-        <a:scrgbClr r="0" g="0" b="0"/>
-      </a:effectRef>
-      <a:fontRef idx="minor"/>
-    </dgm:style>
-  </dgm:styleLbl>
-  <dgm:styleLbl name="alignAcc1">
-    <dgm:scene3d>
-      <a:camera prst="orthographicFront"/>
-      <a:lightRig rig="threePt" dir="t"/>
-    </dgm:scene3d>
-    <dgm:sp3d/>
-    <dgm:txPr/>
-    <dgm:style>
-      <a:lnRef idx="2">
-        <a:scrgbClr r="0" g="0" b="0"/>
-      </a:lnRef>
-      <a:fillRef idx="1">
-        <a:scrgbClr r="0" g="0" b="0"/>
-      </a:fillRef>
-      <a:effectRef idx="0">
-        <a:scrgbClr r="0" g="0" b="0"/>
-      </a:effectRef>
-      <a:fontRef idx="minor"/>
-    </dgm:style>
-  </dgm:styleLbl>
-  <dgm:styleLbl name="trAlignAcc1">
-    <dgm:scene3d>
-      <a:camera prst="orthographicFront"/>
-      <a:lightRig rig="threePt" dir="t"/>
-    </dgm:scene3d>
-    <dgm:sp3d/>
-    <dgm:txPr/>
-    <dgm:style>
-      <a:lnRef idx="1">
-        <a:scrgbClr r="0" g="0" b="0"/>
-      </a:lnRef>
-      <a:fillRef idx="1">
-        <a:scrgbClr r="0" g="0" b="0"/>
-      </a:fillRef>
-      <a:effectRef idx="0">
-        <a:scrgbClr r="0" g="0" b="0"/>
-      </a:effectRef>
-      <a:fontRef idx="minor"/>
-    </dgm:style>
-  </dgm:styleLbl>
-  <dgm:styleLbl name="bgAcc1">
-    <dgm:scene3d>
-      <a:camera prst="orthographicFront"/>
-      <a:lightRig rig="threePt" dir="t"/>
-    </dgm:scene3d>
-    <dgm:sp3d/>
-    <dgm:txPr/>
-    <dgm:style>
-      <a:lnRef idx="2">
-        <a:scrgbClr r="0" g="0" b="0"/>
-      </a:lnRef>
-      <a:fillRef idx="1">
-        <a:scrgbClr r="0" g="0" b="0"/>
-      </a:fillRef>
-      <a:effectRef idx="0">
-        <a:scrgbClr r="0" g="0" b="0"/>
-      </a:effectRef>
-      <a:fontRef idx="minor"/>
-    </dgm:style>
-  </dgm:styleLbl>
-  <dgm:styleLbl name="solidFgAcc1">
-    <dgm:scene3d>
-      <a:camera prst="orthographicFront"/>
-      <a:lightRig rig="threePt" dir="t"/>
-    </dgm:scene3d>
-    <dgm:sp3d/>
-    <dgm:txPr/>
-    <dgm:style>
-      <a:lnRef idx="2">
-        <a:scrgbClr r="0" g="0" b="0"/>
-      </a:lnRef>
-      <a:fillRef idx="1">
-        <a:scrgbClr r="0" g="0" b="0"/>
-      </a:fillRef>
-      <a:effectRef idx="0">
-        <a:scrgbClr r="0" g="0" b="0"/>
-      </a:effectRef>
-      <a:fontRef idx="minor"/>
-    </dgm:style>
-  </dgm:styleLbl>
-  <dgm:styleLbl name="solidAlignAcc1">
-    <dgm:scene3d>
-      <a:camera prst="orthographicFront"/>
-      <a:lightRig rig="threePt" dir="t"/>
-    </dgm:scene3d>
-    <dgm:sp3d/>
-    <dgm:txPr/>
-    <dgm:style>
-      <a:lnRef idx="2">
-        <a:scrgbClr r="0" g="0" b="0"/>
-      </a:lnRef>
-      <a:fillRef idx="1">
-        <a:scrgbClr r="0" g="0" b="0"/>
-      </a:fillRef>
-      <a:effectRef idx="0">
-        <a:scrgbClr r="0" g="0" b="0"/>
-      </a:effectRef>
-      <a:fontRef idx="minor"/>
-    </dgm:style>
-  </dgm:styleLbl>
-  <dgm:styleLbl name="solidBgAcc1">
-    <dgm:scene3d>
-      <a:camera prst="orthographicFront"/>
-      <a:lightRig rig="threePt" dir="t"/>
-    </dgm:scene3d>
-    <dgm:sp3d/>
-    <dgm:txPr/>
-    <dgm:style>
-      <a:lnRef idx="2">
-        <a:scrgbClr r="0" g="0" b="0"/>
-      </a:lnRef>
-      <a:fillRef idx="1">
-        <a:scrgbClr r="0" g="0" b="0"/>
-      </a:fillRef>
-      <a:effectRef idx="0">
-        <a:scrgbClr r="0" g="0" b="0"/>
-      </a:effectRef>
-      <a:fontRef idx="minor"/>
-    </dgm:style>
-  </dgm:styleLbl>
-  <dgm:styleLbl name="fgAccFollowNode1">
-    <dgm:scene3d>
-      <a:camera prst="orthographicFront"/>
-      <a:lightRig rig="threePt" dir="t"/>
-    </dgm:scene3d>
-    <dgm:sp3d/>
-    <dgm:txPr/>
-    <dgm:style>
-      <a:lnRef idx="2">
-        <a:scrgbClr r="0" g="0" b="0"/>
-      </a:lnRef>
-      <a:fillRef idx="1">
-        <a:scrgbClr r="0" g="0" b="0"/>
-      </a:fillRef>
-      <a:effectRef idx="0">
-        <a:scrgbClr r="0" g="0" b="0"/>
-      </a:effectRef>
-      <a:fontRef idx="minor"/>
-    </dgm:style>
-  </dgm:styleLbl>
-  <dgm:styleLbl name="alignAccFollowNode1">
-    <dgm:scene3d>
-      <a:camera prst="orthographicFront"/>
-      <a:lightRig rig="threePt" dir="t"/>
-    </dgm:scene3d>
-    <dgm:sp3d/>
-    <dgm:txPr/>
-    <dgm:style>
-      <a:lnRef idx="2">
-        <a:scrgbClr r="0" g="0" b="0"/>
-      </a:lnRef>
-      <a:fillRef idx="1">
-        <a:scrgbClr r="0" g="0" b="0"/>
-      </a:fillRef>
-      <a:effectRef idx="0">
-        <a:scrgbClr r="0" g="0" b="0"/>
-      </a:effectRef>
-      <a:fontRef idx="minor"/>
-    </dgm:style>
-  </dgm:styleLbl>
-  <dgm:styleLbl name="bgAccFollowNode1">
-    <dgm:scene3d>
-      <a:camera prst="orthographicFront"/>
-      <a:lightRig rig="threePt" dir="t"/>
-    </dgm:scene3d>
-    <dgm:sp3d/>
-    <dgm:txPr/>
-    <dgm:style>
-      <a:lnRef idx="2">
-        <a:scrgbClr r="0" g="0" b="0"/>
-      </a:lnRef>
-      <a:fillRef idx="1">
-        <a:scrgbClr r="0" g="0" b="0"/>
-      </a:fillRef>
-      <a:effectRef idx="0">
-        <a:scrgbClr r="0" g="0" b="0"/>
-      </a:effectRef>
-      <a:fontRef idx="minor"/>
-    </dgm:style>
-  </dgm:styleLbl>
-  <dgm:styleLbl name="fgAcc0">
-    <dgm:scene3d>
-      <a:camera prst="orthographicFront"/>
-      <a:lightRig rig="threePt" dir="t"/>
-    </dgm:scene3d>
-    <dgm:sp3d/>
-    <dgm:txPr/>
-    <dgm:style>
-      <a:lnRef idx="2">
-        <a:scrgbClr r="0" g="0" b="0"/>
-      </a:lnRef>
-      <a:fillRef idx="1">
-        <a:scrgbClr r="0" g="0" b="0"/>
-      </a:fillRef>
-      <a:effectRef idx="0">
-        <a:scrgbClr r="0" g="0" b="0"/>
-      </a:effectRef>
-      <a:fontRef idx="minor"/>
-    </dgm:style>
-  </dgm:styleLbl>
-  <dgm:styleLbl name="fgAcc2">
-    <dgm:scene3d>
-      <a:camera prst="orthographicFront"/>
-      <a:lightRig rig="threePt" dir="t"/>
-    </dgm:scene3d>
-    <dgm:sp3d/>
-    <dgm:txPr/>
-    <dgm:style>
-      <a:lnRef idx="2">
-        <a:scrgbClr r="0" g="0" b="0"/>
-      </a:lnRef>
-      <a:fillRef idx="1">
-        <a:scrgbClr r="0" g="0" b="0"/>
-      </a:fillRef>
-      <a:effectRef idx="0">
-        <a:scrgbClr r="0" g="0" b="0"/>
-      </a:effectRef>
-      <a:fontRef idx="minor"/>
-    </dgm:style>
-  </dgm:styleLbl>
-  <dgm:styleLbl name="fgAcc3">
-    <dgm:scene3d>
-      <a:camera prst="orthographicFront"/>
-      <a:lightRig rig="threePt" dir="t"/>
-    </dgm:scene3d>
-    <dgm:sp3d/>
-    <dgm:txPr/>
-    <dgm:style>
-      <a:lnRef idx="2">
-        <a:scrgbClr r="0" g="0" b="0"/>
-      </a:lnRef>
-      <a:fillRef idx="1">
-        <a:scrgbClr r="0" g="0" b="0"/>
-      </a:fillRef>
-      <a:effectRef idx="0">
-        <a:scrgbClr r="0" g="0" b="0"/>
-      </a:effectRef>
-      <a:fontRef idx="minor"/>
-    </dgm:style>
-  </dgm:styleLbl>
-  <dgm:styleLbl name="fgAcc4">
-    <dgm:scene3d>
-      <a:camera prst="orthographicFront"/>
-      <a:lightRig rig="threePt" dir="t"/>
-    </dgm:scene3d>
-    <dgm:sp3d/>
-    <dgm:txPr/>
-    <dgm:style>
-      <a:lnRef idx="2">
-        <a:scrgbClr r="0" g="0" b="0"/>
-      </a:lnRef>
-      <a:fillRef idx="1">
-        <a:scrgbClr r="0" g="0" b="0"/>
-      </a:fillRef>
-      <a:effectRef idx="0">
-        <a:scrgbClr r="0" g="0" b="0"/>
-      </a:effectRef>
-      <a:fontRef idx="minor"/>
-    </dgm:style>
-  </dgm:styleLbl>
-  <dgm:styleLbl name="bgShp">
-    <dgm:scene3d>
-      <a:camera prst="orthographicFront"/>
-      <a:lightRig rig="threePt" dir="t"/>
-    </dgm:scene3d>
-    <dgm:sp3d/>
-    <dgm:txPr/>
-    <dgm:style>
-      <a:lnRef idx="0">
-        <a:scrgbClr r="0" g="0" b="0"/>
-      </a:lnRef>
-      <a:fillRef idx="1">
-        <a:scrgbClr r="0" g="0" b="0"/>
-      </a:fillRef>
-      <a:effectRef idx="0">
-        <a:scrgbClr r="0" g="0" b="0"/>
-      </a:effectRef>
-      <a:fontRef idx="minor"/>
-    </dgm:style>
-  </dgm:styleLbl>
-  <dgm:styleLbl name="dkBgShp">
-    <dgm:scene3d>
-      <a:camera prst="orthographicFront"/>
-      <a:lightRig rig="threePt" dir="t"/>
-    </dgm:scene3d>
-    <dgm:sp3d/>
-    <dgm:txPr/>
-    <dgm:style>
-      <a:lnRef idx="0">
-        <a:scrgbClr r="0" g="0" b="0"/>
-      </a:lnRef>
-      <a:fillRef idx="1">
-        <a:scrgbClr r="0" g="0" b="0"/>
-      </a:fillRef>
-      <a:effectRef idx="0">
-        <a:scrgbClr r="0" g="0" b="0"/>
-      </a:effectRef>
-      <a:fontRef idx="minor"/>
-    </dgm:style>
-  </dgm:styleLbl>
-  <dgm:styleLbl name="trBgShp">
-    <dgm:scene3d>
-      <a:camera prst="orthographicFront"/>
-      <a:lightRig rig="threePt" dir="t"/>
-    </dgm:scene3d>
-    <dgm:sp3d/>
-    <dgm:txPr/>
-    <dgm:style>
-      <a:lnRef idx="0">
-        <a:scrgbClr r="0" g="0" b="0"/>
-      </a:lnRef>
-      <a:fillRef idx="1">
-        <a:scrgbClr r="0" g="0" b="0"/>
-      </a:fillRef>
-      <a:effectRef idx="0">
-        <a:scrgbClr r="0" g="0" b="0"/>
-      </a:effectRef>
-      <a:fontRef idx="minor"/>
-    </dgm:style>
-  </dgm:styleLbl>
-  <dgm:styleLbl name="fgShp">
-    <dgm:scene3d>
-      <a:camera prst="orthographicFront"/>
-      <a:lightRig rig="threePt" dir="t"/>
-    </dgm:scene3d>
-    <dgm:sp3d/>
-    <dgm:txPr/>
-    <dgm:style>
-      <a:lnRef idx="2">
-        <a:scrgbClr r="0" g="0" b="0"/>
-      </a:lnRef>
-      <a:fillRef idx="1">
-        <a:scrgbClr r="0" g="0" b="0"/>
-      </a:fillRef>
-      <a:effectRef idx="0">
-        <a:scrgbClr r="0" g="0" b="0"/>
-      </a:effectRef>
-      <a:fontRef idx="minor"/>
-    </dgm:style>
-  </dgm:styleLbl>
-  <dgm:styleLbl name="revTx">
-    <dgm:scene3d>
-      <a:camera prst="orthographicFront"/>
-      <a:lightRig rig="threePt" dir="t"/>
-    </dgm:scene3d>
-    <dgm:sp3d/>
-    <dgm:txPr/>
-    <dgm:style>
-      <a:lnRef idx="0">
-        <a:scrgbClr r="0" g="0" b="0"/>
-      </a:lnRef>
-      <a:fillRef idx="0">
-        <a:scrgbClr r="0" g="0" b="0"/>
-      </a:fillRef>
-      <a:effectRef idx="0">
-        <a:scrgbClr r="0" g="0" b="0"/>
-      </a:effectRef>
-      <a:fontRef idx="minor"/>
-    </dgm:style>
-  </dgm:styleLbl>
-</dgm:styleDef>
-</file>
-
-<file path=ppt/diagrams/quickStyle2.xml><?xml version="1.0" encoding="utf-8"?>
 <dgm:styleDef xmlns:dgm="http://schemas.openxmlformats.org/drawingml/2006/diagram" xmlns:a="http://schemas.openxmlformats.org/drawingml/2006/main" uniqueId="urn:microsoft.com/office/officeart/2005/8/quickstyle/simple1">
   <dgm:title val=""/>
   <dgm:desc val=""/>
@@ -19096,102 +15675,6 @@
       </p:grpSpPr>
       <p:pic>
         <p:nvPicPr>
-          <p:cNvPr id="4" name="Content Placeholder 3"/>
-          <p:cNvPicPr>
-            <a:picLocks noGrp="1" noChangeAspect="1"/>
-          </p:cNvPicPr>
-          <p:nvPr>
-            <p:ph idx="1"/>
-          </p:nvPr>
-        </p:nvPicPr>
-        <p:blipFill>
-          <a:blip r:embed="rId2">
-            <a:lum bright="70000" contrast="-70000"/>
-            <a:extLst>
-              <a:ext uri="{28A0092B-C50C-407E-A947-70E740481C1C}">
-                <a14:useLocalDpi xmlns:a14="http://schemas.microsoft.com/office/drawing/2010/main" val="0"/>
-              </a:ext>
-            </a:extLst>
-          </a:blip>
-          <a:stretch>
-            <a:fillRect/>
-          </a:stretch>
-        </p:blipFill>
-        <p:spPr>
-          <a:xfrm>
-            <a:off x="-53946" y="-92333"/>
-            <a:ext cx="9197945" cy="7010374"/>
-          </a:xfrm>
-        </p:spPr>
-      </p:pic>
-      <p:sp>
-        <p:nvSpPr>
-          <p:cNvPr id="2" name="Title 1"/>
-          <p:cNvSpPr>
-            <a:spLocks noGrp="1"/>
-          </p:cNvSpPr>
-          <p:nvPr>
-            <p:ph type="title"/>
-          </p:nvPr>
-        </p:nvSpPr>
-        <p:spPr>
-          <a:xfrm>
-            <a:off x="457200" y="1981200"/>
-            <a:ext cx="8534400" cy="2057400"/>
-          </a:xfrm>
-        </p:spPr>
-        <p:txBody>
-          <a:bodyPr>
-            <a:normAutofit/>
-          </a:bodyPr>
-          <a:lstStyle/>
-          <a:p>
-            <a:pPr>
-              <a:lnSpc>
-                <a:spcPct val="150000"/>
-              </a:lnSpc>
-            </a:pPr>
-            <a:r>
-              <a:rPr lang="en-US" sz="3600" b="1" dirty="0">
-                <a:cs typeface="Times New Roman" panose="02020603050405020304" pitchFamily="18" charset="0"/>
-              </a:rPr>
-              <a:t>SIX MOST POLLUTING CHEMICALS PRESENT IN INDUSTRIAL WASTES</a:t>
-            </a:r>
-          </a:p>
-        </p:txBody>
-      </p:sp>
-    </p:spTree>
-    <p:extLst>
-      <p:ext uri="{BB962C8B-B14F-4D97-AF65-F5344CB8AC3E}">
-        <p14:creationId xmlns:p14="http://schemas.microsoft.com/office/powerpoint/2010/main" val="1896296339"/>
-      </p:ext>
-    </p:extLst>
-  </p:cSld>
-  <p:clrMapOvr>
-    <a:masterClrMapping/>
-  </p:clrMapOvr>
-</p:sld>
-</file>
-
-<file path=ppt/slides/slide11.xml><?xml version="1.0" encoding="utf-8"?>
-<p:sld xmlns:a="http://schemas.openxmlformats.org/drawingml/2006/main" xmlns:r="http://schemas.openxmlformats.org/officeDocument/2006/relationships" xmlns:p="http://schemas.openxmlformats.org/presentationml/2006/main">
-  <p:cSld>
-    <p:spTree>
-      <p:nvGrpSpPr>
-        <p:cNvPr id="1" name=""/>
-        <p:cNvGrpSpPr/>
-        <p:nvPr/>
-      </p:nvGrpSpPr>
-      <p:grpSpPr>
-        <a:xfrm>
-          <a:off x="0" y="0"/>
-          <a:ext cx="0" cy="0"/>
-          <a:chOff x="0" y="0"/>
-          <a:chExt cx="0" cy="0"/>
-        </a:xfrm>
-      </p:grpSpPr>
-      <p:pic>
-        <p:nvPicPr>
           <p:cNvPr id="2" name="Picture 1"/>
           <p:cNvPicPr>
             <a:picLocks noChangeAspect="1"/>
@@ -19233,7 +15716,7 @@
 </p:sld>
 </file>
 
-<file path=ppt/slides/slide12.xml><?xml version="1.0" encoding="utf-8"?>
+<file path=ppt/slides/slide11.xml><?xml version="1.0" encoding="utf-8"?>
 <p:sld xmlns:a="http://schemas.openxmlformats.org/drawingml/2006/main" xmlns:r="http://schemas.openxmlformats.org/officeDocument/2006/relationships" xmlns:p="http://schemas.openxmlformats.org/presentationml/2006/main">
   <p:cSld>
     <p:spTree>
@@ -19425,7 +15908,7 @@
 </p:sld>
 </file>
 
-<file path=ppt/slides/slide13.xml><?xml version="1.0" encoding="utf-8"?>
+<file path=ppt/slides/slide12.xml><?xml version="1.0" encoding="utf-8"?>
 <p:sld xmlns:a="http://schemas.openxmlformats.org/drawingml/2006/main" xmlns:r="http://schemas.openxmlformats.org/officeDocument/2006/relationships" xmlns:p="http://schemas.openxmlformats.org/presentationml/2006/main">
   <p:cSld>
     <p:spTree>
@@ -19485,7 +15968,7 @@
 </p:sld>
 </file>
 
-<file path=ppt/slides/slide14.xml><?xml version="1.0" encoding="utf-8"?>
+<file path=ppt/slides/slide13.xml><?xml version="1.0" encoding="utf-8"?>
 <p:sld xmlns:a="http://schemas.openxmlformats.org/drawingml/2006/main" xmlns:r="http://schemas.openxmlformats.org/officeDocument/2006/relationships" xmlns:p="http://schemas.openxmlformats.org/presentationml/2006/main">
   <p:cSld>
     <p:spTree>
@@ -19577,7 +16060,7 @@
 </p:sld>
 </file>
 
-<file path=ppt/slides/slide15.xml><?xml version="1.0" encoding="utf-8"?>
+<file path=ppt/slides/slide14.xml><?xml version="1.0" encoding="utf-8"?>
 <p:sld xmlns:a="http://schemas.openxmlformats.org/drawingml/2006/main" xmlns:r="http://schemas.openxmlformats.org/officeDocument/2006/relationships" xmlns:p="http://schemas.openxmlformats.org/presentationml/2006/main">
   <p:cSld>
     <p:spTree>
@@ -19665,7 +16148,7 @@
 </p:sld>
 </file>
 
-<file path=ppt/slides/slide16.xml><?xml version="1.0" encoding="utf-8"?>
+<file path=ppt/slides/slide15.xml><?xml version="1.0" encoding="utf-8"?>
 <p:sld xmlns:a="http://schemas.openxmlformats.org/drawingml/2006/main" xmlns:r="http://schemas.openxmlformats.org/officeDocument/2006/relationships" xmlns:p="http://schemas.openxmlformats.org/presentationml/2006/main">
   <p:cSld>
     <p:spTree>
@@ -19787,7 +16270,7 @@
 </p:sld>
 </file>
 
-<file path=ppt/slides/slide17.xml><?xml version="1.0" encoding="utf-8"?>
+<file path=ppt/slides/slide16.xml><?xml version="1.0" encoding="utf-8"?>
 <p:sld xmlns:a="http://schemas.openxmlformats.org/drawingml/2006/main" xmlns:r="http://schemas.openxmlformats.org/officeDocument/2006/relationships" xmlns:p="http://schemas.openxmlformats.org/presentationml/2006/main" show="0">
   <p:cSld>
     <p:spTree>
@@ -19871,7 +16354,7 @@
 </p:sld>
 </file>
 
-<file path=ppt/slides/slide18.xml><?xml version="1.0" encoding="utf-8"?>
+<file path=ppt/slides/slide17.xml><?xml version="1.0" encoding="utf-8"?>
 <p:sld xmlns:a="http://schemas.openxmlformats.org/drawingml/2006/main" xmlns:r="http://schemas.openxmlformats.org/officeDocument/2006/relationships" xmlns:p="http://schemas.openxmlformats.org/presentationml/2006/main" show="0">
   <p:cSld>
     <p:spTree>
@@ -19931,7 +16414,7 @@
 </p:sld>
 </file>
 
-<file path=ppt/slides/slide19.xml><?xml version="1.0" encoding="utf-8"?>
+<file path=ppt/slides/slide18.xml><?xml version="1.0" encoding="utf-8"?>
 <p:sld xmlns:a="http://schemas.openxmlformats.org/drawingml/2006/main" xmlns:r="http://schemas.openxmlformats.org/officeDocument/2006/relationships" xmlns:p="http://schemas.openxmlformats.org/presentationml/2006/main" show="0">
   <p:cSld>
     <p:spTree>
@@ -19982,6 +16465,185 @@
     <p:extLst>
       <p:ext uri="{BB962C8B-B14F-4D97-AF65-F5344CB8AC3E}">
         <p14:creationId xmlns:p14="http://schemas.microsoft.com/office/powerpoint/2010/main" val="1368059419"/>
+      </p:ext>
+    </p:extLst>
+  </p:cSld>
+  <p:clrMapOvr>
+    <a:masterClrMapping/>
+  </p:clrMapOvr>
+</p:sld>
+</file>
+
+<file path=ppt/slides/slide19.xml><?xml version="1.0" encoding="utf-8"?>
+<p:sld xmlns:a="http://schemas.openxmlformats.org/drawingml/2006/main" xmlns:r="http://schemas.openxmlformats.org/officeDocument/2006/relationships" xmlns:p="http://schemas.openxmlformats.org/presentationml/2006/main">
+  <p:cSld>
+    <p:spTree>
+      <p:nvGrpSpPr>
+        <p:cNvPr id="1" name=""/>
+        <p:cNvGrpSpPr/>
+        <p:nvPr/>
+      </p:nvGrpSpPr>
+      <p:grpSpPr>
+        <a:xfrm>
+          <a:off x="0" y="0"/>
+          <a:ext cx="0" cy="0"/>
+          <a:chOff x="0" y="0"/>
+          <a:chExt cx="0" cy="0"/>
+        </a:xfrm>
+      </p:grpSpPr>
+      <p:sp>
+        <p:nvSpPr>
+          <p:cNvPr id="2" name="Title 1"/>
+          <p:cNvSpPr>
+            <a:spLocks noGrp="1"/>
+          </p:cNvSpPr>
+          <p:nvPr>
+            <p:ph type="title"/>
+          </p:nvPr>
+        </p:nvSpPr>
+        <p:spPr>
+          <a:xfrm>
+            <a:off x="495300" y="-183818"/>
+            <a:ext cx="8229600" cy="1143000"/>
+          </a:xfrm>
+        </p:spPr>
+        <p:txBody>
+          <a:bodyPr>
+            <a:normAutofit/>
+          </a:bodyPr>
+          <a:lstStyle/>
+          <a:p>
+            <a:r>
+              <a:rPr lang="en-US" sz="2400" b="1" dirty="0">
+                <a:latin typeface="Times New Roman" panose="02020603050405020304" pitchFamily="18" charset="0"/>
+                <a:cs typeface="Times New Roman" panose="02020603050405020304" pitchFamily="18" charset="0"/>
+              </a:rPr>
+              <a:t>CONCLUSION</a:t>
+            </a:r>
+          </a:p>
+        </p:txBody>
+      </p:sp>
+      <p:pic>
+        <p:nvPicPr>
+          <p:cNvPr id="4" name="Picture 3"/>
+          <p:cNvPicPr>
+            <a:picLocks noChangeAspect="1"/>
+          </p:cNvPicPr>
+          <p:nvPr/>
+        </p:nvPicPr>
+        <p:blipFill>
+          <a:blip r:embed="rId2" cstate="print">
+            <a:extLst>
+              <a:ext uri="{28A0092B-C50C-407E-A947-70E740481C1C}">
+                <a14:useLocalDpi xmlns:a14="http://schemas.microsoft.com/office/drawing/2010/main" val="0"/>
+              </a:ext>
+            </a:extLst>
+          </a:blip>
+          <a:stretch>
+            <a:fillRect/>
+          </a:stretch>
+        </p:blipFill>
+        <p:spPr>
+          <a:xfrm flipH="1">
+            <a:off x="7467600" y="5248656"/>
+            <a:ext cx="1676400" cy="1609344"/>
+          </a:xfrm>
+          <a:prstGeom prst="rect">
+            <a:avLst/>
+          </a:prstGeom>
+        </p:spPr>
+      </p:pic>
+      <p:sp>
+        <p:nvSpPr>
+          <p:cNvPr id="3" name="Content Placeholder 2"/>
+          <p:cNvSpPr>
+            <a:spLocks noGrp="1"/>
+          </p:cNvSpPr>
+          <p:nvPr>
+            <p:ph idx="1"/>
+          </p:nvPr>
+        </p:nvSpPr>
+        <p:spPr>
+          <a:xfrm>
+            <a:off x="228600" y="838200"/>
+            <a:ext cx="8763000" cy="5181600"/>
+          </a:xfrm>
+        </p:spPr>
+        <p:txBody>
+          <a:bodyPr>
+            <a:noAutofit/>
+          </a:bodyPr>
+          <a:lstStyle/>
+          <a:p>
+            <a:pPr algn="just">
+              <a:lnSpc>
+                <a:spcPct val="150000"/>
+              </a:lnSpc>
+            </a:pPr>
+            <a:r>
+              <a:rPr lang="en-US" sz="1800" dirty="0">
+                <a:latin typeface="Times New Roman" panose="02020603050405020304" pitchFamily="18" charset="0"/>
+                <a:ea typeface="Times New Roman" panose="02020603050405020304" pitchFamily="18" charset="0"/>
+                <a:cs typeface="Times New Roman" panose="02020603050405020304" pitchFamily="18" charset="0"/>
+              </a:rPr>
+              <a:t>As primary watchdogs of industry behavior, the federal government has the important job of regulating known carcinogenic chemicals that are emitted into the atmosphere and should hold certain companies, as well as industries, accountable putting the health of the American public in jeopardy.  </a:t>
+            </a:r>
+          </a:p>
+          <a:p>
+            <a:pPr algn="just">
+              <a:lnSpc>
+                <a:spcPct val="150000"/>
+              </a:lnSpc>
+            </a:pPr>
+            <a:r>
+              <a:rPr lang="en-US" sz="1800" dirty="0">
+                <a:latin typeface="Times New Roman" panose="02020603050405020304" pitchFamily="18" charset="0"/>
+                <a:ea typeface="Times New Roman" panose="02020603050405020304" pitchFamily="18" charset="0"/>
+                <a:cs typeface="Times New Roman" panose="02020603050405020304" pitchFamily="18" charset="0"/>
+              </a:rPr>
+              <a:t>The results of this report show that certain chemicals should be examined more rigorously, as well as their mode of waste disposal. </a:t>
+            </a:r>
+          </a:p>
+          <a:p>
+            <a:pPr algn="just">
+              <a:lnSpc>
+                <a:spcPct val="150000"/>
+              </a:lnSpc>
+            </a:pPr>
+            <a:r>
+              <a:rPr lang="en-US" sz="1800" dirty="0">
+                <a:latin typeface="Times New Roman" panose="02020603050405020304" pitchFamily="18" charset="0"/>
+                <a:ea typeface="Times New Roman" panose="02020603050405020304" pitchFamily="18" charset="0"/>
+                <a:cs typeface="Times New Roman" panose="02020603050405020304" pitchFamily="18" charset="0"/>
+              </a:rPr>
+              <a:t>EPA regulators and community climate change activists should use this information as added confirmation that the fight for more responsible industry disposal standards is a critical one for the safety of all Americans. </a:t>
+            </a:r>
+          </a:p>
+          <a:p>
+            <a:pPr algn="just">
+              <a:lnSpc>
+                <a:spcPct val="150000"/>
+              </a:lnSpc>
+            </a:pPr>
+            <a:r>
+              <a:rPr lang="en-US" sz="1800" dirty="0">
+                <a:latin typeface="Times New Roman" panose="02020603050405020304" pitchFamily="18" charset="0"/>
+                <a:ea typeface="Times New Roman" panose="02020603050405020304" pitchFamily="18" charset="0"/>
+                <a:cs typeface="Times New Roman" panose="02020603050405020304" pitchFamily="18" charset="0"/>
+              </a:rPr>
+              <a:t>Companies should be financially incentivized to dispose in more environmentally healthy ways.</a:t>
+            </a:r>
+            <a:endParaRPr lang="en-US" sz="1800" dirty="0">
+              <a:latin typeface="Times New Roman" panose="02020603050405020304" pitchFamily="18" charset="0"/>
+              <a:cs typeface="Times New Roman" panose="02020603050405020304" pitchFamily="18" charset="0"/>
+            </a:endParaRPr>
+          </a:p>
+        </p:txBody>
+      </p:sp>
+    </p:spTree>
+    <p:extLst>
+      <p:ext uri="{BB962C8B-B14F-4D97-AF65-F5344CB8AC3E}">
+        <p14:creationId xmlns:p14="http://schemas.microsoft.com/office/powerpoint/2010/main" val="875861197"/>
       </p:ext>
     </p:extLst>
   </p:cSld>
@@ -20181,185 +16843,6 @@
 </file>
 
 <file path=ppt/slides/slide20.xml><?xml version="1.0" encoding="utf-8"?>
-<p:sld xmlns:a="http://schemas.openxmlformats.org/drawingml/2006/main" xmlns:r="http://schemas.openxmlformats.org/officeDocument/2006/relationships" xmlns:p="http://schemas.openxmlformats.org/presentationml/2006/main" show="0">
-  <p:cSld>
-    <p:spTree>
-      <p:nvGrpSpPr>
-        <p:cNvPr id="1" name=""/>
-        <p:cNvGrpSpPr/>
-        <p:nvPr/>
-      </p:nvGrpSpPr>
-      <p:grpSpPr>
-        <a:xfrm>
-          <a:off x="0" y="0"/>
-          <a:ext cx="0" cy="0"/>
-          <a:chOff x="0" y="0"/>
-          <a:chExt cx="0" cy="0"/>
-        </a:xfrm>
-      </p:grpSpPr>
-      <p:sp>
-        <p:nvSpPr>
-          <p:cNvPr id="2" name="Title 1"/>
-          <p:cNvSpPr>
-            <a:spLocks noGrp="1"/>
-          </p:cNvSpPr>
-          <p:nvPr>
-            <p:ph type="title"/>
-          </p:nvPr>
-        </p:nvSpPr>
-        <p:spPr>
-          <a:xfrm>
-            <a:off x="495300" y="-183818"/>
-            <a:ext cx="8229600" cy="1143000"/>
-          </a:xfrm>
-        </p:spPr>
-        <p:txBody>
-          <a:bodyPr>
-            <a:normAutofit/>
-          </a:bodyPr>
-          <a:lstStyle/>
-          <a:p>
-            <a:r>
-              <a:rPr lang="en-US" sz="2400" b="1" dirty="0">
-                <a:latin typeface="Times New Roman" panose="02020603050405020304" pitchFamily="18" charset="0"/>
-                <a:cs typeface="Times New Roman" panose="02020603050405020304" pitchFamily="18" charset="0"/>
-              </a:rPr>
-              <a:t>CONCLUSION</a:t>
-            </a:r>
-          </a:p>
-        </p:txBody>
-      </p:sp>
-      <p:pic>
-        <p:nvPicPr>
-          <p:cNvPr id="4" name="Picture 3"/>
-          <p:cNvPicPr>
-            <a:picLocks noChangeAspect="1"/>
-          </p:cNvPicPr>
-          <p:nvPr/>
-        </p:nvPicPr>
-        <p:blipFill>
-          <a:blip r:embed="rId2" cstate="print">
-            <a:extLst>
-              <a:ext uri="{28A0092B-C50C-407E-A947-70E740481C1C}">
-                <a14:useLocalDpi xmlns:a14="http://schemas.microsoft.com/office/drawing/2010/main" val="0"/>
-              </a:ext>
-            </a:extLst>
-          </a:blip>
-          <a:stretch>
-            <a:fillRect/>
-          </a:stretch>
-        </p:blipFill>
-        <p:spPr>
-          <a:xfrm flipH="1">
-            <a:off x="7467600" y="5248656"/>
-            <a:ext cx="1676400" cy="1609344"/>
-          </a:xfrm>
-          <a:prstGeom prst="rect">
-            <a:avLst/>
-          </a:prstGeom>
-        </p:spPr>
-      </p:pic>
-      <p:sp>
-        <p:nvSpPr>
-          <p:cNvPr id="3" name="Content Placeholder 2"/>
-          <p:cNvSpPr>
-            <a:spLocks noGrp="1"/>
-          </p:cNvSpPr>
-          <p:nvPr>
-            <p:ph idx="1"/>
-          </p:nvPr>
-        </p:nvSpPr>
-        <p:spPr>
-          <a:xfrm>
-            <a:off x="228600" y="838200"/>
-            <a:ext cx="8763000" cy="5181600"/>
-          </a:xfrm>
-        </p:spPr>
-        <p:txBody>
-          <a:bodyPr>
-            <a:noAutofit/>
-          </a:bodyPr>
-          <a:lstStyle/>
-          <a:p>
-            <a:pPr algn="just">
-              <a:lnSpc>
-                <a:spcPct val="150000"/>
-              </a:lnSpc>
-            </a:pPr>
-            <a:r>
-              <a:rPr lang="en-US" sz="1800" dirty="0">
-                <a:latin typeface="Times New Roman" panose="02020603050405020304" pitchFamily="18" charset="0"/>
-                <a:ea typeface="Times New Roman" panose="02020603050405020304" pitchFamily="18" charset="0"/>
-                <a:cs typeface="Times New Roman" panose="02020603050405020304" pitchFamily="18" charset="0"/>
-              </a:rPr>
-              <a:t>As primary watchdogs of industry behavior, the federal government has the important job of regulating known carcinogenic chemicals that are emitted into the atmosphere and should hold certain companies, as well as industries, accountable putting the health of the American public in jeopardy.  </a:t>
-            </a:r>
-          </a:p>
-          <a:p>
-            <a:pPr algn="just">
-              <a:lnSpc>
-                <a:spcPct val="150000"/>
-              </a:lnSpc>
-            </a:pPr>
-            <a:r>
-              <a:rPr lang="en-US" sz="1800" dirty="0">
-                <a:latin typeface="Times New Roman" panose="02020603050405020304" pitchFamily="18" charset="0"/>
-                <a:ea typeface="Times New Roman" panose="02020603050405020304" pitchFamily="18" charset="0"/>
-                <a:cs typeface="Times New Roman" panose="02020603050405020304" pitchFamily="18" charset="0"/>
-              </a:rPr>
-              <a:t>The results of this report show that certain chemicals should be examined more rigorously, as well as their mode of waste disposal. </a:t>
-            </a:r>
-          </a:p>
-          <a:p>
-            <a:pPr algn="just">
-              <a:lnSpc>
-                <a:spcPct val="150000"/>
-              </a:lnSpc>
-            </a:pPr>
-            <a:r>
-              <a:rPr lang="en-US" sz="1800" dirty="0">
-                <a:latin typeface="Times New Roman" panose="02020603050405020304" pitchFamily="18" charset="0"/>
-                <a:ea typeface="Times New Roman" panose="02020603050405020304" pitchFamily="18" charset="0"/>
-                <a:cs typeface="Times New Roman" panose="02020603050405020304" pitchFamily="18" charset="0"/>
-              </a:rPr>
-              <a:t>EPA regulators and community climate change activists should use this information as added confirmation that the fight for more responsible industry disposal standards is a critical one for the safety of all Americans. </a:t>
-            </a:r>
-          </a:p>
-          <a:p>
-            <a:pPr algn="just">
-              <a:lnSpc>
-                <a:spcPct val="150000"/>
-              </a:lnSpc>
-            </a:pPr>
-            <a:r>
-              <a:rPr lang="en-US" sz="1800" dirty="0">
-                <a:latin typeface="Times New Roman" panose="02020603050405020304" pitchFamily="18" charset="0"/>
-                <a:ea typeface="Times New Roman" panose="02020603050405020304" pitchFamily="18" charset="0"/>
-                <a:cs typeface="Times New Roman" panose="02020603050405020304" pitchFamily="18" charset="0"/>
-              </a:rPr>
-              <a:t>Companies should be financially incentivized to dispose in more environmentally healthy ways.</a:t>
-            </a:r>
-            <a:endParaRPr lang="en-US" sz="1800" dirty="0">
-              <a:latin typeface="Times New Roman" panose="02020603050405020304" pitchFamily="18" charset="0"/>
-              <a:cs typeface="Times New Roman" panose="02020603050405020304" pitchFamily="18" charset="0"/>
-            </a:endParaRPr>
-          </a:p>
-        </p:txBody>
-      </p:sp>
-    </p:spTree>
-    <p:extLst>
-      <p:ext uri="{BB962C8B-B14F-4D97-AF65-F5344CB8AC3E}">
-        <p14:creationId xmlns:p14="http://schemas.microsoft.com/office/powerpoint/2010/main" val="875861197"/>
-      </p:ext>
-    </p:extLst>
-  </p:cSld>
-  <p:clrMapOvr>
-    <a:masterClrMapping/>
-  </p:clrMapOvr>
-</p:sld>
-</file>
-
-<file path=ppt/slides/slide21.xml><?xml version="1.0" encoding="utf-8"?>
 <p:sld xmlns:a="http://schemas.openxmlformats.org/drawingml/2006/main" xmlns:r="http://schemas.openxmlformats.org/officeDocument/2006/relationships" xmlns:p="http://schemas.openxmlformats.org/presentationml/2006/main">
   <p:cSld>
     <p:spTree>
@@ -20808,7 +17291,6 @@
               <a:rPr lang="en-US" sz="2400" b="1" dirty="0"/>
               <a:t>TOP 3 STATE-INDUSTRIES CASUING MAX POLLUTION AS OF 2014</a:t>
             </a:r>
-            <a:endParaRPr lang="en-US" sz="2400" b="1" dirty="0"/>
           </a:p>
         </p:txBody>
       </p:sp>
@@ -21367,135 +17849,6 @@
         </p:nvSpPr>
         <p:spPr>
           <a:xfrm>
-            <a:off x="13073" y="31652"/>
-            <a:ext cx="9144000" cy="838200"/>
-          </a:xfrm>
-        </p:spPr>
-        <p:txBody>
-          <a:bodyPr>
-            <a:noAutofit/>
-          </a:bodyPr>
-          <a:lstStyle/>
-          <a:p>
-            <a:br>
-              <a:rPr lang="en-US" sz="2400" dirty="0"/>
-            </a:br>
-            <a:r>
-              <a:rPr lang="en-US" sz="2400" b="1" dirty="0">
-                <a:solidFill>
-                  <a:srgbClr val="002060"/>
-                </a:solidFill>
-                <a:cs typeface="Times New Roman" panose="02020603050405020304" pitchFamily="18" charset="0"/>
-              </a:rPr>
-              <a:t>MOST POLLUTING STATES AS OF 2014</a:t>
-            </a:r>
-            <a:br>
-              <a:rPr lang="en-US" sz="2400" b="1" dirty="0">
-                <a:solidFill>
-                  <a:srgbClr val="002060"/>
-                </a:solidFill>
-              </a:rPr>
-            </a:br>
-            <a:endParaRPr lang="en-US" sz="2400" b="1" dirty="0">
-              <a:solidFill>
-                <a:srgbClr val="002060"/>
-              </a:solidFill>
-            </a:endParaRPr>
-          </a:p>
-        </p:txBody>
-      </p:sp>
-      <mc:AlternateContent xmlns:mc="http://schemas.openxmlformats.org/markup-compatibility/2006">
-        <mc:Choice xmlns:a14="http://schemas.microsoft.com/office/drawing/2010/main" Requires="a14">
-          <p:graphicFrame>
-            <p:nvGraphicFramePr>
-              <p:cNvPr id="4" name="Diagram 3"/>
-              <p:cNvGraphicFramePr/>
-              <p:nvPr>
-                <p:extLst>
-                  <p:ext uri="{D42A27DB-BD31-4B8C-83A1-F6EECF244321}">
-                    <p14:modId xmlns:p14="http://schemas.microsoft.com/office/powerpoint/2010/main" val="3132384879"/>
-                  </p:ext>
-                </p:extLst>
-              </p:nvPr>
-            </p:nvGraphicFramePr>
-            <p:xfrm>
-              <a:off x="685800" y="1066800"/>
-              <a:ext cx="8813054" cy="5410200"/>
-            </p:xfrm>
-            <a:graphic>
-              <a:graphicData uri="http://schemas.openxmlformats.org/drawingml/2006/diagram">
-                <dgm:relIds xmlns:dgm="http://schemas.openxmlformats.org/drawingml/2006/diagram" xmlns:r="http://schemas.openxmlformats.org/officeDocument/2006/relationships" r:dm="rId2" r:lo="rId3" r:qs="rId4" r:cs="rId5"/>
-              </a:graphicData>
-            </a:graphic>
-          </p:graphicFrame>
-        </mc:Choice>
-        <mc:Fallback>
-          <p:graphicFrame>
-            <p:nvGraphicFramePr>
-              <p:cNvPr id="4" name="Diagram 3"/>
-              <p:cNvGraphicFramePr/>
-              <p:nvPr>
-                <p:extLst>
-                  <p:ext uri="{D42A27DB-BD31-4B8C-83A1-F6EECF244321}">
-                    <p14:modId xmlns:p14="http://schemas.microsoft.com/office/powerpoint/2010/main" val="3132384879"/>
-                  </p:ext>
-                </p:extLst>
-              </p:nvPr>
-            </p:nvGraphicFramePr>
-            <p:xfrm>
-              <a:off x="685800" y="1066800"/>
-              <a:ext cx="8813054" cy="5410200"/>
-            </p:xfrm>
-            <a:graphic>
-              <a:graphicData uri="http://schemas.openxmlformats.org/drawingml/2006/diagram">
-                <dgm:relIds xmlns:dgm="http://schemas.openxmlformats.org/drawingml/2006/diagram" xmlns:r="http://schemas.openxmlformats.org/officeDocument/2006/relationships" r:dm="rId7" r:lo="rId3" r:qs="rId4" r:cs="rId5"/>
-              </a:graphicData>
-            </a:graphic>
-          </p:graphicFrame>
-        </mc:Fallback>
-      </mc:AlternateContent>
-    </p:spTree>
-    <p:extLst>
-      <p:ext uri="{BB962C8B-B14F-4D97-AF65-F5344CB8AC3E}">
-        <p14:creationId xmlns:p14="http://schemas.microsoft.com/office/powerpoint/2010/main" val="2368844023"/>
-      </p:ext>
-    </p:extLst>
-  </p:cSld>
-  <p:clrMapOvr>
-    <a:masterClrMapping/>
-  </p:clrMapOvr>
-</p:sld>
-</file>
-
-<file path=ppt/slides/slide7.xml><?xml version="1.0" encoding="utf-8"?>
-<p:sld xmlns:a="http://schemas.openxmlformats.org/drawingml/2006/main" xmlns:r="http://schemas.openxmlformats.org/officeDocument/2006/relationships" xmlns:p="http://schemas.openxmlformats.org/presentationml/2006/main">
-  <p:cSld>
-    <p:spTree>
-      <p:nvGrpSpPr>
-        <p:cNvPr id="1" name=""/>
-        <p:cNvGrpSpPr/>
-        <p:nvPr/>
-      </p:nvGrpSpPr>
-      <p:grpSpPr>
-        <a:xfrm>
-          <a:off x="0" y="0"/>
-          <a:ext cx="0" cy="0"/>
-          <a:chOff x="0" y="0"/>
-          <a:chExt cx="0" cy="0"/>
-        </a:xfrm>
-      </p:grpSpPr>
-      <p:sp>
-        <p:nvSpPr>
-          <p:cNvPr id="2" name="Title 1"/>
-          <p:cNvSpPr>
-            <a:spLocks noGrp="1"/>
-          </p:cNvSpPr>
-          <p:nvPr>
-            <p:ph type="title"/>
-          </p:nvPr>
-        </p:nvSpPr>
-        <p:spPr>
-          <a:xfrm>
             <a:off x="0" y="3517"/>
             <a:ext cx="9144000" cy="838200"/>
           </a:xfrm>
@@ -21533,8 +17886,8 @@
           </a:p>
         </p:txBody>
       </p:sp>
-      <mc:AlternateContent xmlns:mc="http://schemas.openxmlformats.org/markup-compatibility/2006">
-        <mc:Choice xmlns:a14="http://schemas.microsoft.com/office/drawing/2010/main" Requires="a14">
+      <mc:AlternateContent xmlns:mc="http://schemas.openxmlformats.org/markup-compatibility/2006" xmlns:a14="http://schemas.microsoft.com/office/drawing/2010/main">
+        <mc:Choice Requires="a14">
           <p:graphicFrame>
             <p:nvGraphicFramePr>
               <p:cNvPr id="4" name="Diagram 3"/>
@@ -21558,7 +17911,7 @@
             </a:graphic>
           </p:graphicFrame>
         </mc:Choice>
-        <mc:Fallback>
+        <mc:Fallback xmlns="">
           <p:graphicFrame>
             <p:nvGraphicFramePr>
               <p:cNvPr id="4" name="Diagram 3"/>
@@ -21577,7 +17930,7 @@
             </p:xfrm>
             <a:graphic>
               <a:graphicData uri="http://schemas.openxmlformats.org/drawingml/2006/diagram">
-                <dgm:relIds xmlns:dgm="http://schemas.openxmlformats.org/drawingml/2006/diagram" xmlns:r="http://schemas.openxmlformats.org/officeDocument/2006/relationships" r:dm="rId7" r:lo="rId3" r:qs="rId4" r:cs="rId5"/>
+                <dgm:relIds xmlns:dgm="http://schemas.openxmlformats.org/drawingml/2006/diagram" xmlns:r="http://schemas.openxmlformats.org/officeDocument/2006/relationships" r:dm="rId7" r:lo="rId8" r:qs="rId9" r:cs="rId10"/>
               </a:graphicData>
             </a:graphic>
           </p:graphicFrame>
@@ -21596,7 +17949,7 @@
 </p:sld>
 </file>
 
-<file path=ppt/slides/slide8.xml><?xml version="1.0" encoding="utf-8"?>
+<file path=ppt/slides/slide7.xml><?xml version="1.0" encoding="utf-8"?>
 <p:sld xmlns:a="http://schemas.openxmlformats.org/drawingml/2006/main" xmlns:r="http://schemas.openxmlformats.org/officeDocument/2006/relationships" xmlns:p="http://schemas.openxmlformats.org/presentationml/2006/main">
   <p:cSld>
     <p:spTree>
@@ -21656,7 +18009,7 @@
 </p:sld>
 </file>
 
-<file path=ppt/slides/slide9.xml><?xml version="1.0" encoding="utf-8"?>
+<file path=ppt/slides/slide8.xml><?xml version="1.0" encoding="utf-8"?>
 <p:sld xmlns:a="http://schemas.openxmlformats.org/drawingml/2006/main" xmlns:r="http://schemas.openxmlformats.org/officeDocument/2006/relationships" xmlns:p="http://schemas.openxmlformats.org/presentationml/2006/main">
   <p:cSld>
     <p:spTree>
@@ -21733,6 +18086,102 @@
     <p:extLst>
       <p:ext uri="{BB962C8B-B14F-4D97-AF65-F5344CB8AC3E}">
         <p14:creationId xmlns:p14="http://schemas.microsoft.com/office/powerpoint/2010/main" val="3841343884"/>
+      </p:ext>
+    </p:extLst>
+  </p:cSld>
+  <p:clrMapOvr>
+    <a:masterClrMapping/>
+  </p:clrMapOvr>
+</p:sld>
+</file>
+
+<file path=ppt/slides/slide9.xml><?xml version="1.0" encoding="utf-8"?>
+<p:sld xmlns:a="http://schemas.openxmlformats.org/drawingml/2006/main" xmlns:r="http://schemas.openxmlformats.org/officeDocument/2006/relationships" xmlns:p="http://schemas.openxmlformats.org/presentationml/2006/main">
+  <p:cSld>
+    <p:spTree>
+      <p:nvGrpSpPr>
+        <p:cNvPr id="1" name=""/>
+        <p:cNvGrpSpPr/>
+        <p:nvPr/>
+      </p:nvGrpSpPr>
+      <p:grpSpPr>
+        <a:xfrm>
+          <a:off x="0" y="0"/>
+          <a:ext cx="0" cy="0"/>
+          <a:chOff x="0" y="0"/>
+          <a:chExt cx="0" cy="0"/>
+        </a:xfrm>
+      </p:grpSpPr>
+      <p:pic>
+        <p:nvPicPr>
+          <p:cNvPr id="4" name="Content Placeholder 3"/>
+          <p:cNvPicPr>
+            <a:picLocks noGrp="1" noChangeAspect="1"/>
+          </p:cNvPicPr>
+          <p:nvPr>
+            <p:ph idx="1"/>
+          </p:nvPr>
+        </p:nvPicPr>
+        <p:blipFill>
+          <a:blip r:embed="rId2">
+            <a:lum bright="70000" contrast="-70000"/>
+            <a:extLst>
+              <a:ext uri="{28A0092B-C50C-407E-A947-70E740481C1C}">
+                <a14:useLocalDpi xmlns:a14="http://schemas.microsoft.com/office/drawing/2010/main" val="0"/>
+              </a:ext>
+            </a:extLst>
+          </a:blip>
+          <a:stretch>
+            <a:fillRect/>
+          </a:stretch>
+        </p:blipFill>
+        <p:spPr>
+          <a:xfrm>
+            <a:off x="-53946" y="-92333"/>
+            <a:ext cx="9197945" cy="7010374"/>
+          </a:xfrm>
+        </p:spPr>
+      </p:pic>
+      <p:sp>
+        <p:nvSpPr>
+          <p:cNvPr id="2" name="Title 1"/>
+          <p:cNvSpPr>
+            <a:spLocks noGrp="1"/>
+          </p:cNvSpPr>
+          <p:nvPr>
+            <p:ph type="title"/>
+          </p:nvPr>
+        </p:nvSpPr>
+        <p:spPr>
+          <a:xfrm>
+            <a:off x="457200" y="1981200"/>
+            <a:ext cx="8534400" cy="2057400"/>
+          </a:xfrm>
+        </p:spPr>
+        <p:txBody>
+          <a:bodyPr>
+            <a:normAutofit/>
+          </a:bodyPr>
+          <a:lstStyle/>
+          <a:p>
+            <a:pPr>
+              <a:lnSpc>
+                <a:spcPct val="150000"/>
+              </a:lnSpc>
+            </a:pPr>
+            <a:r>
+              <a:rPr lang="en-US" sz="3600" b="1" dirty="0">
+                <a:cs typeface="Times New Roman" panose="02020603050405020304" pitchFamily="18" charset="0"/>
+              </a:rPr>
+              <a:t>SIX MOST POLLUTING CHEMICALS PRESENT IN INDUSTRIAL WASTES</a:t>
+            </a:r>
+          </a:p>
+        </p:txBody>
+      </p:sp>
+    </p:spTree>
+    <p:extLst>
+      <p:ext uri="{BB962C8B-B14F-4D97-AF65-F5344CB8AC3E}">
+        <p14:creationId xmlns:p14="http://schemas.microsoft.com/office/powerpoint/2010/main" val="1896296339"/>
       </p:ext>
     </p:extLst>
   </p:cSld>

</xml_diff>